<commit_message>
Add initial intro section.
</commit_message>
<xml_diff>
--- a/splash_slides.pptx
+++ b/splash_slides.pptx
@@ -4,13 +4,39 @@
   <p:sldMasterIdLst>
     <p:sldMasterId id="2147483714" r:id="rId1"/>
   </p:sldMasterIdLst>
+  <p:notesMasterIdLst>
+    <p:notesMasterId r:id="rId31"/>
+  </p:notesMasterIdLst>
   <p:sldIdLst>
     <p:sldId id="256" r:id="rId2"/>
     <p:sldId id="257" r:id="rId3"/>
-    <p:sldId id="258" r:id="rId4"/>
-    <p:sldId id="259" r:id="rId5"/>
-    <p:sldId id="260" r:id="rId6"/>
-    <p:sldId id="261" r:id="rId7"/>
+    <p:sldId id="263" r:id="rId4"/>
+    <p:sldId id="267" r:id="rId5"/>
+    <p:sldId id="269" r:id="rId6"/>
+    <p:sldId id="271" r:id="rId7"/>
+    <p:sldId id="270" r:id="rId8"/>
+    <p:sldId id="272" r:id="rId9"/>
+    <p:sldId id="281" r:id="rId10"/>
+    <p:sldId id="273" r:id="rId11"/>
+    <p:sldId id="282" r:id="rId12"/>
+    <p:sldId id="275" r:id="rId13"/>
+    <p:sldId id="278" r:id="rId14"/>
+    <p:sldId id="277" r:id="rId15"/>
+    <p:sldId id="276" r:id="rId16"/>
+    <p:sldId id="279" r:id="rId17"/>
+    <p:sldId id="280" r:id="rId18"/>
+    <p:sldId id="265" r:id="rId19"/>
+    <p:sldId id="284" r:id="rId20"/>
+    <p:sldId id="285" r:id="rId21"/>
+    <p:sldId id="283" r:id="rId22"/>
+    <p:sldId id="274" r:id="rId23"/>
+    <p:sldId id="286" r:id="rId24"/>
+    <p:sldId id="287" r:id="rId25"/>
+    <p:sldId id="258" r:id="rId26"/>
+    <p:sldId id="259" r:id="rId27"/>
+    <p:sldId id="260" r:id="rId28"/>
+    <p:sldId id="266" r:id="rId29"/>
+    <p:sldId id="261" r:id="rId30"/>
   </p:sldIdLst>
   <p:sldSz cx="12192000" cy="6858000"/>
   <p:notesSz cx="6858000" cy="9144000"/>
@@ -110,6 +136,625 @@
     </a:lvl9pPr>
   </p:defaultTextStyle>
 </p:presentation>
+</file>
+
+<file path=ppt/commentAuthors.xml><?xml version="1.0" encoding="utf-8"?>
+<p:cmAuthorLst xmlns:a="http://schemas.openxmlformats.org/drawingml/2006/main" xmlns:r="http://schemas.openxmlformats.org/officeDocument/2006/relationships" xmlns:p="http://schemas.openxmlformats.org/presentationml/2006/main">
+  <p:cmAuthor id="1" name="Cathy Chen" initials="CC" lastIdx="1" clrIdx="0">
+    <p:extLst>
+      <p:ext uri="{19B8F6BF-5375-455C-9EA6-DF929625EA0E}">
+        <p15:presenceInfo xmlns:p15="http://schemas.microsoft.com/office/powerpoint/2012/main" userId="16cd660617a2e599" providerId="Windows Live"/>
+      </p:ext>
+    </p:extLst>
+  </p:cmAuthor>
+</p:cmAuthorLst>
+</file>
+
+<file path=ppt/notesMasters/notesMaster1.xml><?xml version="1.0" encoding="utf-8"?>
+<p:notesMaster xmlns:a="http://schemas.openxmlformats.org/drawingml/2006/main" xmlns:r="http://schemas.openxmlformats.org/officeDocument/2006/relationships" xmlns:p="http://schemas.openxmlformats.org/presentationml/2006/main">
+  <p:cSld>
+    <p:bg>
+      <p:bgRef idx="1001">
+        <a:schemeClr val="bg1"/>
+      </p:bgRef>
+    </p:bg>
+    <p:spTree>
+      <p:nvGrpSpPr>
+        <p:cNvPr id="1" name=""/>
+        <p:cNvGrpSpPr/>
+        <p:nvPr/>
+      </p:nvGrpSpPr>
+      <p:grpSpPr>
+        <a:xfrm>
+          <a:off x="0" y="0"/>
+          <a:ext cx="0" cy="0"/>
+          <a:chOff x="0" y="0"/>
+          <a:chExt cx="0" cy="0"/>
+        </a:xfrm>
+      </p:grpSpPr>
+      <p:sp>
+        <p:nvSpPr>
+          <p:cNvPr id="2" name="Header Placeholder 1"/>
+          <p:cNvSpPr>
+            <a:spLocks noGrp="1"/>
+          </p:cNvSpPr>
+          <p:nvPr>
+            <p:ph type="hdr" sz="quarter"/>
+          </p:nvPr>
+        </p:nvSpPr>
+        <p:spPr>
+          <a:xfrm>
+            <a:off x="0" y="0"/>
+            <a:ext cx="2971800" cy="458788"/>
+          </a:xfrm>
+          <a:prstGeom prst="rect">
+            <a:avLst/>
+          </a:prstGeom>
+        </p:spPr>
+        <p:txBody>
+          <a:bodyPr vert="horz" lIns="91440" tIns="45720" rIns="91440" bIns="45720" rtlCol="0"/>
+          <a:lstStyle>
+            <a:lvl1pPr algn="l">
+              <a:defRPr sz="1200"/>
+            </a:lvl1pPr>
+          </a:lstStyle>
+          <a:p>
+            <a:endParaRPr lang="en-US"/>
+          </a:p>
+        </p:txBody>
+      </p:sp>
+      <p:sp>
+        <p:nvSpPr>
+          <p:cNvPr id="3" name="Date Placeholder 2"/>
+          <p:cNvSpPr>
+            <a:spLocks noGrp="1"/>
+          </p:cNvSpPr>
+          <p:nvPr>
+            <p:ph type="dt" idx="1"/>
+          </p:nvPr>
+        </p:nvSpPr>
+        <p:spPr>
+          <a:xfrm>
+            <a:off x="3884613" y="0"/>
+            <a:ext cx="2971800" cy="458788"/>
+          </a:xfrm>
+          <a:prstGeom prst="rect">
+            <a:avLst/>
+          </a:prstGeom>
+        </p:spPr>
+        <p:txBody>
+          <a:bodyPr vert="horz" lIns="91440" tIns="45720" rIns="91440" bIns="45720" rtlCol="0"/>
+          <a:lstStyle>
+            <a:lvl1pPr algn="r">
+              <a:defRPr sz="1200"/>
+            </a:lvl1pPr>
+          </a:lstStyle>
+          <a:p>
+            <a:fld id="{DFFE31B5-0961-454C-A3DD-42740E317C07}" type="datetimeFigureOut">
+              <a:rPr lang="en-US" smtClean="0"/>
+              <a:t>4/19/2018</a:t>
+            </a:fld>
+            <a:endParaRPr lang="en-US"/>
+          </a:p>
+        </p:txBody>
+      </p:sp>
+      <p:sp>
+        <p:nvSpPr>
+          <p:cNvPr id="4" name="Slide Image Placeholder 3"/>
+          <p:cNvSpPr>
+            <a:spLocks noGrp="1" noRot="1" noChangeAspect="1"/>
+          </p:cNvSpPr>
+          <p:nvPr>
+            <p:ph type="sldImg" idx="2"/>
+          </p:nvPr>
+        </p:nvSpPr>
+        <p:spPr>
+          <a:xfrm>
+            <a:off x="685800" y="1143000"/>
+            <a:ext cx="5486400" cy="3086100"/>
+          </a:xfrm>
+          <a:prstGeom prst="rect">
+            <a:avLst/>
+          </a:prstGeom>
+          <a:noFill/>
+          <a:ln w="12700">
+            <a:solidFill>
+              <a:prstClr val="black"/>
+            </a:solidFill>
+          </a:ln>
+        </p:spPr>
+        <p:txBody>
+          <a:bodyPr vert="horz" lIns="91440" tIns="45720" rIns="91440" bIns="45720" rtlCol="0" anchor="ctr"/>
+          <a:lstStyle/>
+          <a:p>
+            <a:endParaRPr lang="en-US"/>
+          </a:p>
+        </p:txBody>
+      </p:sp>
+      <p:sp>
+        <p:nvSpPr>
+          <p:cNvPr id="5" name="Notes Placeholder 4"/>
+          <p:cNvSpPr>
+            <a:spLocks noGrp="1"/>
+          </p:cNvSpPr>
+          <p:nvPr>
+            <p:ph type="body" sz="quarter" idx="3"/>
+          </p:nvPr>
+        </p:nvSpPr>
+        <p:spPr>
+          <a:xfrm>
+            <a:off x="685800" y="4400550"/>
+            <a:ext cx="5486400" cy="3600450"/>
+          </a:xfrm>
+          <a:prstGeom prst="rect">
+            <a:avLst/>
+          </a:prstGeom>
+        </p:spPr>
+        <p:txBody>
+          <a:bodyPr vert="horz" lIns="91440" tIns="45720" rIns="91440" bIns="45720" rtlCol="0"/>
+          <a:lstStyle/>
+          <a:p>
+            <a:pPr lvl="0"/>
+            <a:r>
+              <a:rPr lang="en-US"/>
+              <a:t>Edit Master text styles</a:t>
+            </a:r>
+          </a:p>
+          <a:p>
+            <a:pPr lvl="1"/>
+            <a:r>
+              <a:rPr lang="en-US"/>
+              <a:t>Second level</a:t>
+            </a:r>
+          </a:p>
+          <a:p>
+            <a:pPr lvl="2"/>
+            <a:r>
+              <a:rPr lang="en-US"/>
+              <a:t>Third level</a:t>
+            </a:r>
+          </a:p>
+          <a:p>
+            <a:pPr lvl="3"/>
+            <a:r>
+              <a:rPr lang="en-US"/>
+              <a:t>Fourth level</a:t>
+            </a:r>
+          </a:p>
+          <a:p>
+            <a:pPr lvl="4"/>
+            <a:r>
+              <a:rPr lang="en-US"/>
+              <a:t>Fifth level</a:t>
+            </a:r>
+          </a:p>
+        </p:txBody>
+      </p:sp>
+      <p:sp>
+        <p:nvSpPr>
+          <p:cNvPr id="6" name="Footer Placeholder 5"/>
+          <p:cNvSpPr>
+            <a:spLocks noGrp="1"/>
+          </p:cNvSpPr>
+          <p:nvPr>
+            <p:ph type="ftr" sz="quarter" idx="4"/>
+          </p:nvPr>
+        </p:nvSpPr>
+        <p:spPr>
+          <a:xfrm>
+            <a:off x="0" y="8685213"/>
+            <a:ext cx="2971800" cy="458787"/>
+          </a:xfrm>
+          <a:prstGeom prst="rect">
+            <a:avLst/>
+          </a:prstGeom>
+        </p:spPr>
+        <p:txBody>
+          <a:bodyPr vert="horz" lIns="91440" tIns="45720" rIns="91440" bIns="45720" rtlCol="0" anchor="b"/>
+          <a:lstStyle>
+            <a:lvl1pPr algn="l">
+              <a:defRPr sz="1200"/>
+            </a:lvl1pPr>
+          </a:lstStyle>
+          <a:p>
+            <a:endParaRPr lang="en-US"/>
+          </a:p>
+        </p:txBody>
+      </p:sp>
+      <p:sp>
+        <p:nvSpPr>
+          <p:cNvPr id="7" name="Slide Number Placeholder 6"/>
+          <p:cNvSpPr>
+            <a:spLocks noGrp="1"/>
+          </p:cNvSpPr>
+          <p:nvPr>
+            <p:ph type="sldNum" sz="quarter" idx="5"/>
+          </p:nvPr>
+        </p:nvSpPr>
+        <p:spPr>
+          <a:xfrm>
+            <a:off x="3884613" y="8685213"/>
+            <a:ext cx="2971800" cy="458787"/>
+          </a:xfrm>
+          <a:prstGeom prst="rect">
+            <a:avLst/>
+          </a:prstGeom>
+        </p:spPr>
+        <p:txBody>
+          <a:bodyPr vert="horz" lIns="91440" tIns="45720" rIns="91440" bIns="45720" rtlCol="0" anchor="b"/>
+          <a:lstStyle>
+            <a:lvl1pPr algn="r">
+              <a:defRPr sz="1200"/>
+            </a:lvl1pPr>
+          </a:lstStyle>
+          <a:p>
+            <a:fld id="{A07ECB9E-536C-4551-96DA-621CC202222E}" type="slidenum">
+              <a:rPr lang="en-US" smtClean="0"/>
+              <a:t>‹#›</a:t>
+            </a:fld>
+            <a:endParaRPr lang="en-US"/>
+          </a:p>
+        </p:txBody>
+      </p:sp>
+    </p:spTree>
+    <p:extLst>
+      <p:ext uri="{BB962C8B-B14F-4D97-AF65-F5344CB8AC3E}">
+        <p14:creationId xmlns:p14="http://schemas.microsoft.com/office/powerpoint/2010/main" val="2600609406"/>
+      </p:ext>
+    </p:extLst>
+  </p:cSld>
+  <p:clrMap bg1="lt1" tx1="dk1" bg2="lt2" tx2="dk2" accent1="accent1" accent2="accent2" accent3="accent3" accent4="accent4" accent5="accent5" accent6="accent6" hlink="hlink" folHlink="folHlink"/>
+  <p:notesStyle>
+    <a:lvl1pPr marL="0" algn="l" defTabSz="914400" rtl="0" eaLnBrk="1" latinLnBrk="0" hangingPunct="1">
+      <a:defRPr sz="1200" kern="1200">
+        <a:solidFill>
+          <a:schemeClr val="tx1"/>
+        </a:solidFill>
+        <a:latin typeface="+mn-lt"/>
+        <a:ea typeface="+mn-ea"/>
+        <a:cs typeface="+mn-cs"/>
+      </a:defRPr>
+    </a:lvl1pPr>
+    <a:lvl2pPr marL="457200" algn="l" defTabSz="914400" rtl="0" eaLnBrk="1" latinLnBrk="0" hangingPunct="1">
+      <a:defRPr sz="1200" kern="1200">
+        <a:solidFill>
+          <a:schemeClr val="tx1"/>
+        </a:solidFill>
+        <a:latin typeface="+mn-lt"/>
+        <a:ea typeface="+mn-ea"/>
+        <a:cs typeface="+mn-cs"/>
+      </a:defRPr>
+    </a:lvl2pPr>
+    <a:lvl3pPr marL="914400" algn="l" defTabSz="914400" rtl="0" eaLnBrk="1" latinLnBrk="0" hangingPunct="1">
+      <a:defRPr sz="1200" kern="1200">
+        <a:solidFill>
+          <a:schemeClr val="tx1"/>
+        </a:solidFill>
+        <a:latin typeface="+mn-lt"/>
+        <a:ea typeface="+mn-ea"/>
+        <a:cs typeface="+mn-cs"/>
+      </a:defRPr>
+    </a:lvl3pPr>
+    <a:lvl4pPr marL="1371600" algn="l" defTabSz="914400" rtl="0" eaLnBrk="1" latinLnBrk="0" hangingPunct="1">
+      <a:defRPr sz="1200" kern="1200">
+        <a:solidFill>
+          <a:schemeClr val="tx1"/>
+        </a:solidFill>
+        <a:latin typeface="+mn-lt"/>
+        <a:ea typeface="+mn-ea"/>
+        <a:cs typeface="+mn-cs"/>
+      </a:defRPr>
+    </a:lvl4pPr>
+    <a:lvl5pPr marL="1828800" algn="l" defTabSz="914400" rtl="0" eaLnBrk="1" latinLnBrk="0" hangingPunct="1">
+      <a:defRPr sz="1200" kern="1200">
+        <a:solidFill>
+          <a:schemeClr val="tx1"/>
+        </a:solidFill>
+        <a:latin typeface="+mn-lt"/>
+        <a:ea typeface="+mn-ea"/>
+        <a:cs typeface="+mn-cs"/>
+      </a:defRPr>
+    </a:lvl5pPr>
+    <a:lvl6pPr marL="2286000" algn="l" defTabSz="914400" rtl="0" eaLnBrk="1" latinLnBrk="0" hangingPunct="1">
+      <a:defRPr sz="1200" kern="1200">
+        <a:solidFill>
+          <a:schemeClr val="tx1"/>
+        </a:solidFill>
+        <a:latin typeface="+mn-lt"/>
+        <a:ea typeface="+mn-ea"/>
+        <a:cs typeface="+mn-cs"/>
+      </a:defRPr>
+    </a:lvl6pPr>
+    <a:lvl7pPr marL="2743200" algn="l" defTabSz="914400" rtl="0" eaLnBrk="1" latinLnBrk="0" hangingPunct="1">
+      <a:defRPr sz="1200" kern="1200">
+        <a:solidFill>
+          <a:schemeClr val="tx1"/>
+        </a:solidFill>
+        <a:latin typeface="+mn-lt"/>
+        <a:ea typeface="+mn-ea"/>
+        <a:cs typeface="+mn-cs"/>
+      </a:defRPr>
+    </a:lvl7pPr>
+    <a:lvl8pPr marL="3200400" algn="l" defTabSz="914400" rtl="0" eaLnBrk="1" latinLnBrk="0" hangingPunct="1">
+      <a:defRPr sz="1200" kern="1200">
+        <a:solidFill>
+          <a:schemeClr val="tx1"/>
+        </a:solidFill>
+        <a:latin typeface="+mn-lt"/>
+        <a:ea typeface="+mn-ea"/>
+        <a:cs typeface="+mn-cs"/>
+      </a:defRPr>
+    </a:lvl8pPr>
+    <a:lvl9pPr marL="3657600" algn="l" defTabSz="914400" rtl="0" eaLnBrk="1" latinLnBrk="0" hangingPunct="1">
+      <a:defRPr sz="1200" kern="1200">
+        <a:solidFill>
+          <a:schemeClr val="tx1"/>
+        </a:solidFill>
+        <a:latin typeface="+mn-lt"/>
+        <a:ea typeface="+mn-ea"/>
+        <a:cs typeface="+mn-cs"/>
+      </a:defRPr>
+    </a:lvl9pPr>
+  </p:notesStyle>
+</p:notesMaster>
+</file>
+
+<file path=ppt/notesSlides/notesSlide1.xml><?xml version="1.0" encoding="utf-8"?>
+<p:notes xmlns:a="http://schemas.openxmlformats.org/drawingml/2006/main" xmlns:r="http://schemas.openxmlformats.org/officeDocument/2006/relationships" xmlns:p="http://schemas.openxmlformats.org/presentationml/2006/main">
+  <p:cSld>
+    <p:spTree>
+      <p:nvGrpSpPr>
+        <p:cNvPr id="1" name=""/>
+        <p:cNvGrpSpPr/>
+        <p:nvPr/>
+      </p:nvGrpSpPr>
+      <p:grpSpPr>
+        <a:xfrm>
+          <a:off x="0" y="0"/>
+          <a:ext cx="0" cy="0"/>
+          <a:chOff x="0" y="0"/>
+          <a:chExt cx="0" cy="0"/>
+        </a:xfrm>
+      </p:grpSpPr>
+      <p:sp>
+        <p:nvSpPr>
+          <p:cNvPr id="2" name="Slide Image Placeholder 1"/>
+          <p:cNvSpPr>
+            <a:spLocks noGrp="1" noRot="1" noChangeAspect="1"/>
+          </p:cNvSpPr>
+          <p:nvPr>
+            <p:ph type="sldImg"/>
+          </p:nvPr>
+        </p:nvSpPr>
+        <p:spPr/>
+      </p:sp>
+      <p:sp>
+        <p:nvSpPr>
+          <p:cNvPr id="3" name="Notes Placeholder 2"/>
+          <p:cNvSpPr>
+            <a:spLocks noGrp="1"/>
+          </p:cNvSpPr>
+          <p:nvPr>
+            <p:ph type="body" idx="1"/>
+          </p:nvPr>
+        </p:nvSpPr>
+        <p:spPr/>
+        <p:txBody>
+          <a:bodyPr/>
+          <a:lstStyle/>
+          <a:p>
+            <a:r>
+              <a:rPr lang="en-US" dirty="0"/>
+              <a:t>Parse tree: sentence; noun phrase, verb phrase; verb, determiner, noun</a:t>
+            </a:r>
+          </a:p>
+        </p:txBody>
+      </p:sp>
+      <p:sp>
+        <p:nvSpPr>
+          <p:cNvPr id="4" name="Slide Number Placeholder 3"/>
+          <p:cNvSpPr>
+            <a:spLocks noGrp="1"/>
+          </p:cNvSpPr>
+          <p:nvPr>
+            <p:ph type="sldNum" sz="quarter" idx="10"/>
+          </p:nvPr>
+        </p:nvSpPr>
+        <p:spPr/>
+        <p:txBody>
+          <a:bodyPr/>
+          <a:lstStyle/>
+          <a:p>
+            <a:fld id="{A07ECB9E-536C-4551-96DA-621CC202222E}" type="slidenum">
+              <a:rPr lang="en-US" smtClean="0"/>
+              <a:t>10</a:t>
+            </a:fld>
+            <a:endParaRPr lang="en-US"/>
+          </a:p>
+        </p:txBody>
+      </p:sp>
+    </p:spTree>
+    <p:extLst>
+      <p:ext uri="{BB962C8B-B14F-4D97-AF65-F5344CB8AC3E}">
+        <p14:creationId xmlns:p14="http://schemas.microsoft.com/office/powerpoint/2010/main" val="3215571761"/>
+      </p:ext>
+    </p:extLst>
+  </p:cSld>
+  <p:clrMapOvr>
+    <a:masterClrMapping/>
+  </p:clrMapOvr>
+</p:notes>
+</file>
+
+<file path=ppt/notesSlides/notesSlide2.xml><?xml version="1.0" encoding="utf-8"?>
+<p:notes xmlns:a="http://schemas.openxmlformats.org/drawingml/2006/main" xmlns:r="http://schemas.openxmlformats.org/officeDocument/2006/relationships" xmlns:p="http://schemas.openxmlformats.org/presentationml/2006/main">
+  <p:cSld>
+    <p:spTree>
+      <p:nvGrpSpPr>
+        <p:cNvPr id="1" name=""/>
+        <p:cNvGrpSpPr/>
+        <p:nvPr/>
+      </p:nvGrpSpPr>
+      <p:grpSpPr>
+        <a:xfrm>
+          <a:off x="0" y="0"/>
+          <a:ext cx="0" cy="0"/>
+          <a:chOff x="0" y="0"/>
+          <a:chExt cx="0" cy="0"/>
+        </a:xfrm>
+      </p:grpSpPr>
+      <p:sp>
+        <p:nvSpPr>
+          <p:cNvPr id="2" name="Slide Image Placeholder 1"/>
+          <p:cNvSpPr>
+            <a:spLocks noGrp="1" noRot="1" noChangeAspect="1"/>
+          </p:cNvSpPr>
+          <p:nvPr>
+            <p:ph type="sldImg"/>
+          </p:nvPr>
+        </p:nvSpPr>
+        <p:spPr/>
+      </p:sp>
+      <p:sp>
+        <p:nvSpPr>
+          <p:cNvPr id="3" name="Notes Placeholder 2"/>
+          <p:cNvSpPr>
+            <a:spLocks noGrp="1"/>
+          </p:cNvSpPr>
+          <p:nvPr>
+            <p:ph type="body" idx="1"/>
+          </p:nvPr>
+        </p:nvSpPr>
+        <p:spPr/>
+        <p:txBody>
+          <a:bodyPr/>
+          <a:lstStyle/>
+          <a:p>
+            <a:endParaRPr lang="en-US" dirty="0"/>
+          </a:p>
+        </p:txBody>
+      </p:sp>
+      <p:sp>
+        <p:nvSpPr>
+          <p:cNvPr id="4" name="Slide Number Placeholder 3"/>
+          <p:cNvSpPr>
+            <a:spLocks noGrp="1"/>
+          </p:cNvSpPr>
+          <p:nvPr>
+            <p:ph type="sldNum" sz="quarter" idx="10"/>
+          </p:nvPr>
+        </p:nvSpPr>
+        <p:spPr/>
+        <p:txBody>
+          <a:bodyPr/>
+          <a:lstStyle/>
+          <a:p>
+            <a:fld id="{A07ECB9E-536C-4551-96DA-621CC202222E}" type="slidenum">
+              <a:rPr lang="en-US" smtClean="0"/>
+              <a:t>14</a:t>
+            </a:fld>
+            <a:endParaRPr lang="en-US"/>
+          </a:p>
+        </p:txBody>
+      </p:sp>
+    </p:spTree>
+    <p:extLst>
+      <p:ext uri="{BB962C8B-B14F-4D97-AF65-F5344CB8AC3E}">
+        <p14:creationId xmlns:p14="http://schemas.microsoft.com/office/powerpoint/2010/main" val="2992737464"/>
+      </p:ext>
+    </p:extLst>
+  </p:cSld>
+  <p:clrMapOvr>
+    <a:masterClrMapping/>
+  </p:clrMapOvr>
+</p:notes>
+</file>
+
+<file path=ppt/notesSlides/notesSlide3.xml><?xml version="1.0" encoding="utf-8"?>
+<p:notes xmlns:a="http://schemas.openxmlformats.org/drawingml/2006/main" xmlns:r="http://schemas.openxmlformats.org/officeDocument/2006/relationships" xmlns:p="http://schemas.openxmlformats.org/presentationml/2006/main">
+  <p:cSld>
+    <p:spTree>
+      <p:nvGrpSpPr>
+        <p:cNvPr id="1" name=""/>
+        <p:cNvGrpSpPr/>
+        <p:nvPr/>
+      </p:nvGrpSpPr>
+      <p:grpSpPr>
+        <a:xfrm>
+          <a:off x="0" y="0"/>
+          <a:ext cx="0" cy="0"/>
+          <a:chOff x="0" y="0"/>
+          <a:chExt cx="0" cy="0"/>
+        </a:xfrm>
+      </p:grpSpPr>
+      <p:sp>
+        <p:nvSpPr>
+          <p:cNvPr id="2" name="Slide Image Placeholder 1"/>
+          <p:cNvSpPr>
+            <a:spLocks noGrp="1" noRot="1" noChangeAspect="1"/>
+          </p:cNvSpPr>
+          <p:nvPr>
+            <p:ph type="sldImg"/>
+          </p:nvPr>
+        </p:nvSpPr>
+        <p:spPr/>
+      </p:sp>
+      <p:sp>
+        <p:nvSpPr>
+          <p:cNvPr id="3" name="Notes Placeholder 2"/>
+          <p:cNvSpPr>
+            <a:spLocks noGrp="1"/>
+          </p:cNvSpPr>
+          <p:nvPr>
+            <p:ph type="body" idx="1"/>
+          </p:nvPr>
+        </p:nvSpPr>
+        <p:spPr/>
+        <p:txBody>
+          <a:bodyPr/>
+          <a:lstStyle/>
+          <a:p>
+            <a:r>
+              <a:rPr lang="en-US" dirty="0"/>
+              <a:t>Segmentation</a:t>
+            </a:r>
+          </a:p>
+        </p:txBody>
+      </p:sp>
+      <p:sp>
+        <p:nvSpPr>
+          <p:cNvPr id="4" name="Slide Number Placeholder 3"/>
+          <p:cNvSpPr>
+            <a:spLocks noGrp="1"/>
+          </p:cNvSpPr>
+          <p:nvPr>
+            <p:ph type="sldNum" sz="quarter" idx="10"/>
+          </p:nvPr>
+        </p:nvSpPr>
+        <p:spPr/>
+        <p:txBody>
+          <a:bodyPr/>
+          <a:lstStyle/>
+          <a:p>
+            <a:fld id="{A07ECB9E-536C-4551-96DA-621CC202222E}" type="slidenum">
+              <a:rPr lang="en-US" smtClean="0"/>
+              <a:t>22</a:t>
+            </a:fld>
+            <a:endParaRPr lang="en-US"/>
+          </a:p>
+        </p:txBody>
+      </p:sp>
+    </p:spTree>
+    <p:extLst>
+      <p:ext uri="{BB962C8B-B14F-4D97-AF65-F5344CB8AC3E}">
+        <p14:creationId xmlns:p14="http://schemas.microsoft.com/office/powerpoint/2010/main" val="717307250"/>
+      </p:ext>
+    </p:extLst>
+  </p:cSld>
+  <p:clrMapOvr>
+    <a:masterClrMapping/>
+  </p:clrMapOvr>
+</p:notes>
 </file>
 
 <file path=ppt/slideLayouts/slideLayout1.xml><?xml version="1.0" encoding="utf-8"?>
@@ -3420,6 +4065,985 @@
 </p:sld>
 </file>
 
+<file path=ppt/slides/slide10.xml><?xml version="1.0" encoding="utf-8"?>
+<p:sld xmlns:a="http://schemas.openxmlformats.org/drawingml/2006/main" xmlns:r="http://schemas.openxmlformats.org/officeDocument/2006/relationships" xmlns:p="http://schemas.openxmlformats.org/presentationml/2006/main">
+  <p:cSld>
+    <p:spTree>
+      <p:nvGrpSpPr>
+        <p:cNvPr id="1" name=""/>
+        <p:cNvGrpSpPr/>
+        <p:nvPr/>
+      </p:nvGrpSpPr>
+      <p:grpSpPr>
+        <a:xfrm>
+          <a:off x="0" y="0"/>
+          <a:ext cx="0" cy="0"/>
+          <a:chOff x="0" y="0"/>
+          <a:chExt cx="0" cy="0"/>
+        </a:xfrm>
+      </p:grpSpPr>
+      <p:pic>
+        <p:nvPicPr>
+          <p:cNvPr id="4" name="Picture 3">
+            <a:extLst>
+              <a:ext uri="{FF2B5EF4-FFF2-40B4-BE49-F238E27FC236}">
+                <a16:creationId xmlns:a16="http://schemas.microsoft.com/office/drawing/2014/main" id="{91EB5EDD-C3B7-4EBB-8095-8549BDEF68E0}"/>
+              </a:ext>
+            </a:extLst>
+          </p:cNvPr>
+          <p:cNvPicPr>
+            <a:picLocks noChangeAspect="1"/>
+          </p:cNvPicPr>
+          <p:nvPr/>
+        </p:nvPicPr>
+        <p:blipFill>
+          <a:blip r:embed="rId3"/>
+          <a:stretch>
+            <a:fillRect/>
+          </a:stretch>
+        </p:blipFill>
+        <p:spPr>
+          <a:xfrm>
+            <a:off x="2542632" y="0"/>
+            <a:ext cx="7106736" cy="6858000"/>
+          </a:xfrm>
+          <a:prstGeom prst="rect">
+            <a:avLst/>
+          </a:prstGeom>
+        </p:spPr>
+      </p:pic>
+      <p:sp>
+        <p:nvSpPr>
+          <p:cNvPr id="5" name="TextBox 4">
+            <a:extLst>
+              <a:ext uri="{FF2B5EF4-FFF2-40B4-BE49-F238E27FC236}">
+                <a16:creationId xmlns:a16="http://schemas.microsoft.com/office/drawing/2014/main" id="{CD0D8E49-6AA3-4BDF-8AE4-9278E6AE3ABA}"/>
+              </a:ext>
+            </a:extLst>
+          </p:cNvPr>
+          <p:cNvSpPr txBox="1"/>
+          <p:nvPr/>
+        </p:nvSpPr>
+        <p:spPr>
+          <a:xfrm>
+            <a:off x="325315" y="6418385"/>
+            <a:ext cx="5416868" cy="369332"/>
+          </a:xfrm>
+          <a:prstGeom prst="rect">
+            <a:avLst/>
+          </a:prstGeom>
+          <a:noFill/>
+        </p:spPr>
+        <p:txBody>
+          <a:bodyPr wrap="none" rtlCol="0">
+            <a:spAutoFit/>
+          </a:bodyPr>
+          <a:lstStyle/>
+          <a:p>
+            <a:r>
+              <a:rPr lang="en-US" dirty="0"/>
+              <a:t>https://commons.wikimedia.org/wiki/File:ParseTree.svg</a:t>
+            </a:r>
+          </a:p>
+        </p:txBody>
+      </p:sp>
+    </p:spTree>
+    <p:extLst>
+      <p:ext uri="{BB962C8B-B14F-4D97-AF65-F5344CB8AC3E}">
+        <p14:creationId xmlns:p14="http://schemas.microsoft.com/office/powerpoint/2010/main" val="2968770015"/>
+      </p:ext>
+    </p:extLst>
+  </p:cSld>
+  <p:clrMapOvr>
+    <a:masterClrMapping/>
+  </p:clrMapOvr>
+</p:sld>
+</file>
+
+<file path=ppt/slides/slide11.xml><?xml version="1.0" encoding="utf-8"?>
+<p:sld xmlns:a="http://schemas.openxmlformats.org/drawingml/2006/main" xmlns:r="http://schemas.openxmlformats.org/officeDocument/2006/relationships" xmlns:p="http://schemas.openxmlformats.org/presentationml/2006/main">
+  <p:cSld>
+    <p:spTree>
+      <p:nvGrpSpPr>
+        <p:cNvPr id="1" name=""/>
+        <p:cNvGrpSpPr/>
+        <p:nvPr/>
+      </p:nvGrpSpPr>
+      <p:grpSpPr>
+        <a:xfrm>
+          <a:off x="0" y="0"/>
+          <a:ext cx="0" cy="0"/>
+          <a:chOff x="0" y="0"/>
+          <a:chExt cx="0" cy="0"/>
+        </a:xfrm>
+      </p:grpSpPr>
+      <p:pic>
+        <p:nvPicPr>
+          <p:cNvPr id="4" name="Picture 3">
+            <a:extLst>
+              <a:ext uri="{FF2B5EF4-FFF2-40B4-BE49-F238E27FC236}">
+                <a16:creationId xmlns:a16="http://schemas.microsoft.com/office/drawing/2014/main" id="{14692214-DC6C-4BD1-8371-491A0A70F9FF}"/>
+              </a:ext>
+            </a:extLst>
+          </p:cNvPr>
+          <p:cNvPicPr>
+            <a:picLocks noChangeAspect="1"/>
+          </p:cNvPicPr>
+          <p:nvPr/>
+        </p:nvPicPr>
+        <p:blipFill>
+          <a:blip r:embed="rId2"/>
+          <a:stretch>
+            <a:fillRect/>
+          </a:stretch>
+        </p:blipFill>
+        <p:spPr>
+          <a:xfrm>
+            <a:off x="1767254" y="1643062"/>
+            <a:ext cx="7620000" cy="3571875"/>
+          </a:xfrm>
+          <a:prstGeom prst="rect">
+            <a:avLst/>
+          </a:prstGeom>
+        </p:spPr>
+      </p:pic>
+      <p:sp>
+        <p:nvSpPr>
+          <p:cNvPr id="5" name="TextBox 4">
+            <a:extLst>
+              <a:ext uri="{FF2B5EF4-FFF2-40B4-BE49-F238E27FC236}">
+                <a16:creationId xmlns:a16="http://schemas.microsoft.com/office/drawing/2014/main" id="{F78128D0-08C0-4B93-8D1D-196C6CCB14E3}"/>
+              </a:ext>
+            </a:extLst>
+          </p:cNvPr>
+          <p:cNvSpPr txBox="1"/>
+          <p:nvPr/>
+        </p:nvSpPr>
+        <p:spPr>
+          <a:xfrm>
+            <a:off x="342900" y="6392008"/>
+            <a:ext cx="6680931" cy="369332"/>
+          </a:xfrm>
+          <a:prstGeom prst="rect">
+            <a:avLst/>
+          </a:prstGeom>
+          <a:noFill/>
+        </p:spPr>
+        <p:txBody>
+          <a:bodyPr wrap="none" rtlCol="0">
+            <a:spAutoFit/>
+          </a:bodyPr>
+          <a:lstStyle/>
+          <a:p>
+            <a:r>
+              <a:rPr lang="en-US" dirty="0"/>
+              <a:t>http://iconictranslation.com/2014/10/language-challenge-7-chinese/</a:t>
+            </a:r>
+          </a:p>
+        </p:txBody>
+      </p:sp>
+    </p:spTree>
+    <p:extLst>
+      <p:ext uri="{BB962C8B-B14F-4D97-AF65-F5344CB8AC3E}">
+        <p14:creationId xmlns:p14="http://schemas.microsoft.com/office/powerpoint/2010/main" val="3678710148"/>
+      </p:ext>
+    </p:extLst>
+  </p:cSld>
+  <p:clrMapOvr>
+    <a:masterClrMapping/>
+  </p:clrMapOvr>
+</p:sld>
+</file>
+
+<file path=ppt/slides/slide12.xml><?xml version="1.0" encoding="utf-8"?>
+<p:sld xmlns:a="http://schemas.openxmlformats.org/drawingml/2006/main" xmlns:r="http://schemas.openxmlformats.org/officeDocument/2006/relationships" xmlns:p="http://schemas.openxmlformats.org/presentationml/2006/main">
+  <p:cSld>
+    <p:spTree>
+      <p:nvGrpSpPr>
+        <p:cNvPr id="1" name=""/>
+        <p:cNvGrpSpPr/>
+        <p:nvPr/>
+      </p:nvGrpSpPr>
+      <p:grpSpPr>
+        <a:xfrm>
+          <a:off x="0" y="0"/>
+          <a:ext cx="0" cy="0"/>
+          <a:chOff x="0" y="0"/>
+          <a:chExt cx="0" cy="0"/>
+        </a:xfrm>
+      </p:grpSpPr>
+      <p:pic>
+        <p:nvPicPr>
+          <p:cNvPr id="4" name="Picture 3">
+            <a:extLst>
+              <a:ext uri="{FF2B5EF4-FFF2-40B4-BE49-F238E27FC236}">
+                <a16:creationId xmlns:a16="http://schemas.microsoft.com/office/drawing/2014/main" id="{C37F4417-CCC4-4D12-B4E9-71E2DD533785}"/>
+              </a:ext>
+            </a:extLst>
+          </p:cNvPr>
+          <p:cNvPicPr>
+            <a:picLocks noChangeAspect="1"/>
+          </p:cNvPicPr>
+          <p:nvPr/>
+        </p:nvPicPr>
+        <p:blipFill>
+          <a:blip r:embed="rId2"/>
+          <a:stretch>
+            <a:fillRect/>
+          </a:stretch>
+        </p:blipFill>
+        <p:spPr>
+          <a:xfrm>
+            <a:off x="0" y="2381477"/>
+            <a:ext cx="12192000" cy="2095045"/>
+          </a:xfrm>
+          <a:prstGeom prst="rect">
+            <a:avLst/>
+          </a:prstGeom>
+        </p:spPr>
+      </p:pic>
+      <p:sp>
+        <p:nvSpPr>
+          <p:cNvPr id="5" name="TextBox 4">
+            <a:extLst>
+              <a:ext uri="{FF2B5EF4-FFF2-40B4-BE49-F238E27FC236}">
+                <a16:creationId xmlns:a16="http://schemas.microsoft.com/office/drawing/2014/main" id="{D70D464F-69C5-4292-8E01-3AD14452528A}"/>
+              </a:ext>
+            </a:extLst>
+          </p:cNvPr>
+          <p:cNvSpPr txBox="1"/>
+          <p:nvPr/>
+        </p:nvSpPr>
+        <p:spPr>
+          <a:xfrm>
+            <a:off x="527538" y="6488723"/>
+            <a:ext cx="2158796" cy="369332"/>
+          </a:xfrm>
+          <a:prstGeom prst="rect">
+            <a:avLst/>
+          </a:prstGeom>
+          <a:noFill/>
+        </p:spPr>
+        <p:txBody>
+          <a:bodyPr wrap="none" rtlCol="0">
+            <a:spAutoFit/>
+          </a:bodyPr>
+          <a:lstStyle/>
+          <a:p>
+            <a:r>
+              <a:rPr lang="en-US" dirty="0"/>
+              <a:t>translate.google.com</a:t>
+            </a:r>
+          </a:p>
+        </p:txBody>
+      </p:sp>
+    </p:spTree>
+    <p:extLst>
+      <p:ext uri="{BB962C8B-B14F-4D97-AF65-F5344CB8AC3E}">
+        <p14:creationId xmlns:p14="http://schemas.microsoft.com/office/powerpoint/2010/main" val="160907320"/>
+      </p:ext>
+    </p:extLst>
+  </p:cSld>
+  <p:clrMapOvr>
+    <a:masterClrMapping/>
+  </p:clrMapOvr>
+</p:sld>
+</file>
+
+<file path=ppt/slides/slide13.xml><?xml version="1.0" encoding="utf-8"?>
+<p:sld xmlns:a="http://schemas.openxmlformats.org/drawingml/2006/main" xmlns:r="http://schemas.openxmlformats.org/officeDocument/2006/relationships" xmlns:p="http://schemas.openxmlformats.org/presentationml/2006/main">
+  <p:cSld>
+    <p:spTree>
+      <p:nvGrpSpPr>
+        <p:cNvPr id="1" name=""/>
+        <p:cNvGrpSpPr/>
+        <p:nvPr/>
+      </p:nvGrpSpPr>
+      <p:grpSpPr>
+        <a:xfrm>
+          <a:off x="0" y="0"/>
+          <a:ext cx="0" cy="0"/>
+          <a:chOff x="0" y="0"/>
+          <a:chExt cx="0" cy="0"/>
+        </a:xfrm>
+      </p:grpSpPr>
+      <p:pic>
+        <p:nvPicPr>
+          <p:cNvPr id="4" name="Picture 3">
+            <a:extLst>
+              <a:ext uri="{FF2B5EF4-FFF2-40B4-BE49-F238E27FC236}">
+                <a16:creationId xmlns:a16="http://schemas.microsoft.com/office/drawing/2014/main" id="{F86C695D-D332-45B0-B287-BE1450B55E36}"/>
+              </a:ext>
+            </a:extLst>
+          </p:cNvPr>
+          <p:cNvPicPr>
+            <a:picLocks noChangeAspect="1"/>
+          </p:cNvPicPr>
+          <p:nvPr/>
+        </p:nvPicPr>
+        <p:blipFill>
+          <a:blip r:embed="rId2"/>
+          <a:stretch>
+            <a:fillRect/>
+          </a:stretch>
+        </p:blipFill>
+        <p:spPr>
+          <a:xfrm>
+            <a:off x="3471862" y="1238250"/>
+            <a:ext cx="5248275" cy="4381500"/>
+          </a:xfrm>
+          <a:prstGeom prst="rect">
+            <a:avLst/>
+          </a:prstGeom>
+        </p:spPr>
+      </p:pic>
+      <p:sp>
+        <p:nvSpPr>
+          <p:cNvPr id="5" name="TextBox 4">
+            <a:extLst>
+              <a:ext uri="{FF2B5EF4-FFF2-40B4-BE49-F238E27FC236}">
+                <a16:creationId xmlns:a16="http://schemas.microsoft.com/office/drawing/2014/main" id="{44974D4B-9D22-419E-A1AE-A63812B37B6C}"/>
+              </a:ext>
+            </a:extLst>
+          </p:cNvPr>
+          <p:cNvSpPr txBox="1"/>
+          <p:nvPr/>
+        </p:nvSpPr>
+        <p:spPr>
+          <a:xfrm>
+            <a:off x="430823" y="6330462"/>
+            <a:ext cx="6948056" cy="369332"/>
+          </a:xfrm>
+          <a:prstGeom prst="rect">
+            <a:avLst/>
+          </a:prstGeom>
+          <a:noFill/>
+        </p:spPr>
+        <p:txBody>
+          <a:bodyPr wrap="none" rtlCol="0">
+            <a:spAutoFit/>
+          </a:bodyPr>
+          <a:lstStyle/>
+          <a:p>
+            <a:r>
+              <a:rPr lang="en-US" dirty="0"/>
+              <a:t>https://apkpure.com/sumit-text-summarization/com.karimo.sumit_final</a:t>
+            </a:r>
+          </a:p>
+        </p:txBody>
+      </p:sp>
+    </p:spTree>
+    <p:extLst>
+      <p:ext uri="{BB962C8B-B14F-4D97-AF65-F5344CB8AC3E}">
+        <p14:creationId xmlns:p14="http://schemas.microsoft.com/office/powerpoint/2010/main" val="214781822"/>
+      </p:ext>
+    </p:extLst>
+  </p:cSld>
+  <p:clrMapOvr>
+    <a:masterClrMapping/>
+  </p:clrMapOvr>
+</p:sld>
+</file>
+
+<file path=ppt/slides/slide14.xml><?xml version="1.0" encoding="utf-8"?>
+<p:sld xmlns:a="http://schemas.openxmlformats.org/drawingml/2006/main" xmlns:r="http://schemas.openxmlformats.org/officeDocument/2006/relationships" xmlns:p="http://schemas.openxmlformats.org/presentationml/2006/main">
+  <p:cSld>
+    <p:spTree>
+      <p:nvGrpSpPr>
+        <p:cNvPr id="1" name=""/>
+        <p:cNvGrpSpPr/>
+        <p:nvPr/>
+      </p:nvGrpSpPr>
+      <p:grpSpPr>
+        <a:xfrm>
+          <a:off x="0" y="0"/>
+          <a:ext cx="0" cy="0"/>
+          <a:chOff x="0" y="0"/>
+          <a:chExt cx="0" cy="0"/>
+        </a:xfrm>
+      </p:grpSpPr>
+      <p:pic>
+        <p:nvPicPr>
+          <p:cNvPr id="4" name="Picture 3">
+            <a:extLst>
+              <a:ext uri="{FF2B5EF4-FFF2-40B4-BE49-F238E27FC236}">
+                <a16:creationId xmlns:a16="http://schemas.microsoft.com/office/drawing/2014/main" id="{AE49E760-B8B3-444D-84EC-423FE750C378}"/>
+              </a:ext>
+            </a:extLst>
+          </p:cNvPr>
+          <p:cNvPicPr>
+            <a:picLocks noChangeAspect="1"/>
+          </p:cNvPicPr>
+          <p:nvPr/>
+        </p:nvPicPr>
+        <p:blipFill>
+          <a:blip r:embed="rId3"/>
+          <a:stretch>
+            <a:fillRect/>
+          </a:stretch>
+        </p:blipFill>
+        <p:spPr>
+          <a:xfrm>
+            <a:off x="851388" y="273333"/>
+            <a:ext cx="10489223" cy="5444999"/>
+          </a:xfrm>
+          <a:prstGeom prst="rect">
+            <a:avLst/>
+          </a:prstGeom>
+        </p:spPr>
+      </p:pic>
+      <p:sp>
+        <p:nvSpPr>
+          <p:cNvPr id="5" name="TextBox 4">
+            <a:extLst>
+              <a:ext uri="{FF2B5EF4-FFF2-40B4-BE49-F238E27FC236}">
+                <a16:creationId xmlns:a16="http://schemas.microsoft.com/office/drawing/2014/main" id="{2A45A654-1ECE-4B52-A6D4-1750C1551B04}"/>
+              </a:ext>
+            </a:extLst>
+          </p:cNvPr>
+          <p:cNvSpPr txBox="1"/>
+          <p:nvPr/>
+        </p:nvSpPr>
+        <p:spPr>
+          <a:xfrm>
+            <a:off x="316523" y="6427177"/>
+            <a:ext cx="4372736" cy="369332"/>
+          </a:xfrm>
+          <a:prstGeom prst="rect">
+            <a:avLst/>
+          </a:prstGeom>
+          <a:noFill/>
+        </p:spPr>
+        <p:txBody>
+          <a:bodyPr wrap="none" rtlCol="0">
+            <a:spAutoFit/>
+          </a:bodyPr>
+          <a:lstStyle/>
+          <a:p>
+            <a:r>
+              <a:rPr lang="en-US" dirty="0"/>
+              <a:t>https://www.bitext.com/sentiment-analysis/</a:t>
+            </a:r>
+          </a:p>
+        </p:txBody>
+      </p:sp>
+    </p:spTree>
+    <p:extLst>
+      <p:ext uri="{BB962C8B-B14F-4D97-AF65-F5344CB8AC3E}">
+        <p14:creationId xmlns:p14="http://schemas.microsoft.com/office/powerpoint/2010/main" val="2641024532"/>
+      </p:ext>
+    </p:extLst>
+  </p:cSld>
+  <p:clrMapOvr>
+    <a:masterClrMapping/>
+  </p:clrMapOvr>
+</p:sld>
+</file>
+
+<file path=ppt/slides/slide15.xml><?xml version="1.0" encoding="utf-8"?>
+<p:sld xmlns:a="http://schemas.openxmlformats.org/drawingml/2006/main" xmlns:r="http://schemas.openxmlformats.org/officeDocument/2006/relationships" xmlns:p="http://schemas.openxmlformats.org/presentationml/2006/main">
+  <p:cSld>
+    <p:spTree>
+      <p:nvGrpSpPr>
+        <p:cNvPr id="1" name=""/>
+        <p:cNvGrpSpPr/>
+        <p:nvPr/>
+      </p:nvGrpSpPr>
+      <p:grpSpPr>
+        <a:xfrm>
+          <a:off x="0" y="0"/>
+          <a:ext cx="0" cy="0"/>
+          <a:chOff x="0" y="0"/>
+          <a:chExt cx="0" cy="0"/>
+        </a:xfrm>
+      </p:grpSpPr>
+      <p:pic>
+        <p:nvPicPr>
+          <p:cNvPr id="4" name="Picture 3">
+            <a:extLst>
+              <a:ext uri="{FF2B5EF4-FFF2-40B4-BE49-F238E27FC236}">
+                <a16:creationId xmlns:a16="http://schemas.microsoft.com/office/drawing/2014/main" id="{933DE578-2D18-4A3D-84BE-D66DDCE355F1}"/>
+              </a:ext>
+            </a:extLst>
+          </p:cNvPr>
+          <p:cNvPicPr>
+            <a:picLocks noChangeAspect="1"/>
+          </p:cNvPicPr>
+          <p:nvPr/>
+        </p:nvPicPr>
+        <p:blipFill>
+          <a:blip r:embed="rId2"/>
+          <a:stretch>
+            <a:fillRect/>
+          </a:stretch>
+        </p:blipFill>
+        <p:spPr>
+          <a:xfrm>
+            <a:off x="2364214" y="216511"/>
+            <a:ext cx="7463571" cy="5826288"/>
+          </a:xfrm>
+          <a:prstGeom prst="rect">
+            <a:avLst/>
+          </a:prstGeom>
+        </p:spPr>
+      </p:pic>
+      <p:sp>
+        <p:nvSpPr>
+          <p:cNvPr id="5" name="TextBox 4">
+            <a:extLst>
+              <a:ext uri="{FF2B5EF4-FFF2-40B4-BE49-F238E27FC236}">
+                <a16:creationId xmlns:a16="http://schemas.microsoft.com/office/drawing/2014/main" id="{2152830E-9789-4178-8B77-20EF91B01471}"/>
+              </a:ext>
+            </a:extLst>
+          </p:cNvPr>
+          <p:cNvSpPr txBox="1"/>
+          <p:nvPr/>
+        </p:nvSpPr>
+        <p:spPr>
+          <a:xfrm>
+            <a:off x="281354" y="6318323"/>
+            <a:ext cx="8528360" cy="646331"/>
+          </a:xfrm>
+          <a:prstGeom prst="rect">
+            <a:avLst/>
+          </a:prstGeom>
+          <a:noFill/>
+        </p:spPr>
+        <p:txBody>
+          <a:bodyPr wrap="none" rtlCol="0">
+            <a:spAutoFit/>
+          </a:bodyPr>
+          <a:lstStyle/>
+          <a:p>
+            <a:r>
+              <a:rPr lang="en-US" dirty="0">
+                <a:effectLst/>
+              </a:rPr>
+              <a:t>A. Agrawal </a:t>
+            </a:r>
+            <a:r>
+              <a:rPr lang="en-US" i="1" dirty="0">
+                <a:effectLst/>
+              </a:rPr>
+              <a:t>et al.</a:t>
+            </a:r>
+            <a:r>
+              <a:rPr lang="en-US" dirty="0">
+                <a:effectLst/>
+              </a:rPr>
+              <a:t>, “VQA: Visual Question Answering,” </a:t>
+            </a:r>
+            <a:r>
+              <a:rPr lang="en-US" i="1" dirty="0">
+                <a:effectLst/>
+              </a:rPr>
+              <a:t>arXiv:1505.00468 [</a:t>
+            </a:r>
+            <a:r>
+              <a:rPr lang="en-US" i="1" dirty="0" err="1">
+                <a:effectLst/>
+              </a:rPr>
+              <a:t>cs</a:t>
+            </a:r>
+            <a:r>
+              <a:rPr lang="en-US" i="1" dirty="0">
+                <a:effectLst/>
+              </a:rPr>
+              <a:t>]</a:t>
+            </a:r>
+            <a:r>
+              <a:rPr lang="en-US" dirty="0">
+                <a:effectLst/>
+              </a:rPr>
+              <a:t>, May 2015.</a:t>
+            </a:r>
+          </a:p>
+          <a:p>
+            <a:endParaRPr lang="en-US" dirty="0"/>
+          </a:p>
+        </p:txBody>
+      </p:sp>
+    </p:spTree>
+    <p:extLst>
+      <p:ext uri="{BB962C8B-B14F-4D97-AF65-F5344CB8AC3E}">
+        <p14:creationId xmlns:p14="http://schemas.microsoft.com/office/powerpoint/2010/main" val="2436736781"/>
+      </p:ext>
+    </p:extLst>
+  </p:cSld>
+  <p:clrMapOvr>
+    <a:masterClrMapping/>
+  </p:clrMapOvr>
+</p:sld>
+</file>
+
+<file path=ppt/slides/slide16.xml><?xml version="1.0" encoding="utf-8"?>
+<p:sld xmlns:a="http://schemas.openxmlformats.org/drawingml/2006/main" xmlns:r="http://schemas.openxmlformats.org/officeDocument/2006/relationships" xmlns:p="http://schemas.openxmlformats.org/presentationml/2006/main">
+  <p:cSld>
+    <p:spTree>
+      <p:nvGrpSpPr>
+        <p:cNvPr id="1" name=""/>
+        <p:cNvGrpSpPr/>
+        <p:nvPr/>
+      </p:nvGrpSpPr>
+      <p:grpSpPr>
+        <a:xfrm>
+          <a:off x="0" y="0"/>
+          <a:ext cx="0" cy="0"/>
+          <a:chOff x="0" y="0"/>
+          <a:chExt cx="0" cy="0"/>
+        </a:xfrm>
+      </p:grpSpPr>
+      <p:pic>
+        <p:nvPicPr>
+          <p:cNvPr id="4" name="Picture 3">
+            <a:extLst>
+              <a:ext uri="{FF2B5EF4-FFF2-40B4-BE49-F238E27FC236}">
+                <a16:creationId xmlns:a16="http://schemas.microsoft.com/office/drawing/2014/main" id="{C17E29A5-B40E-47C7-96F0-C2897EAB0953}"/>
+              </a:ext>
+            </a:extLst>
+          </p:cNvPr>
+          <p:cNvPicPr>
+            <a:picLocks noChangeAspect="1"/>
+          </p:cNvPicPr>
+          <p:nvPr/>
+        </p:nvPicPr>
+        <p:blipFill>
+          <a:blip r:embed="rId2"/>
+          <a:stretch>
+            <a:fillRect/>
+          </a:stretch>
+        </p:blipFill>
+        <p:spPr>
+          <a:xfrm>
+            <a:off x="1266825" y="1571625"/>
+            <a:ext cx="9658350" cy="3714750"/>
+          </a:xfrm>
+          <a:prstGeom prst="rect">
+            <a:avLst/>
+          </a:prstGeom>
+        </p:spPr>
+      </p:pic>
+      <p:sp>
+        <p:nvSpPr>
+          <p:cNvPr id="5" name="TextBox 4">
+            <a:extLst>
+              <a:ext uri="{FF2B5EF4-FFF2-40B4-BE49-F238E27FC236}">
+                <a16:creationId xmlns:a16="http://schemas.microsoft.com/office/drawing/2014/main" id="{F4D39868-E037-4C08-A94D-735A792DFC11}"/>
+              </a:ext>
+            </a:extLst>
+          </p:cNvPr>
+          <p:cNvSpPr txBox="1"/>
+          <p:nvPr/>
+        </p:nvSpPr>
+        <p:spPr>
+          <a:xfrm>
+            <a:off x="430823" y="6154615"/>
+            <a:ext cx="6456832" cy="369332"/>
+          </a:xfrm>
+          <a:prstGeom prst="rect">
+            <a:avLst/>
+          </a:prstGeom>
+          <a:noFill/>
+        </p:spPr>
+        <p:txBody>
+          <a:bodyPr wrap="none" rtlCol="0">
+            <a:spAutoFit/>
+          </a:bodyPr>
+          <a:lstStyle/>
+          <a:p>
+            <a:r>
+              <a:rPr lang="en-US" dirty="0"/>
+              <a:t>https://matlab1.com/support-vector-machine-speech-recognition/</a:t>
+            </a:r>
+          </a:p>
+        </p:txBody>
+      </p:sp>
+    </p:spTree>
+    <p:extLst>
+      <p:ext uri="{BB962C8B-B14F-4D97-AF65-F5344CB8AC3E}">
+        <p14:creationId xmlns:p14="http://schemas.microsoft.com/office/powerpoint/2010/main" val="2544642664"/>
+      </p:ext>
+    </p:extLst>
+  </p:cSld>
+  <p:clrMapOvr>
+    <a:masterClrMapping/>
+  </p:clrMapOvr>
+</p:sld>
+</file>
+
+<file path=ppt/slides/slide17.xml><?xml version="1.0" encoding="utf-8"?>
+<p:sld xmlns:a="http://schemas.openxmlformats.org/drawingml/2006/main" xmlns:r="http://schemas.openxmlformats.org/officeDocument/2006/relationships" xmlns:p="http://schemas.openxmlformats.org/presentationml/2006/main">
+  <p:cSld>
+    <p:spTree>
+      <p:nvGrpSpPr>
+        <p:cNvPr id="1" name=""/>
+        <p:cNvGrpSpPr/>
+        <p:nvPr/>
+      </p:nvGrpSpPr>
+      <p:grpSpPr>
+        <a:xfrm>
+          <a:off x="0" y="0"/>
+          <a:ext cx="0" cy="0"/>
+          <a:chOff x="0" y="0"/>
+          <a:chExt cx="0" cy="0"/>
+        </a:xfrm>
+      </p:grpSpPr>
+      <p:pic>
+        <p:nvPicPr>
+          <p:cNvPr id="4" name="Picture 3">
+            <a:extLst>
+              <a:ext uri="{FF2B5EF4-FFF2-40B4-BE49-F238E27FC236}">
+                <a16:creationId xmlns:a16="http://schemas.microsoft.com/office/drawing/2014/main" id="{451AEF2C-32A6-4B2E-8CC2-6C3D0C0EE35B}"/>
+              </a:ext>
+            </a:extLst>
+          </p:cNvPr>
+          <p:cNvPicPr>
+            <a:picLocks noChangeAspect="1"/>
+          </p:cNvPicPr>
+          <p:nvPr/>
+        </p:nvPicPr>
+        <p:blipFill>
+          <a:blip r:embed="rId2"/>
+          <a:stretch>
+            <a:fillRect/>
+          </a:stretch>
+        </p:blipFill>
+        <p:spPr>
+          <a:xfrm>
+            <a:off x="2419419" y="0"/>
+            <a:ext cx="6135496" cy="5722332"/>
+          </a:xfrm>
+          <a:prstGeom prst="rect">
+            <a:avLst/>
+          </a:prstGeom>
+        </p:spPr>
+      </p:pic>
+      <p:sp>
+        <p:nvSpPr>
+          <p:cNvPr id="5" name="TextBox 4">
+            <a:extLst>
+              <a:ext uri="{FF2B5EF4-FFF2-40B4-BE49-F238E27FC236}">
+                <a16:creationId xmlns:a16="http://schemas.microsoft.com/office/drawing/2014/main" id="{FC66C0DD-0284-475D-90F8-9B7873CBBDF4}"/>
+              </a:ext>
+            </a:extLst>
+          </p:cNvPr>
+          <p:cNvSpPr txBox="1"/>
+          <p:nvPr/>
+        </p:nvSpPr>
+        <p:spPr>
+          <a:xfrm>
+            <a:off x="483577" y="6471138"/>
+            <a:ext cx="6257162" cy="369332"/>
+          </a:xfrm>
+          <a:prstGeom prst="rect">
+            <a:avLst/>
+          </a:prstGeom>
+          <a:noFill/>
+        </p:spPr>
+        <p:txBody>
+          <a:bodyPr wrap="none" rtlCol="0">
+            <a:spAutoFit/>
+          </a:bodyPr>
+          <a:lstStyle/>
+          <a:p>
+            <a:r>
+              <a:rPr lang="en-US" dirty="0"/>
+              <a:t>https://play.google.com/store/apps/details?id=com.textsprecher</a:t>
+            </a:r>
+          </a:p>
+        </p:txBody>
+      </p:sp>
+    </p:spTree>
+    <p:extLst>
+      <p:ext uri="{BB962C8B-B14F-4D97-AF65-F5344CB8AC3E}">
+        <p14:creationId xmlns:p14="http://schemas.microsoft.com/office/powerpoint/2010/main" val="2552070382"/>
+      </p:ext>
+    </p:extLst>
+  </p:cSld>
+  <p:clrMapOvr>
+    <a:masterClrMapping/>
+  </p:clrMapOvr>
+</p:sld>
+</file>
+
+<file path=ppt/slides/slide18.xml><?xml version="1.0" encoding="utf-8"?>
+<p:sld xmlns:a="http://schemas.openxmlformats.org/drawingml/2006/main" xmlns:r="http://schemas.openxmlformats.org/officeDocument/2006/relationships" xmlns:p="http://schemas.openxmlformats.org/presentationml/2006/main">
+  <p:cSld>
+    <p:spTree>
+      <p:nvGrpSpPr>
+        <p:cNvPr id="1" name=""/>
+        <p:cNvGrpSpPr/>
+        <p:nvPr/>
+      </p:nvGrpSpPr>
+      <p:grpSpPr>
+        <a:xfrm>
+          <a:off x="0" y="0"/>
+          <a:ext cx="0" cy="0"/>
+          <a:chOff x="0" y="0"/>
+          <a:chExt cx="0" cy="0"/>
+        </a:xfrm>
+      </p:grpSpPr>
+      <p:sp>
+        <p:nvSpPr>
+          <p:cNvPr id="2" name="Title 1">
+            <a:extLst>
+              <a:ext uri="{FF2B5EF4-FFF2-40B4-BE49-F238E27FC236}">
+                <a16:creationId xmlns:a16="http://schemas.microsoft.com/office/drawing/2014/main" id="{8BBBF60A-A59A-4A8F-802E-477EB955F406}"/>
+              </a:ext>
+            </a:extLst>
+          </p:cNvPr>
+          <p:cNvSpPr>
+            <a:spLocks noGrp="1"/>
+          </p:cNvSpPr>
+          <p:nvPr>
+            <p:ph type="title"/>
+          </p:nvPr>
+        </p:nvSpPr>
+        <p:spPr/>
+        <p:txBody>
+          <a:bodyPr/>
+          <a:lstStyle/>
+          <a:p>
+            <a:r>
+              <a:rPr lang="en-US" dirty="0"/>
+              <a:t>What makes it difficult?</a:t>
+            </a:r>
+          </a:p>
+        </p:txBody>
+      </p:sp>
+      <p:sp>
+        <p:nvSpPr>
+          <p:cNvPr id="3" name="Content Placeholder 2">
+            <a:extLst>
+              <a:ext uri="{FF2B5EF4-FFF2-40B4-BE49-F238E27FC236}">
+                <a16:creationId xmlns:a16="http://schemas.microsoft.com/office/drawing/2014/main" id="{B303CBB5-711E-4E04-996B-148A5EA62206}"/>
+              </a:ext>
+            </a:extLst>
+          </p:cNvPr>
+          <p:cNvSpPr>
+            <a:spLocks noGrp="1"/>
+          </p:cNvSpPr>
+          <p:nvPr>
+            <p:ph idx="1"/>
+          </p:nvPr>
+        </p:nvSpPr>
+        <p:spPr/>
+        <p:txBody>
+          <a:bodyPr/>
+          <a:lstStyle/>
+          <a:p>
+            <a:endParaRPr lang="en-US"/>
+          </a:p>
+        </p:txBody>
+      </p:sp>
+    </p:spTree>
+    <p:extLst>
+      <p:ext uri="{BB962C8B-B14F-4D97-AF65-F5344CB8AC3E}">
+        <p14:creationId xmlns:p14="http://schemas.microsoft.com/office/powerpoint/2010/main" val="4101368341"/>
+      </p:ext>
+    </p:extLst>
+  </p:cSld>
+  <p:clrMapOvr>
+    <a:masterClrMapping/>
+  </p:clrMapOvr>
+</p:sld>
+</file>
+
+<file path=ppt/slides/slide19.xml><?xml version="1.0" encoding="utf-8"?>
+<p:sld xmlns:a="http://schemas.openxmlformats.org/drawingml/2006/main" xmlns:r="http://schemas.openxmlformats.org/officeDocument/2006/relationships" xmlns:p="http://schemas.openxmlformats.org/presentationml/2006/main">
+  <p:cSld>
+    <p:spTree>
+      <p:nvGrpSpPr>
+        <p:cNvPr id="1" name=""/>
+        <p:cNvGrpSpPr/>
+        <p:nvPr/>
+      </p:nvGrpSpPr>
+      <p:grpSpPr>
+        <a:xfrm>
+          <a:off x="0" y="0"/>
+          <a:ext cx="0" cy="0"/>
+          <a:chOff x="0" y="0"/>
+          <a:chExt cx="0" cy="0"/>
+        </a:xfrm>
+      </p:grpSpPr>
+      <p:pic>
+        <p:nvPicPr>
+          <p:cNvPr id="4" name="Picture 3">
+            <a:extLst>
+              <a:ext uri="{FF2B5EF4-FFF2-40B4-BE49-F238E27FC236}">
+                <a16:creationId xmlns:a16="http://schemas.microsoft.com/office/drawing/2014/main" id="{F9EDDD69-1AAA-4D13-8D3C-07F3F4E8E72A}"/>
+              </a:ext>
+            </a:extLst>
+          </p:cNvPr>
+          <p:cNvPicPr>
+            <a:picLocks noChangeAspect="1"/>
+          </p:cNvPicPr>
+          <p:nvPr/>
+        </p:nvPicPr>
+        <p:blipFill>
+          <a:blip r:embed="rId2"/>
+          <a:stretch>
+            <a:fillRect/>
+          </a:stretch>
+        </p:blipFill>
+        <p:spPr>
+          <a:xfrm>
+            <a:off x="2028825" y="1800225"/>
+            <a:ext cx="8134350" cy="3257550"/>
+          </a:xfrm>
+          <a:prstGeom prst="rect">
+            <a:avLst/>
+          </a:prstGeom>
+        </p:spPr>
+      </p:pic>
+      <p:sp>
+        <p:nvSpPr>
+          <p:cNvPr id="5" name="TextBox 4">
+            <a:extLst>
+              <a:ext uri="{FF2B5EF4-FFF2-40B4-BE49-F238E27FC236}">
+                <a16:creationId xmlns:a16="http://schemas.microsoft.com/office/drawing/2014/main" id="{CF3D27C3-9D27-4EC5-A809-C40A0E54E486}"/>
+              </a:ext>
+            </a:extLst>
+          </p:cNvPr>
+          <p:cNvSpPr txBox="1"/>
+          <p:nvPr/>
+        </p:nvSpPr>
+        <p:spPr>
+          <a:xfrm>
+            <a:off x="448408" y="6330462"/>
+            <a:ext cx="9098453" cy="369332"/>
+          </a:xfrm>
+          <a:prstGeom prst="rect">
+            <a:avLst/>
+          </a:prstGeom>
+          <a:noFill/>
+        </p:spPr>
+        <p:txBody>
+          <a:bodyPr wrap="none" rtlCol="0">
+            <a:spAutoFit/>
+          </a:bodyPr>
+          <a:lstStyle/>
+          <a:p>
+            <a:r>
+              <a:rPr lang="en-US" dirty="0"/>
+              <a:t>https://www.ecenglish.com/en/social/blog/ec-central/2015/11/23/vocab-review-homophones</a:t>
+            </a:r>
+          </a:p>
+        </p:txBody>
+      </p:sp>
+    </p:spTree>
+    <p:extLst>
+      <p:ext uri="{BB962C8B-B14F-4D97-AF65-F5344CB8AC3E}">
+        <p14:creationId xmlns:p14="http://schemas.microsoft.com/office/powerpoint/2010/main" val="2355477888"/>
+      </p:ext>
+    </p:extLst>
+  </p:cSld>
+  <p:clrMapOvr>
+    <a:masterClrMapping/>
+  </p:clrMapOvr>
+</p:sld>
+</file>
+
 <file path=ppt/slides/slide2.xml><?xml version="1.0" encoding="utf-8"?>
 <p:sld xmlns:a="http://schemas.openxmlformats.org/drawingml/2006/main" xmlns:r="http://schemas.openxmlformats.org/officeDocument/2006/relationships" xmlns:p="http://schemas.openxmlformats.org/presentationml/2006/main">
   <p:cSld>
@@ -3497,6 +5121,905 @@
     <p:extLst>
       <p:ext uri="{BB962C8B-B14F-4D97-AF65-F5344CB8AC3E}">
         <p14:creationId xmlns:p14="http://schemas.microsoft.com/office/powerpoint/2010/main" val="2882556055"/>
+      </p:ext>
+    </p:extLst>
+  </p:cSld>
+  <p:clrMapOvr>
+    <a:masterClrMapping/>
+  </p:clrMapOvr>
+</p:sld>
+</file>
+
+<file path=ppt/slides/slide20.xml><?xml version="1.0" encoding="utf-8"?>
+<p:sld xmlns:a="http://schemas.openxmlformats.org/drawingml/2006/main" xmlns:r="http://schemas.openxmlformats.org/officeDocument/2006/relationships" xmlns:p="http://schemas.openxmlformats.org/presentationml/2006/main">
+  <p:cSld>
+    <p:spTree>
+      <p:nvGrpSpPr>
+        <p:cNvPr id="1" name=""/>
+        <p:cNvGrpSpPr/>
+        <p:nvPr/>
+      </p:nvGrpSpPr>
+      <p:grpSpPr>
+        <a:xfrm>
+          <a:off x="0" y="0"/>
+          <a:ext cx="0" cy="0"/>
+          <a:chOff x="0" y="0"/>
+          <a:chExt cx="0" cy="0"/>
+        </a:xfrm>
+      </p:grpSpPr>
+      <p:pic>
+        <p:nvPicPr>
+          <p:cNvPr id="4" name="Picture 3">
+            <a:extLst>
+              <a:ext uri="{FF2B5EF4-FFF2-40B4-BE49-F238E27FC236}">
+                <a16:creationId xmlns:a16="http://schemas.microsoft.com/office/drawing/2014/main" id="{41D278D4-2C5B-494B-AB66-6D253259F140}"/>
+              </a:ext>
+            </a:extLst>
+          </p:cNvPr>
+          <p:cNvPicPr>
+            <a:picLocks noChangeAspect="1"/>
+          </p:cNvPicPr>
+          <p:nvPr/>
+        </p:nvPicPr>
+        <p:blipFill rotWithShape="1">
+          <a:blip r:embed="rId2"/>
+          <a:srcRect l="3395" t="3036" r="2385" b="1957"/>
+          <a:stretch/>
+        </p:blipFill>
+        <p:spPr>
+          <a:xfrm>
+            <a:off x="3525715" y="1899138"/>
+            <a:ext cx="5196254" cy="3094894"/>
+          </a:xfrm>
+          <a:prstGeom prst="rect">
+            <a:avLst/>
+          </a:prstGeom>
+        </p:spPr>
+      </p:pic>
+      <p:sp>
+        <p:nvSpPr>
+          <p:cNvPr id="5" name="TextBox 4">
+            <a:extLst>
+              <a:ext uri="{FF2B5EF4-FFF2-40B4-BE49-F238E27FC236}">
+                <a16:creationId xmlns:a16="http://schemas.microsoft.com/office/drawing/2014/main" id="{78FA4BBC-7265-415E-B858-07A6F8B9F093}"/>
+              </a:ext>
+            </a:extLst>
+          </p:cNvPr>
+          <p:cNvSpPr txBox="1"/>
+          <p:nvPr/>
+        </p:nvSpPr>
+        <p:spPr>
+          <a:xfrm>
+            <a:off x="228600" y="6506308"/>
+            <a:ext cx="7964744" cy="369332"/>
+          </a:xfrm>
+          <a:prstGeom prst="rect">
+            <a:avLst/>
+          </a:prstGeom>
+          <a:noFill/>
+        </p:spPr>
+        <p:txBody>
+          <a:bodyPr wrap="none" rtlCol="0">
+            <a:spAutoFit/>
+          </a:bodyPr>
+          <a:lstStyle/>
+          <a:p>
+            <a:r>
+              <a:rPr lang="en-US" dirty="0"/>
+              <a:t>https://i.pinimg.com/originals/0a/92/15/0a921501fa2c6ad60f2e7cde0c8e90a4.jpg</a:t>
+            </a:r>
+          </a:p>
+        </p:txBody>
+      </p:sp>
+    </p:spTree>
+    <p:extLst>
+      <p:ext uri="{BB962C8B-B14F-4D97-AF65-F5344CB8AC3E}">
+        <p14:creationId xmlns:p14="http://schemas.microsoft.com/office/powerpoint/2010/main" val="2504991572"/>
+      </p:ext>
+    </p:extLst>
+  </p:cSld>
+  <p:clrMapOvr>
+    <a:masterClrMapping/>
+  </p:clrMapOvr>
+</p:sld>
+</file>
+
+<file path=ppt/slides/slide21.xml><?xml version="1.0" encoding="utf-8"?>
+<p:sld xmlns:a="http://schemas.openxmlformats.org/drawingml/2006/main" xmlns:r="http://schemas.openxmlformats.org/officeDocument/2006/relationships" xmlns:p="http://schemas.openxmlformats.org/presentationml/2006/main">
+  <p:cSld>
+    <p:spTree>
+      <p:nvGrpSpPr>
+        <p:cNvPr id="1" name=""/>
+        <p:cNvGrpSpPr/>
+        <p:nvPr/>
+      </p:nvGrpSpPr>
+      <p:grpSpPr>
+        <a:xfrm>
+          <a:off x="0" y="0"/>
+          <a:ext cx="0" cy="0"/>
+          <a:chOff x="0" y="0"/>
+          <a:chExt cx="0" cy="0"/>
+        </a:xfrm>
+      </p:grpSpPr>
+      <p:pic>
+        <p:nvPicPr>
+          <p:cNvPr id="5" name="Picture 4">
+            <a:extLst>
+              <a:ext uri="{FF2B5EF4-FFF2-40B4-BE49-F238E27FC236}">
+                <a16:creationId xmlns:a16="http://schemas.microsoft.com/office/drawing/2014/main" id="{DB75139E-59B5-4025-9056-F784BFDB105B}"/>
+              </a:ext>
+            </a:extLst>
+          </p:cNvPr>
+          <p:cNvPicPr>
+            <a:picLocks noChangeAspect="1"/>
+          </p:cNvPicPr>
+          <p:nvPr/>
+        </p:nvPicPr>
+        <p:blipFill>
+          <a:blip r:embed="rId2"/>
+          <a:stretch>
+            <a:fillRect/>
+          </a:stretch>
+        </p:blipFill>
+        <p:spPr>
+          <a:xfrm>
+            <a:off x="2076450" y="1771650"/>
+            <a:ext cx="8039100" cy="3314700"/>
+          </a:xfrm>
+          <a:prstGeom prst="rect">
+            <a:avLst/>
+          </a:prstGeom>
+        </p:spPr>
+      </p:pic>
+      <p:sp>
+        <p:nvSpPr>
+          <p:cNvPr id="6" name="TextBox 5">
+            <a:extLst>
+              <a:ext uri="{FF2B5EF4-FFF2-40B4-BE49-F238E27FC236}">
+                <a16:creationId xmlns:a16="http://schemas.microsoft.com/office/drawing/2014/main" id="{B5B06D9A-3C66-477E-9B87-3F4F0FC6354B}"/>
+              </a:ext>
+            </a:extLst>
+          </p:cNvPr>
+          <p:cNvSpPr txBox="1"/>
+          <p:nvPr/>
+        </p:nvSpPr>
+        <p:spPr>
+          <a:xfrm>
+            <a:off x="395654" y="6145823"/>
+            <a:ext cx="9515746" cy="369332"/>
+          </a:xfrm>
+          <a:prstGeom prst="rect">
+            <a:avLst/>
+          </a:prstGeom>
+          <a:noFill/>
+        </p:spPr>
+        <p:txBody>
+          <a:bodyPr wrap="none" rtlCol="0">
+            <a:spAutoFit/>
+          </a:bodyPr>
+          <a:lstStyle/>
+          <a:p>
+            <a:r>
+              <a:rPr lang="en-US" dirty="0"/>
+              <a:t>https://www.ecenglish.com/learnenglish/lessons/homonyms-words-have-more-one-meaning-spirit</a:t>
+            </a:r>
+          </a:p>
+        </p:txBody>
+      </p:sp>
+    </p:spTree>
+    <p:extLst>
+      <p:ext uri="{BB962C8B-B14F-4D97-AF65-F5344CB8AC3E}">
+        <p14:creationId xmlns:p14="http://schemas.microsoft.com/office/powerpoint/2010/main" val="2383108186"/>
+      </p:ext>
+    </p:extLst>
+  </p:cSld>
+  <p:clrMapOvr>
+    <a:masterClrMapping/>
+  </p:clrMapOvr>
+</p:sld>
+</file>
+
+<file path=ppt/slides/slide22.xml><?xml version="1.0" encoding="utf-8"?>
+<p:sld xmlns:a="http://schemas.openxmlformats.org/drawingml/2006/main" xmlns:r="http://schemas.openxmlformats.org/officeDocument/2006/relationships" xmlns:p="http://schemas.openxmlformats.org/presentationml/2006/main">
+  <p:cSld>
+    <p:spTree>
+      <p:nvGrpSpPr>
+        <p:cNvPr id="1" name=""/>
+        <p:cNvGrpSpPr/>
+        <p:nvPr/>
+      </p:nvGrpSpPr>
+      <p:grpSpPr>
+        <a:xfrm>
+          <a:off x="0" y="0"/>
+          <a:ext cx="0" cy="0"/>
+          <a:chOff x="0" y="0"/>
+          <a:chExt cx="0" cy="0"/>
+        </a:xfrm>
+      </p:grpSpPr>
+      <p:pic>
+        <p:nvPicPr>
+          <p:cNvPr id="4" name="Picture 3">
+            <a:extLst>
+              <a:ext uri="{FF2B5EF4-FFF2-40B4-BE49-F238E27FC236}">
+                <a16:creationId xmlns:a16="http://schemas.microsoft.com/office/drawing/2014/main" id="{3266FED9-B841-405E-B0DA-0FDC676C53AC}"/>
+              </a:ext>
+            </a:extLst>
+          </p:cNvPr>
+          <p:cNvPicPr>
+            <a:picLocks noChangeAspect="1"/>
+          </p:cNvPicPr>
+          <p:nvPr/>
+        </p:nvPicPr>
+        <p:blipFill>
+          <a:blip r:embed="rId3"/>
+          <a:stretch>
+            <a:fillRect/>
+          </a:stretch>
+        </p:blipFill>
+        <p:spPr>
+          <a:xfrm>
+            <a:off x="1619250" y="2147746"/>
+            <a:ext cx="8953500" cy="1704975"/>
+          </a:xfrm>
+          <a:prstGeom prst="rect">
+            <a:avLst/>
+          </a:prstGeom>
+        </p:spPr>
+      </p:pic>
+      <p:sp>
+        <p:nvSpPr>
+          <p:cNvPr id="5" name="TextBox 4">
+            <a:extLst>
+              <a:ext uri="{FF2B5EF4-FFF2-40B4-BE49-F238E27FC236}">
+                <a16:creationId xmlns:a16="http://schemas.microsoft.com/office/drawing/2014/main" id="{9A65AE85-A909-4957-AB4C-77EF45F708B1}"/>
+              </a:ext>
+            </a:extLst>
+          </p:cNvPr>
+          <p:cNvSpPr txBox="1"/>
+          <p:nvPr/>
+        </p:nvSpPr>
+        <p:spPr>
+          <a:xfrm>
+            <a:off x="316523" y="6462346"/>
+            <a:ext cx="10097188" cy="369332"/>
+          </a:xfrm>
+          <a:prstGeom prst="rect">
+            <a:avLst/>
+          </a:prstGeom>
+          <a:noFill/>
+        </p:spPr>
+        <p:txBody>
+          <a:bodyPr wrap="none" rtlCol="0">
+            <a:spAutoFit/>
+          </a:bodyPr>
+          <a:lstStyle/>
+          <a:p>
+            <a:r>
+              <a:rPr lang="en-US" dirty="0"/>
+              <a:t>http://what-when-how.com/how-to-build-a-digital-library/word-segmentation-and-sorting-digital-library/</a:t>
+            </a:r>
+          </a:p>
+        </p:txBody>
+      </p:sp>
+    </p:spTree>
+    <p:extLst>
+      <p:ext uri="{BB962C8B-B14F-4D97-AF65-F5344CB8AC3E}">
+        <p14:creationId xmlns:p14="http://schemas.microsoft.com/office/powerpoint/2010/main" val="542386749"/>
+      </p:ext>
+    </p:extLst>
+  </p:cSld>
+  <p:clrMapOvr>
+    <a:masterClrMapping/>
+  </p:clrMapOvr>
+</p:sld>
+</file>
+
+<file path=ppt/slides/slide23.xml><?xml version="1.0" encoding="utf-8"?>
+<p:sld xmlns:a="http://schemas.openxmlformats.org/drawingml/2006/main" xmlns:r="http://schemas.openxmlformats.org/officeDocument/2006/relationships" xmlns:p="http://schemas.openxmlformats.org/presentationml/2006/main">
+  <p:cSld>
+    <p:spTree>
+      <p:nvGrpSpPr>
+        <p:cNvPr id="1" name=""/>
+        <p:cNvGrpSpPr/>
+        <p:nvPr/>
+      </p:nvGrpSpPr>
+      <p:grpSpPr>
+        <a:xfrm>
+          <a:off x="0" y="0"/>
+          <a:ext cx="0" cy="0"/>
+          <a:chOff x="0" y="0"/>
+          <a:chExt cx="0" cy="0"/>
+        </a:xfrm>
+      </p:grpSpPr>
+      <p:pic>
+        <p:nvPicPr>
+          <p:cNvPr id="4" name="Picture 3">
+            <a:extLst>
+              <a:ext uri="{FF2B5EF4-FFF2-40B4-BE49-F238E27FC236}">
+                <a16:creationId xmlns:a16="http://schemas.microsoft.com/office/drawing/2014/main" id="{F3F60A23-0333-45C8-AE52-A13F1A814A13}"/>
+              </a:ext>
+            </a:extLst>
+          </p:cNvPr>
+          <p:cNvPicPr>
+            <a:picLocks noChangeAspect="1"/>
+          </p:cNvPicPr>
+          <p:nvPr/>
+        </p:nvPicPr>
+        <p:blipFill>
+          <a:blip r:embed="rId2"/>
+          <a:stretch>
+            <a:fillRect/>
+          </a:stretch>
+        </p:blipFill>
+        <p:spPr>
+          <a:xfrm>
+            <a:off x="3152775" y="1924050"/>
+            <a:ext cx="5886450" cy="3009900"/>
+          </a:xfrm>
+          <a:prstGeom prst="rect">
+            <a:avLst/>
+          </a:prstGeom>
+        </p:spPr>
+      </p:pic>
+      <p:sp>
+        <p:nvSpPr>
+          <p:cNvPr id="5" name="TextBox 4">
+            <a:extLst>
+              <a:ext uri="{FF2B5EF4-FFF2-40B4-BE49-F238E27FC236}">
+                <a16:creationId xmlns:a16="http://schemas.microsoft.com/office/drawing/2014/main" id="{52382646-EBE0-43C9-8D28-31CD730C0C1D}"/>
+              </a:ext>
+            </a:extLst>
+          </p:cNvPr>
+          <p:cNvSpPr txBox="1"/>
+          <p:nvPr/>
+        </p:nvSpPr>
+        <p:spPr>
+          <a:xfrm>
+            <a:off x="290146" y="6268915"/>
+            <a:ext cx="7716921" cy="369332"/>
+          </a:xfrm>
+          <a:prstGeom prst="rect">
+            <a:avLst/>
+          </a:prstGeom>
+          <a:noFill/>
+        </p:spPr>
+        <p:txBody>
+          <a:bodyPr wrap="none" rtlCol="0">
+            <a:spAutoFit/>
+          </a:bodyPr>
+          <a:lstStyle/>
+          <a:p>
+            <a:r>
+              <a:rPr lang="en-US" dirty="0"/>
+              <a:t>http://onthesannyside.blogspot.com/2015/08/fun-with-dangling-modifiers.html</a:t>
+            </a:r>
+          </a:p>
+        </p:txBody>
+      </p:sp>
+    </p:spTree>
+    <p:extLst>
+      <p:ext uri="{BB962C8B-B14F-4D97-AF65-F5344CB8AC3E}">
+        <p14:creationId xmlns:p14="http://schemas.microsoft.com/office/powerpoint/2010/main" val="1947087966"/>
+      </p:ext>
+    </p:extLst>
+  </p:cSld>
+  <p:clrMapOvr>
+    <a:masterClrMapping/>
+  </p:clrMapOvr>
+</p:sld>
+</file>
+
+<file path=ppt/slides/slide24.xml><?xml version="1.0" encoding="utf-8"?>
+<p:sld xmlns:a="http://schemas.openxmlformats.org/drawingml/2006/main" xmlns:r="http://schemas.openxmlformats.org/officeDocument/2006/relationships" xmlns:p="http://schemas.openxmlformats.org/presentationml/2006/main">
+  <p:cSld>
+    <p:spTree>
+      <p:nvGrpSpPr>
+        <p:cNvPr id="1" name=""/>
+        <p:cNvGrpSpPr/>
+        <p:nvPr/>
+      </p:nvGrpSpPr>
+      <p:grpSpPr>
+        <a:xfrm>
+          <a:off x="0" y="0"/>
+          <a:ext cx="0" cy="0"/>
+          <a:chOff x="0" y="0"/>
+          <a:chExt cx="0" cy="0"/>
+        </a:xfrm>
+      </p:grpSpPr>
+      <p:sp>
+        <p:nvSpPr>
+          <p:cNvPr id="2" name="Title 1">
+            <a:extLst>
+              <a:ext uri="{FF2B5EF4-FFF2-40B4-BE49-F238E27FC236}">
+                <a16:creationId xmlns:a16="http://schemas.microsoft.com/office/drawing/2014/main" id="{427EAC03-12FC-4596-8253-3F44D0C617D1}"/>
+              </a:ext>
+            </a:extLst>
+          </p:cNvPr>
+          <p:cNvSpPr>
+            <a:spLocks noGrp="1"/>
+          </p:cNvSpPr>
+          <p:nvPr>
+            <p:ph type="title"/>
+          </p:nvPr>
+        </p:nvSpPr>
+        <p:spPr/>
+        <p:txBody>
+          <a:bodyPr/>
+          <a:lstStyle/>
+          <a:p>
+            <a:r>
+              <a:rPr lang="en-US" dirty="0"/>
+              <a:t>TODO</a:t>
+            </a:r>
+          </a:p>
+        </p:txBody>
+      </p:sp>
+      <p:sp>
+        <p:nvSpPr>
+          <p:cNvPr id="3" name="Content Placeholder 2">
+            <a:extLst>
+              <a:ext uri="{FF2B5EF4-FFF2-40B4-BE49-F238E27FC236}">
+                <a16:creationId xmlns:a16="http://schemas.microsoft.com/office/drawing/2014/main" id="{FD82E601-B22D-4EEC-9A0F-9F94626A17F3}"/>
+              </a:ext>
+            </a:extLst>
+          </p:cNvPr>
+          <p:cNvSpPr>
+            <a:spLocks noGrp="1"/>
+          </p:cNvSpPr>
+          <p:nvPr>
+            <p:ph idx="1"/>
+          </p:nvPr>
+        </p:nvSpPr>
+        <p:spPr/>
+        <p:txBody>
+          <a:bodyPr/>
+          <a:lstStyle/>
+          <a:p>
+            <a:r>
+              <a:rPr lang="en-US" dirty="0"/>
+              <a:t>Ambiguous sentences: https://www.teatime-mag.com/magazines/wp-content/themes/tt/print/teatime61/print.pdf</a:t>
+            </a:r>
+          </a:p>
+        </p:txBody>
+      </p:sp>
+    </p:spTree>
+    <p:extLst>
+      <p:ext uri="{BB962C8B-B14F-4D97-AF65-F5344CB8AC3E}">
+        <p14:creationId xmlns:p14="http://schemas.microsoft.com/office/powerpoint/2010/main" val="3284493440"/>
+      </p:ext>
+    </p:extLst>
+  </p:cSld>
+  <p:clrMapOvr>
+    <a:masterClrMapping/>
+  </p:clrMapOvr>
+</p:sld>
+</file>
+
+<file path=ppt/slides/slide25.xml><?xml version="1.0" encoding="utf-8"?>
+<p:sld xmlns:a="http://schemas.openxmlformats.org/drawingml/2006/main" xmlns:r="http://schemas.openxmlformats.org/officeDocument/2006/relationships" xmlns:p="http://schemas.openxmlformats.org/presentationml/2006/main">
+  <p:cSld>
+    <p:spTree>
+      <p:nvGrpSpPr>
+        <p:cNvPr id="1" name=""/>
+        <p:cNvGrpSpPr/>
+        <p:nvPr/>
+      </p:nvGrpSpPr>
+      <p:grpSpPr>
+        <a:xfrm>
+          <a:off x="0" y="0"/>
+          <a:ext cx="0" cy="0"/>
+          <a:chOff x="0" y="0"/>
+          <a:chExt cx="0" cy="0"/>
+        </a:xfrm>
+      </p:grpSpPr>
+      <p:sp>
+        <p:nvSpPr>
+          <p:cNvPr id="2" name="Title 1">
+            <a:extLst>
+              <a:ext uri="{FF2B5EF4-FFF2-40B4-BE49-F238E27FC236}">
+                <a16:creationId xmlns:a16="http://schemas.microsoft.com/office/drawing/2014/main" id="{18A90EB0-8369-4399-91E0-FA372BB7FCCD}"/>
+              </a:ext>
+            </a:extLst>
+          </p:cNvPr>
+          <p:cNvSpPr>
+            <a:spLocks noGrp="1"/>
+          </p:cNvSpPr>
+          <p:nvPr>
+            <p:ph type="title"/>
+          </p:nvPr>
+        </p:nvSpPr>
+        <p:spPr/>
+        <p:txBody>
+          <a:bodyPr/>
+          <a:lstStyle/>
+          <a:p>
+            <a:r>
+              <a:rPr lang="en-US" dirty="0"/>
+              <a:t>How does it work?</a:t>
+            </a:r>
+          </a:p>
+        </p:txBody>
+      </p:sp>
+      <p:sp>
+        <p:nvSpPr>
+          <p:cNvPr id="3" name="Text Placeholder 2">
+            <a:extLst>
+              <a:ext uri="{FF2B5EF4-FFF2-40B4-BE49-F238E27FC236}">
+                <a16:creationId xmlns:a16="http://schemas.microsoft.com/office/drawing/2014/main" id="{65C440A8-BD6B-4E31-9859-636FAB8718D2}"/>
+              </a:ext>
+            </a:extLst>
+          </p:cNvPr>
+          <p:cNvSpPr>
+            <a:spLocks noGrp="1"/>
+          </p:cNvSpPr>
+          <p:nvPr>
+            <p:ph type="body" idx="1"/>
+          </p:nvPr>
+        </p:nvSpPr>
+        <p:spPr/>
+        <p:txBody>
+          <a:bodyPr/>
+          <a:lstStyle/>
+          <a:p>
+            <a:r>
+              <a:rPr lang="en-US" dirty="0"/>
+              <a:t>…and how can we make it work?</a:t>
+            </a:r>
+          </a:p>
+        </p:txBody>
+      </p:sp>
+    </p:spTree>
+    <p:extLst>
+      <p:ext uri="{BB962C8B-B14F-4D97-AF65-F5344CB8AC3E}">
+        <p14:creationId xmlns:p14="http://schemas.microsoft.com/office/powerpoint/2010/main" val="1449710088"/>
+      </p:ext>
+    </p:extLst>
+  </p:cSld>
+  <p:clrMapOvr>
+    <a:masterClrMapping/>
+  </p:clrMapOvr>
+</p:sld>
+</file>
+
+<file path=ppt/slides/slide26.xml><?xml version="1.0" encoding="utf-8"?>
+<p:sld xmlns:a="http://schemas.openxmlformats.org/drawingml/2006/main" xmlns:r="http://schemas.openxmlformats.org/officeDocument/2006/relationships" xmlns:p="http://schemas.openxmlformats.org/presentationml/2006/main">
+  <p:cSld>
+    <p:spTree>
+      <p:nvGrpSpPr>
+        <p:cNvPr id="1" name=""/>
+        <p:cNvGrpSpPr/>
+        <p:nvPr/>
+      </p:nvGrpSpPr>
+      <p:grpSpPr>
+        <a:xfrm>
+          <a:off x="0" y="0"/>
+          <a:ext cx="0" cy="0"/>
+          <a:chOff x="0" y="0"/>
+          <a:chExt cx="0" cy="0"/>
+        </a:xfrm>
+      </p:grpSpPr>
+      <p:sp>
+        <p:nvSpPr>
+          <p:cNvPr id="2" name="Title 1">
+            <a:extLst>
+              <a:ext uri="{FF2B5EF4-FFF2-40B4-BE49-F238E27FC236}">
+                <a16:creationId xmlns:a16="http://schemas.microsoft.com/office/drawing/2014/main" id="{26A9EA07-C815-4C12-8064-A8C916741E39}"/>
+              </a:ext>
+            </a:extLst>
+          </p:cNvPr>
+          <p:cNvSpPr>
+            <a:spLocks noGrp="1"/>
+          </p:cNvSpPr>
+          <p:nvPr>
+            <p:ph type="title"/>
+          </p:nvPr>
+        </p:nvSpPr>
+        <p:spPr/>
+        <p:txBody>
+          <a:bodyPr/>
+          <a:lstStyle/>
+          <a:p>
+            <a:r>
+              <a:rPr lang="en-US" dirty="0"/>
+              <a:t>Where do we use it?</a:t>
+            </a:r>
+          </a:p>
+        </p:txBody>
+      </p:sp>
+      <p:sp>
+        <p:nvSpPr>
+          <p:cNvPr id="3" name="Text Placeholder 2">
+            <a:extLst>
+              <a:ext uri="{FF2B5EF4-FFF2-40B4-BE49-F238E27FC236}">
+                <a16:creationId xmlns:a16="http://schemas.microsoft.com/office/drawing/2014/main" id="{BB0FC9DE-A777-429C-A27C-BFD49F843988}"/>
+              </a:ext>
+            </a:extLst>
+          </p:cNvPr>
+          <p:cNvSpPr>
+            <a:spLocks noGrp="1"/>
+          </p:cNvSpPr>
+          <p:nvPr>
+            <p:ph type="body" idx="1"/>
+          </p:nvPr>
+        </p:nvSpPr>
+        <p:spPr/>
+        <p:txBody>
+          <a:bodyPr/>
+          <a:lstStyle/>
+          <a:p>
+            <a:r>
+              <a:rPr lang="en-US" dirty="0"/>
+              <a:t>…and how do we use it?</a:t>
+            </a:r>
+          </a:p>
+        </p:txBody>
+      </p:sp>
+    </p:spTree>
+    <p:extLst>
+      <p:ext uri="{BB962C8B-B14F-4D97-AF65-F5344CB8AC3E}">
+        <p14:creationId xmlns:p14="http://schemas.microsoft.com/office/powerpoint/2010/main" val="3299538302"/>
+      </p:ext>
+    </p:extLst>
+  </p:cSld>
+  <p:clrMapOvr>
+    <a:masterClrMapping/>
+  </p:clrMapOvr>
+</p:sld>
+</file>
+
+<file path=ppt/slides/slide27.xml><?xml version="1.0" encoding="utf-8"?>
+<p:sld xmlns:a="http://schemas.openxmlformats.org/drawingml/2006/main" xmlns:r="http://schemas.openxmlformats.org/officeDocument/2006/relationships" xmlns:p="http://schemas.openxmlformats.org/presentationml/2006/main">
+  <p:cSld>
+    <p:spTree>
+      <p:nvGrpSpPr>
+        <p:cNvPr id="1" name=""/>
+        <p:cNvGrpSpPr/>
+        <p:nvPr/>
+      </p:nvGrpSpPr>
+      <p:grpSpPr>
+        <a:xfrm>
+          <a:off x="0" y="0"/>
+          <a:ext cx="0" cy="0"/>
+          <a:chOff x="0" y="0"/>
+          <a:chExt cx="0" cy="0"/>
+        </a:xfrm>
+      </p:grpSpPr>
+      <p:sp>
+        <p:nvSpPr>
+          <p:cNvPr id="2" name="Title 1">
+            <a:extLst>
+              <a:ext uri="{FF2B5EF4-FFF2-40B4-BE49-F238E27FC236}">
+                <a16:creationId xmlns:a16="http://schemas.microsoft.com/office/drawing/2014/main" id="{7B77F8BE-4F19-449F-8AC6-2F4872E1A50C}"/>
+              </a:ext>
+            </a:extLst>
+          </p:cNvPr>
+          <p:cNvSpPr>
+            <a:spLocks noGrp="1"/>
+          </p:cNvSpPr>
+          <p:nvPr>
+            <p:ph type="title"/>
+          </p:nvPr>
+        </p:nvSpPr>
+        <p:spPr/>
+        <p:txBody>
+          <a:bodyPr/>
+          <a:lstStyle/>
+          <a:p>
+            <a:r>
+              <a:rPr lang="en-US" dirty="0"/>
+              <a:t>What else could we do?</a:t>
+            </a:r>
+          </a:p>
+        </p:txBody>
+      </p:sp>
+      <p:sp>
+        <p:nvSpPr>
+          <p:cNvPr id="3" name="Text Placeholder 2">
+            <a:extLst>
+              <a:ext uri="{FF2B5EF4-FFF2-40B4-BE49-F238E27FC236}">
+                <a16:creationId xmlns:a16="http://schemas.microsoft.com/office/drawing/2014/main" id="{C6F65EE0-41D5-4689-8723-6A265983E289}"/>
+              </a:ext>
+            </a:extLst>
+          </p:cNvPr>
+          <p:cNvSpPr>
+            <a:spLocks noGrp="1"/>
+          </p:cNvSpPr>
+          <p:nvPr>
+            <p:ph type="body" idx="1"/>
+          </p:nvPr>
+        </p:nvSpPr>
+        <p:spPr/>
+        <p:txBody>
+          <a:bodyPr/>
+          <a:lstStyle/>
+          <a:p>
+            <a:r>
+              <a:rPr lang="en-US" dirty="0"/>
+              <a:t>…and what should we do?</a:t>
+            </a:r>
+          </a:p>
+        </p:txBody>
+      </p:sp>
+    </p:spTree>
+    <p:extLst>
+      <p:ext uri="{BB962C8B-B14F-4D97-AF65-F5344CB8AC3E}">
+        <p14:creationId xmlns:p14="http://schemas.microsoft.com/office/powerpoint/2010/main" val="92633407"/>
+      </p:ext>
+    </p:extLst>
+  </p:cSld>
+  <p:clrMapOvr>
+    <a:masterClrMapping/>
+  </p:clrMapOvr>
+</p:sld>
+</file>
+
+<file path=ppt/slides/slide28.xml><?xml version="1.0" encoding="utf-8"?>
+<p:sld xmlns:a="http://schemas.openxmlformats.org/drawingml/2006/main" xmlns:r="http://schemas.openxmlformats.org/officeDocument/2006/relationships" xmlns:p="http://schemas.openxmlformats.org/presentationml/2006/main">
+  <p:cSld>
+    <p:spTree>
+      <p:nvGrpSpPr>
+        <p:cNvPr id="1" name=""/>
+        <p:cNvGrpSpPr/>
+        <p:nvPr/>
+      </p:nvGrpSpPr>
+      <p:grpSpPr>
+        <a:xfrm>
+          <a:off x="0" y="0"/>
+          <a:ext cx="0" cy="0"/>
+          <a:chOff x="0" y="0"/>
+          <a:chExt cx="0" cy="0"/>
+        </a:xfrm>
+      </p:grpSpPr>
+      <p:sp>
+        <p:nvSpPr>
+          <p:cNvPr id="4" name="Title 3">
+            <a:extLst>
+              <a:ext uri="{FF2B5EF4-FFF2-40B4-BE49-F238E27FC236}">
+                <a16:creationId xmlns:a16="http://schemas.microsoft.com/office/drawing/2014/main" id="{C9383C8A-7946-4173-B480-76CD3C463DD9}"/>
+              </a:ext>
+            </a:extLst>
+          </p:cNvPr>
+          <p:cNvSpPr>
+            <a:spLocks noGrp="1"/>
+          </p:cNvSpPr>
+          <p:nvPr>
+            <p:ph type="title"/>
+          </p:nvPr>
+        </p:nvSpPr>
+        <p:spPr/>
+        <p:txBody>
+          <a:bodyPr/>
+          <a:lstStyle/>
+          <a:p>
+            <a:r>
+              <a:rPr lang="en-US" dirty="0"/>
+              <a:t>What can we do in the future?</a:t>
+            </a:r>
+          </a:p>
+        </p:txBody>
+      </p:sp>
+      <p:sp>
+        <p:nvSpPr>
+          <p:cNvPr id="5" name="Content Placeholder 4">
+            <a:extLst>
+              <a:ext uri="{FF2B5EF4-FFF2-40B4-BE49-F238E27FC236}">
+                <a16:creationId xmlns:a16="http://schemas.microsoft.com/office/drawing/2014/main" id="{349AA691-FE59-4D5A-9933-492C45FC0055}"/>
+              </a:ext>
+            </a:extLst>
+          </p:cNvPr>
+          <p:cNvSpPr>
+            <a:spLocks noGrp="1"/>
+          </p:cNvSpPr>
+          <p:nvPr>
+            <p:ph idx="1"/>
+          </p:nvPr>
+        </p:nvSpPr>
+        <p:spPr/>
+        <p:txBody>
+          <a:bodyPr/>
+          <a:lstStyle/>
+          <a:p>
+            <a:r>
+              <a:rPr lang="en-US" dirty="0"/>
+              <a:t>TODO: Bias, HCI, benefits</a:t>
+            </a:r>
+            <a:r>
+              <a:rPr lang="en-US"/>
+              <a:t>/risks.</a:t>
+            </a:r>
+          </a:p>
+        </p:txBody>
+      </p:sp>
+    </p:spTree>
+    <p:extLst>
+      <p:ext uri="{BB962C8B-B14F-4D97-AF65-F5344CB8AC3E}">
+        <p14:creationId xmlns:p14="http://schemas.microsoft.com/office/powerpoint/2010/main" val="2596750859"/>
+      </p:ext>
+    </p:extLst>
+  </p:cSld>
+  <p:clrMapOvr>
+    <a:masterClrMapping/>
+  </p:clrMapOvr>
+</p:sld>
+</file>
+
+<file path=ppt/slides/slide29.xml><?xml version="1.0" encoding="utf-8"?>
+<p:sld xmlns:a="http://schemas.openxmlformats.org/drawingml/2006/main" xmlns:r="http://schemas.openxmlformats.org/officeDocument/2006/relationships" xmlns:p="http://schemas.openxmlformats.org/presentationml/2006/main">
+  <p:cSld>
+    <p:spTree>
+      <p:nvGrpSpPr>
+        <p:cNvPr id="1" name=""/>
+        <p:cNvGrpSpPr/>
+        <p:nvPr/>
+      </p:nvGrpSpPr>
+      <p:grpSpPr>
+        <a:xfrm>
+          <a:off x="0" y="0"/>
+          <a:ext cx="0" cy="0"/>
+          <a:chOff x="0" y="0"/>
+          <a:chExt cx="0" cy="0"/>
+        </a:xfrm>
+      </p:grpSpPr>
+      <p:sp>
+        <p:nvSpPr>
+          <p:cNvPr id="2" name="Title 1">
+            <a:extLst>
+              <a:ext uri="{FF2B5EF4-FFF2-40B4-BE49-F238E27FC236}">
+                <a16:creationId xmlns:a16="http://schemas.microsoft.com/office/drawing/2014/main" id="{C3C16B62-FBEF-4E0A-A06F-9E0460E62817}"/>
+              </a:ext>
+            </a:extLst>
+          </p:cNvPr>
+          <p:cNvSpPr>
+            <a:spLocks noGrp="1"/>
+          </p:cNvSpPr>
+          <p:nvPr>
+            <p:ph type="title"/>
+          </p:nvPr>
+        </p:nvSpPr>
+        <p:spPr/>
+        <p:txBody>
+          <a:bodyPr/>
+          <a:lstStyle/>
+          <a:p>
+            <a:r>
+              <a:rPr lang="en-US" dirty="0"/>
+              <a:t>Questions?</a:t>
+            </a:r>
+          </a:p>
+        </p:txBody>
+      </p:sp>
+      <p:sp>
+        <p:nvSpPr>
+          <p:cNvPr id="3" name="Text Placeholder 2">
+            <a:extLst>
+              <a:ext uri="{FF2B5EF4-FFF2-40B4-BE49-F238E27FC236}">
+                <a16:creationId xmlns:a16="http://schemas.microsoft.com/office/drawing/2014/main" id="{F50A9E9D-A598-47F5-9526-6B1B5668DAEE}"/>
+              </a:ext>
+            </a:extLst>
+          </p:cNvPr>
+          <p:cNvSpPr>
+            <a:spLocks noGrp="1"/>
+          </p:cNvSpPr>
+          <p:nvPr>
+            <p:ph type="body" idx="1"/>
+          </p:nvPr>
+        </p:nvSpPr>
+        <p:spPr/>
+        <p:txBody>
+          <a:bodyPr/>
+          <a:lstStyle/>
+          <a:p>
+            <a:r>
+              <a:rPr lang="en-US" dirty="0"/>
+              <a:t>…and answers?</a:t>
+            </a:r>
+          </a:p>
+        </p:txBody>
+      </p:sp>
+    </p:spTree>
+    <p:extLst>
+      <p:ext uri="{BB962C8B-B14F-4D97-AF65-F5344CB8AC3E}">
+        <p14:creationId xmlns:p14="http://schemas.microsoft.com/office/powerpoint/2010/main" val="1613707132"/>
       </p:ext>
     </p:extLst>
   </p:cSld>
@@ -3528,7 +6051,7 @@
           <p:cNvPr id="2" name="Title 1">
             <a:extLst>
               <a:ext uri="{FF2B5EF4-FFF2-40B4-BE49-F238E27FC236}">
-                <a16:creationId xmlns:a16="http://schemas.microsoft.com/office/drawing/2014/main" id="{18A90EB0-8369-4399-91E0-FA372BB7FCCD}"/>
+                <a16:creationId xmlns:a16="http://schemas.microsoft.com/office/drawing/2014/main" id="{6169960E-0710-4290-90BB-5F65683735DC}"/>
               </a:ext>
             </a:extLst>
           </p:cNvPr>
@@ -3546,35 +6069,98 @@
           <a:p>
             <a:r>
               <a:rPr lang="en-US" dirty="0"/>
-              <a:t>How does it work?</a:t>
-            </a:r>
-          </a:p>
-        </p:txBody>
-      </p:sp>
-      <p:sp>
-        <p:nvSpPr>
-          <p:cNvPr id="3" name="Text Placeholder 2">
-            <a:extLst>
-              <a:ext uri="{FF2B5EF4-FFF2-40B4-BE49-F238E27FC236}">
-                <a16:creationId xmlns:a16="http://schemas.microsoft.com/office/drawing/2014/main" id="{65C440A8-BD6B-4E31-9859-636FAB8718D2}"/>
-              </a:ext>
-            </a:extLst>
-          </p:cNvPr>
-          <p:cNvSpPr>
-            <a:spLocks noGrp="1"/>
-          </p:cNvSpPr>
-          <p:nvPr>
-            <p:ph type="body" idx="1"/>
-          </p:nvPr>
-        </p:nvSpPr>
-        <p:spPr/>
-        <p:txBody>
-          <a:bodyPr/>
-          <a:lstStyle/>
-          <a:p>
+              <a:t>What is “NLP”?</a:t>
+            </a:r>
+          </a:p>
+        </p:txBody>
+      </p:sp>
+      <p:sp>
+        <p:nvSpPr>
+          <p:cNvPr id="3" name="Content Placeholder 2">
+            <a:extLst>
+              <a:ext uri="{FF2B5EF4-FFF2-40B4-BE49-F238E27FC236}">
+                <a16:creationId xmlns:a16="http://schemas.microsoft.com/office/drawing/2014/main" id="{FC918B98-39E3-44FF-8B6E-5663E98728B1}"/>
+              </a:ext>
+            </a:extLst>
+          </p:cNvPr>
+          <p:cNvSpPr>
+            <a:spLocks noGrp="1"/>
+          </p:cNvSpPr>
+          <p:nvPr>
+            <p:ph idx="1"/>
+          </p:nvPr>
+        </p:nvSpPr>
+        <p:spPr/>
+        <p:txBody>
+          <a:bodyPr/>
+          <a:lstStyle/>
+          <a:p>
+            <a:pPr marL="0" indent="0" algn="ctr">
+              <a:buNone/>
+            </a:pPr>
             <a:r>
               <a:rPr lang="en-US" dirty="0"/>
-              <a:t>…and how can we make it work?</a:t>
+              <a:t>“</a:t>
+            </a:r>
+            <a:r>
+              <a:rPr lang="en-US" b="1" dirty="0"/>
+              <a:t>Natural-language processing</a:t>
+            </a:r>
+            <a:r>
+              <a:rPr lang="en-US" dirty="0"/>
+              <a:t> (</a:t>
+            </a:r>
+            <a:r>
+              <a:rPr lang="en-US" b="1" dirty="0"/>
+              <a:t>NLP</a:t>
+            </a:r>
+            <a:r>
+              <a:rPr lang="en-US" dirty="0"/>
+              <a:t>) is an area of computer science and artificial intelligence concerned with the interactions between computers and human (natural) languages, in particular how to program computers to fruitfully process large amounts of natural language data.”</a:t>
+            </a:r>
+          </a:p>
+          <a:p>
+            <a:pPr marL="0" indent="0" algn="ctr">
+              <a:buNone/>
+            </a:pPr>
+            <a:r>
+              <a:rPr lang="en-US" dirty="0"/>
+              <a:t>- Wikipedia</a:t>
+            </a:r>
+          </a:p>
+        </p:txBody>
+      </p:sp>
+      <p:sp>
+        <p:nvSpPr>
+          <p:cNvPr id="4" name="TextBox 3">
+            <a:extLst>
+              <a:ext uri="{FF2B5EF4-FFF2-40B4-BE49-F238E27FC236}">
+                <a16:creationId xmlns:a16="http://schemas.microsoft.com/office/drawing/2014/main" id="{EDBEA624-372B-4B4D-BCE8-AD05CD33FCE8}"/>
+              </a:ext>
+            </a:extLst>
+          </p:cNvPr>
+          <p:cNvSpPr txBox="1"/>
+          <p:nvPr/>
+        </p:nvSpPr>
+        <p:spPr>
+          <a:xfrm>
+            <a:off x="382385" y="6450676"/>
+            <a:ext cx="5743688" cy="369332"/>
+          </a:xfrm>
+          <a:prstGeom prst="rect">
+            <a:avLst/>
+          </a:prstGeom>
+          <a:noFill/>
+        </p:spPr>
+        <p:txBody>
+          <a:bodyPr wrap="none" rtlCol="0">
+            <a:spAutoFit/>
+          </a:bodyPr>
+          <a:lstStyle/>
+          <a:p>
+            <a:r>
+              <a:rPr lang="en-US" dirty="0"/>
+              <a:t>https://en.wikipedia.org/wiki/Natural-language_processing</a:t>
             </a:r>
           </a:p>
         </p:txBody>
@@ -3582,7 +6168,7 @@
     </p:spTree>
     <p:extLst>
       <p:ext uri="{BB962C8B-B14F-4D97-AF65-F5344CB8AC3E}">
-        <p14:creationId xmlns:p14="http://schemas.microsoft.com/office/powerpoint/2010/main" val="1449710088"/>
+        <p14:creationId xmlns:p14="http://schemas.microsoft.com/office/powerpoint/2010/main" val="931729066"/>
       </p:ext>
     </p:extLst>
   </p:cSld>
@@ -3614,7 +6200,7 @@
           <p:cNvPr id="2" name="Title 1">
             <a:extLst>
               <a:ext uri="{FF2B5EF4-FFF2-40B4-BE49-F238E27FC236}">
-                <a16:creationId xmlns:a16="http://schemas.microsoft.com/office/drawing/2014/main" id="{26A9EA07-C815-4C12-8064-A8C916741E39}"/>
+                <a16:creationId xmlns:a16="http://schemas.microsoft.com/office/drawing/2014/main" id="{6169960E-0710-4290-90BB-5F65683735DC}"/>
               </a:ext>
             </a:extLst>
           </p:cNvPr>
@@ -3632,35 +6218,90 @@
           <a:p>
             <a:r>
               <a:rPr lang="en-US" dirty="0"/>
-              <a:t>Where do we use it?</a:t>
-            </a:r>
-          </a:p>
-        </p:txBody>
-      </p:sp>
-      <p:sp>
-        <p:nvSpPr>
-          <p:cNvPr id="3" name="Text Placeholder 2">
-            <a:extLst>
-              <a:ext uri="{FF2B5EF4-FFF2-40B4-BE49-F238E27FC236}">
-                <a16:creationId xmlns:a16="http://schemas.microsoft.com/office/drawing/2014/main" id="{BB0FC9DE-A777-429C-A27C-BFD49F843988}"/>
-              </a:ext>
-            </a:extLst>
-          </p:cNvPr>
-          <p:cNvSpPr>
-            <a:spLocks noGrp="1"/>
-          </p:cNvSpPr>
-          <p:nvPr>
-            <p:ph type="body" idx="1"/>
-          </p:nvPr>
-        </p:nvSpPr>
-        <p:spPr/>
-        <p:txBody>
-          <a:bodyPr/>
-          <a:lstStyle/>
-          <a:p>
+              <a:t>What is “NLP”?</a:t>
+            </a:r>
+          </a:p>
+        </p:txBody>
+      </p:sp>
+      <p:sp>
+        <p:nvSpPr>
+          <p:cNvPr id="3" name="Content Placeholder 2">
+            <a:extLst>
+              <a:ext uri="{FF2B5EF4-FFF2-40B4-BE49-F238E27FC236}">
+                <a16:creationId xmlns:a16="http://schemas.microsoft.com/office/drawing/2014/main" id="{FC918B98-39E3-44FF-8B6E-5663E98728B1}"/>
+              </a:ext>
+            </a:extLst>
+          </p:cNvPr>
+          <p:cNvSpPr>
+            <a:spLocks noGrp="1"/>
+          </p:cNvSpPr>
+          <p:nvPr>
+            <p:ph idx="1"/>
+          </p:nvPr>
+        </p:nvSpPr>
+        <p:spPr/>
+        <p:txBody>
+          <a:bodyPr/>
+          <a:lstStyle/>
+          <a:p>
+            <a:pPr marL="0" indent="0" algn="ctr">
+              <a:buNone/>
+            </a:pPr>
             <a:r>
               <a:rPr lang="en-US" dirty="0"/>
-              <a:t>…and how do we use it?</a:t>
+              <a:t>“Natural-language processing (NLP) is an area of </a:t>
+            </a:r>
+            <a:r>
+              <a:rPr lang="en-US" b="1" dirty="0"/>
+              <a:t>computer science and artificial intelligence </a:t>
+            </a:r>
+            <a:r>
+              <a:rPr lang="en-US" dirty="0"/>
+              <a:t>concerned with the interactions between computers and human (natural) languages, in particular how to program computers to fruitfully process large amounts of natural language data.”</a:t>
+            </a:r>
+          </a:p>
+          <a:p>
+            <a:pPr marL="0" indent="0" algn="ctr">
+              <a:buNone/>
+            </a:pPr>
+            <a:r>
+              <a:rPr lang="en-US" dirty="0"/>
+              <a:t>- Wikipedia</a:t>
+            </a:r>
+          </a:p>
+        </p:txBody>
+      </p:sp>
+      <p:sp>
+        <p:nvSpPr>
+          <p:cNvPr id="4" name="TextBox 3">
+            <a:extLst>
+              <a:ext uri="{FF2B5EF4-FFF2-40B4-BE49-F238E27FC236}">
+                <a16:creationId xmlns:a16="http://schemas.microsoft.com/office/drawing/2014/main" id="{EDBEA624-372B-4B4D-BCE8-AD05CD33FCE8}"/>
+              </a:ext>
+            </a:extLst>
+          </p:cNvPr>
+          <p:cNvSpPr txBox="1"/>
+          <p:nvPr/>
+        </p:nvSpPr>
+        <p:spPr>
+          <a:xfrm>
+            <a:off x="382385" y="6450676"/>
+            <a:ext cx="5743688" cy="369332"/>
+          </a:xfrm>
+          <a:prstGeom prst="rect">
+            <a:avLst/>
+          </a:prstGeom>
+          <a:noFill/>
+        </p:spPr>
+        <p:txBody>
+          <a:bodyPr wrap="none" rtlCol="0">
+            <a:spAutoFit/>
+          </a:bodyPr>
+          <a:lstStyle/>
+          <a:p>
+            <a:r>
+              <a:rPr lang="en-US" dirty="0"/>
+              <a:t>https://en.wikipedia.org/wiki/Natural-language_processing</a:t>
             </a:r>
           </a:p>
         </p:txBody>
@@ -3668,7 +6309,7 @@
     </p:spTree>
     <p:extLst>
       <p:ext uri="{BB962C8B-B14F-4D97-AF65-F5344CB8AC3E}">
-        <p14:creationId xmlns:p14="http://schemas.microsoft.com/office/powerpoint/2010/main" val="3299538302"/>
+        <p14:creationId xmlns:p14="http://schemas.microsoft.com/office/powerpoint/2010/main" val="2139200103"/>
       </p:ext>
     </p:extLst>
   </p:cSld>
@@ -3700,7 +6341,7 @@
           <p:cNvPr id="2" name="Title 1">
             <a:extLst>
               <a:ext uri="{FF2B5EF4-FFF2-40B4-BE49-F238E27FC236}">
-                <a16:creationId xmlns:a16="http://schemas.microsoft.com/office/drawing/2014/main" id="{7B77F8BE-4F19-449F-8AC6-2F4872E1A50C}"/>
+                <a16:creationId xmlns:a16="http://schemas.microsoft.com/office/drawing/2014/main" id="{6169960E-0710-4290-90BB-5F65683735DC}"/>
               </a:ext>
             </a:extLst>
           </p:cNvPr>
@@ -3718,35 +6359,90 @@
           <a:p>
             <a:r>
               <a:rPr lang="en-US" dirty="0"/>
-              <a:t>What else could we do?</a:t>
-            </a:r>
-          </a:p>
-        </p:txBody>
-      </p:sp>
-      <p:sp>
-        <p:nvSpPr>
-          <p:cNvPr id="3" name="Text Placeholder 2">
-            <a:extLst>
-              <a:ext uri="{FF2B5EF4-FFF2-40B4-BE49-F238E27FC236}">
-                <a16:creationId xmlns:a16="http://schemas.microsoft.com/office/drawing/2014/main" id="{C6F65EE0-41D5-4689-8723-6A265983E289}"/>
-              </a:ext>
-            </a:extLst>
-          </p:cNvPr>
-          <p:cNvSpPr>
-            <a:spLocks noGrp="1"/>
-          </p:cNvSpPr>
-          <p:nvPr>
-            <p:ph type="body" idx="1"/>
-          </p:nvPr>
-        </p:nvSpPr>
-        <p:spPr/>
-        <p:txBody>
-          <a:bodyPr/>
-          <a:lstStyle/>
-          <a:p>
+              <a:t>What is “NLP”?</a:t>
+            </a:r>
+          </a:p>
+        </p:txBody>
+      </p:sp>
+      <p:sp>
+        <p:nvSpPr>
+          <p:cNvPr id="3" name="Content Placeholder 2">
+            <a:extLst>
+              <a:ext uri="{FF2B5EF4-FFF2-40B4-BE49-F238E27FC236}">
+                <a16:creationId xmlns:a16="http://schemas.microsoft.com/office/drawing/2014/main" id="{FC918B98-39E3-44FF-8B6E-5663E98728B1}"/>
+              </a:ext>
+            </a:extLst>
+          </p:cNvPr>
+          <p:cNvSpPr>
+            <a:spLocks noGrp="1"/>
+          </p:cNvSpPr>
+          <p:nvPr>
+            <p:ph idx="1"/>
+          </p:nvPr>
+        </p:nvSpPr>
+        <p:spPr/>
+        <p:txBody>
+          <a:bodyPr/>
+          <a:lstStyle/>
+          <a:p>
+            <a:pPr marL="0" indent="0" algn="ctr">
+              <a:buNone/>
+            </a:pPr>
             <a:r>
               <a:rPr lang="en-US" dirty="0"/>
-              <a:t>…and what should we do?</a:t>
+              <a:t>“Natural-language processing (NLP) is an area of computer science and artificial intelligence concerned with the </a:t>
+            </a:r>
+            <a:r>
+              <a:rPr lang="en-US" b="1" dirty="0"/>
+              <a:t>interactions between computers and human (natural) languages</a:t>
+            </a:r>
+            <a:r>
+              <a:rPr lang="en-US" dirty="0"/>
+              <a:t>, in particular how to program computers to fruitfully process large amounts of natural language data.”</a:t>
+            </a:r>
+          </a:p>
+          <a:p>
+            <a:pPr marL="0" indent="0" algn="ctr">
+              <a:buNone/>
+            </a:pPr>
+            <a:r>
+              <a:rPr lang="en-US" dirty="0"/>
+              <a:t>- Wikipedia</a:t>
+            </a:r>
+          </a:p>
+        </p:txBody>
+      </p:sp>
+      <p:sp>
+        <p:nvSpPr>
+          <p:cNvPr id="4" name="TextBox 3">
+            <a:extLst>
+              <a:ext uri="{FF2B5EF4-FFF2-40B4-BE49-F238E27FC236}">
+                <a16:creationId xmlns:a16="http://schemas.microsoft.com/office/drawing/2014/main" id="{EDBEA624-372B-4B4D-BCE8-AD05CD33FCE8}"/>
+              </a:ext>
+            </a:extLst>
+          </p:cNvPr>
+          <p:cNvSpPr txBox="1"/>
+          <p:nvPr/>
+        </p:nvSpPr>
+        <p:spPr>
+          <a:xfrm>
+            <a:off x="382385" y="6450676"/>
+            <a:ext cx="5743688" cy="369332"/>
+          </a:xfrm>
+          <a:prstGeom prst="rect">
+            <a:avLst/>
+          </a:prstGeom>
+          <a:noFill/>
+        </p:spPr>
+        <p:txBody>
+          <a:bodyPr wrap="none" rtlCol="0">
+            <a:spAutoFit/>
+          </a:bodyPr>
+          <a:lstStyle/>
+          <a:p>
+            <a:r>
+              <a:rPr lang="en-US" dirty="0"/>
+              <a:t>https://en.wikipedia.org/wiki/Natural-language_processing</a:t>
             </a:r>
           </a:p>
         </p:txBody>
@@ -3754,7 +6450,7 @@
     </p:spTree>
     <p:extLst>
       <p:ext uri="{BB962C8B-B14F-4D97-AF65-F5344CB8AC3E}">
-        <p14:creationId xmlns:p14="http://schemas.microsoft.com/office/powerpoint/2010/main" val="92633407"/>
+        <p14:creationId xmlns:p14="http://schemas.microsoft.com/office/powerpoint/2010/main" val="1696441232"/>
       </p:ext>
     </p:extLst>
   </p:cSld>
@@ -3786,7 +6482,7 @@
           <p:cNvPr id="2" name="Title 1">
             <a:extLst>
               <a:ext uri="{FF2B5EF4-FFF2-40B4-BE49-F238E27FC236}">
-                <a16:creationId xmlns:a16="http://schemas.microsoft.com/office/drawing/2014/main" id="{C3C16B62-FBEF-4E0A-A06F-9E0460E62817}"/>
+                <a16:creationId xmlns:a16="http://schemas.microsoft.com/office/drawing/2014/main" id="{6169960E-0710-4290-90BB-5F65683735DC}"/>
               </a:ext>
             </a:extLst>
           </p:cNvPr>
@@ -3804,35 +6500,90 @@
           <a:p>
             <a:r>
               <a:rPr lang="en-US" dirty="0"/>
-              <a:t>Questions?</a:t>
-            </a:r>
-          </a:p>
-        </p:txBody>
-      </p:sp>
-      <p:sp>
-        <p:nvSpPr>
-          <p:cNvPr id="3" name="Text Placeholder 2">
-            <a:extLst>
-              <a:ext uri="{FF2B5EF4-FFF2-40B4-BE49-F238E27FC236}">
-                <a16:creationId xmlns:a16="http://schemas.microsoft.com/office/drawing/2014/main" id="{F50A9E9D-A598-47F5-9526-6B1B5668DAEE}"/>
-              </a:ext>
-            </a:extLst>
-          </p:cNvPr>
-          <p:cNvSpPr>
-            <a:spLocks noGrp="1"/>
-          </p:cNvSpPr>
-          <p:nvPr>
-            <p:ph type="body" idx="1"/>
-          </p:nvPr>
-        </p:nvSpPr>
-        <p:spPr/>
-        <p:txBody>
-          <a:bodyPr/>
-          <a:lstStyle/>
-          <a:p>
+              <a:t>What is “NLP”?</a:t>
+            </a:r>
+          </a:p>
+        </p:txBody>
+      </p:sp>
+      <p:sp>
+        <p:nvSpPr>
+          <p:cNvPr id="3" name="Content Placeholder 2">
+            <a:extLst>
+              <a:ext uri="{FF2B5EF4-FFF2-40B4-BE49-F238E27FC236}">
+                <a16:creationId xmlns:a16="http://schemas.microsoft.com/office/drawing/2014/main" id="{FC918B98-39E3-44FF-8B6E-5663E98728B1}"/>
+              </a:ext>
+            </a:extLst>
+          </p:cNvPr>
+          <p:cNvSpPr>
+            <a:spLocks noGrp="1"/>
+          </p:cNvSpPr>
+          <p:nvPr>
+            <p:ph idx="1"/>
+          </p:nvPr>
+        </p:nvSpPr>
+        <p:spPr/>
+        <p:txBody>
+          <a:bodyPr/>
+          <a:lstStyle/>
+          <a:p>
+            <a:pPr marL="0" indent="0" algn="ctr">
+              <a:buNone/>
+            </a:pPr>
             <a:r>
               <a:rPr lang="en-US" dirty="0"/>
-              <a:t>…and answers?</a:t>
+              <a:t>“Natural-language processing (NLP) is an area of computer science and artificial intelligence concerned with the interactions between computers and human (natural) languages, in particular how to </a:t>
+            </a:r>
+            <a:r>
+              <a:rPr lang="en-US" b="1" dirty="0"/>
+              <a:t>program computers </a:t>
+            </a:r>
+            <a:r>
+              <a:rPr lang="en-US" dirty="0"/>
+              <a:t>to fruitfully process large amounts of natural language data.”</a:t>
+            </a:r>
+          </a:p>
+          <a:p>
+            <a:pPr marL="0" indent="0" algn="ctr">
+              <a:buNone/>
+            </a:pPr>
+            <a:r>
+              <a:rPr lang="en-US" dirty="0"/>
+              <a:t>- Wikipedia</a:t>
+            </a:r>
+          </a:p>
+        </p:txBody>
+      </p:sp>
+      <p:sp>
+        <p:nvSpPr>
+          <p:cNvPr id="4" name="TextBox 3">
+            <a:extLst>
+              <a:ext uri="{FF2B5EF4-FFF2-40B4-BE49-F238E27FC236}">
+                <a16:creationId xmlns:a16="http://schemas.microsoft.com/office/drawing/2014/main" id="{EDBEA624-372B-4B4D-BCE8-AD05CD33FCE8}"/>
+              </a:ext>
+            </a:extLst>
+          </p:cNvPr>
+          <p:cNvSpPr txBox="1"/>
+          <p:nvPr/>
+        </p:nvSpPr>
+        <p:spPr>
+          <a:xfrm>
+            <a:off x="382385" y="6450676"/>
+            <a:ext cx="5743688" cy="369332"/>
+          </a:xfrm>
+          <a:prstGeom prst="rect">
+            <a:avLst/>
+          </a:prstGeom>
+          <a:noFill/>
+        </p:spPr>
+        <p:txBody>
+          <a:bodyPr wrap="none" rtlCol="0">
+            <a:spAutoFit/>
+          </a:bodyPr>
+          <a:lstStyle/>
+          <a:p>
+            <a:r>
+              <a:rPr lang="en-US" dirty="0"/>
+              <a:t>https://en.wikipedia.org/wiki/Natural-language_processing</a:t>
             </a:r>
           </a:p>
         </p:txBody>
@@ -3840,7 +6591,399 @@
     </p:spTree>
     <p:extLst>
       <p:ext uri="{BB962C8B-B14F-4D97-AF65-F5344CB8AC3E}">
-        <p14:creationId xmlns:p14="http://schemas.microsoft.com/office/powerpoint/2010/main" val="1613707132"/>
+        <p14:creationId xmlns:p14="http://schemas.microsoft.com/office/powerpoint/2010/main" val="283140229"/>
+      </p:ext>
+    </p:extLst>
+  </p:cSld>
+  <p:clrMapOvr>
+    <a:masterClrMapping/>
+  </p:clrMapOvr>
+</p:sld>
+</file>
+
+<file path=ppt/slides/slide7.xml><?xml version="1.0" encoding="utf-8"?>
+<p:sld xmlns:a="http://schemas.openxmlformats.org/drawingml/2006/main" xmlns:r="http://schemas.openxmlformats.org/officeDocument/2006/relationships" xmlns:p="http://schemas.openxmlformats.org/presentationml/2006/main">
+  <p:cSld>
+    <p:spTree>
+      <p:nvGrpSpPr>
+        <p:cNvPr id="1" name=""/>
+        <p:cNvGrpSpPr/>
+        <p:nvPr/>
+      </p:nvGrpSpPr>
+      <p:grpSpPr>
+        <a:xfrm>
+          <a:off x="0" y="0"/>
+          <a:ext cx="0" cy="0"/>
+          <a:chOff x="0" y="0"/>
+          <a:chExt cx="0" cy="0"/>
+        </a:xfrm>
+      </p:grpSpPr>
+      <p:sp>
+        <p:nvSpPr>
+          <p:cNvPr id="2" name="Title 1">
+            <a:extLst>
+              <a:ext uri="{FF2B5EF4-FFF2-40B4-BE49-F238E27FC236}">
+                <a16:creationId xmlns:a16="http://schemas.microsoft.com/office/drawing/2014/main" id="{6169960E-0710-4290-90BB-5F65683735DC}"/>
+              </a:ext>
+            </a:extLst>
+          </p:cNvPr>
+          <p:cNvSpPr>
+            <a:spLocks noGrp="1"/>
+          </p:cNvSpPr>
+          <p:nvPr>
+            <p:ph type="title"/>
+          </p:nvPr>
+        </p:nvSpPr>
+        <p:spPr/>
+        <p:txBody>
+          <a:bodyPr/>
+          <a:lstStyle/>
+          <a:p>
+            <a:r>
+              <a:rPr lang="en-US" dirty="0"/>
+              <a:t>What is “NLP”?</a:t>
+            </a:r>
+          </a:p>
+        </p:txBody>
+      </p:sp>
+      <p:sp>
+        <p:nvSpPr>
+          <p:cNvPr id="3" name="Content Placeholder 2">
+            <a:extLst>
+              <a:ext uri="{FF2B5EF4-FFF2-40B4-BE49-F238E27FC236}">
+                <a16:creationId xmlns:a16="http://schemas.microsoft.com/office/drawing/2014/main" id="{FC918B98-39E3-44FF-8B6E-5663E98728B1}"/>
+              </a:ext>
+            </a:extLst>
+          </p:cNvPr>
+          <p:cNvSpPr>
+            <a:spLocks noGrp="1"/>
+          </p:cNvSpPr>
+          <p:nvPr>
+            <p:ph idx="1"/>
+          </p:nvPr>
+        </p:nvSpPr>
+        <p:spPr/>
+        <p:txBody>
+          <a:bodyPr/>
+          <a:lstStyle/>
+          <a:p>
+            <a:pPr marL="0" indent="0" algn="ctr">
+              <a:buNone/>
+            </a:pPr>
+            <a:r>
+              <a:rPr lang="en-US" dirty="0"/>
+              <a:t>“Natural-language processing (NLP) is an area of computer science and artificial intelligence concerned with the interactions between computers and human (natural) languages, in particular how to program computers to fruitfully </a:t>
+            </a:r>
+            <a:r>
+              <a:rPr lang="en-US" b="1" dirty="0"/>
+              <a:t>process large amounts of natural language data</a:t>
+            </a:r>
+            <a:r>
+              <a:rPr lang="en-US" dirty="0"/>
+              <a:t>.”</a:t>
+            </a:r>
+          </a:p>
+          <a:p>
+            <a:pPr marL="0" indent="0" algn="ctr">
+              <a:buNone/>
+            </a:pPr>
+            <a:r>
+              <a:rPr lang="en-US" dirty="0"/>
+              <a:t>- Wikipedia</a:t>
+            </a:r>
+          </a:p>
+        </p:txBody>
+      </p:sp>
+      <p:sp>
+        <p:nvSpPr>
+          <p:cNvPr id="4" name="TextBox 3">
+            <a:extLst>
+              <a:ext uri="{FF2B5EF4-FFF2-40B4-BE49-F238E27FC236}">
+                <a16:creationId xmlns:a16="http://schemas.microsoft.com/office/drawing/2014/main" id="{EDBEA624-372B-4B4D-BCE8-AD05CD33FCE8}"/>
+              </a:ext>
+            </a:extLst>
+          </p:cNvPr>
+          <p:cNvSpPr txBox="1"/>
+          <p:nvPr/>
+        </p:nvSpPr>
+        <p:spPr>
+          <a:xfrm>
+            <a:off x="382385" y="6450676"/>
+            <a:ext cx="5743688" cy="369332"/>
+          </a:xfrm>
+          <a:prstGeom prst="rect">
+            <a:avLst/>
+          </a:prstGeom>
+          <a:noFill/>
+        </p:spPr>
+        <p:txBody>
+          <a:bodyPr wrap="none" rtlCol="0">
+            <a:spAutoFit/>
+          </a:bodyPr>
+          <a:lstStyle/>
+          <a:p>
+            <a:r>
+              <a:rPr lang="en-US" dirty="0"/>
+              <a:t>https://en.wikipedia.org/wiki/Natural-language_processing</a:t>
+            </a:r>
+          </a:p>
+        </p:txBody>
+      </p:sp>
+    </p:spTree>
+    <p:extLst>
+      <p:ext uri="{BB962C8B-B14F-4D97-AF65-F5344CB8AC3E}">
+        <p14:creationId xmlns:p14="http://schemas.microsoft.com/office/powerpoint/2010/main" val="3661035843"/>
+      </p:ext>
+    </p:extLst>
+  </p:cSld>
+  <p:clrMapOvr>
+    <a:masterClrMapping/>
+  </p:clrMapOvr>
+</p:sld>
+</file>
+
+<file path=ppt/slides/slide8.xml><?xml version="1.0" encoding="utf-8"?>
+<p:sld xmlns:a="http://schemas.openxmlformats.org/drawingml/2006/main" xmlns:r="http://schemas.openxmlformats.org/officeDocument/2006/relationships" xmlns:p="http://schemas.openxmlformats.org/presentationml/2006/main">
+  <p:cSld>
+    <p:spTree>
+      <p:nvGrpSpPr>
+        <p:cNvPr id="1" name=""/>
+        <p:cNvGrpSpPr/>
+        <p:nvPr/>
+      </p:nvGrpSpPr>
+      <p:grpSpPr>
+        <a:xfrm>
+          <a:off x="0" y="0"/>
+          <a:ext cx="0" cy="0"/>
+          <a:chOff x="0" y="0"/>
+          <a:chExt cx="0" cy="0"/>
+        </a:xfrm>
+      </p:grpSpPr>
+      <p:sp>
+        <p:nvSpPr>
+          <p:cNvPr id="2" name="Title 1">
+            <a:extLst>
+              <a:ext uri="{FF2B5EF4-FFF2-40B4-BE49-F238E27FC236}">
+                <a16:creationId xmlns:a16="http://schemas.microsoft.com/office/drawing/2014/main" id="{6169960E-0710-4290-90BB-5F65683735DC}"/>
+              </a:ext>
+            </a:extLst>
+          </p:cNvPr>
+          <p:cNvSpPr>
+            <a:spLocks noGrp="1"/>
+          </p:cNvSpPr>
+          <p:nvPr>
+            <p:ph type="title"/>
+          </p:nvPr>
+        </p:nvSpPr>
+        <p:spPr/>
+        <p:txBody>
+          <a:bodyPr/>
+          <a:lstStyle/>
+          <a:p>
+            <a:r>
+              <a:rPr lang="en-US" dirty="0"/>
+              <a:t>What is “NLP”?</a:t>
+            </a:r>
+          </a:p>
+        </p:txBody>
+      </p:sp>
+      <p:sp>
+        <p:nvSpPr>
+          <p:cNvPr id="3" name="Content Placeholder 2">
+            <a:extLst>
+              <a:ext uri="{FF2B5EF4-FFF2-40B4-BE49-F238E27FC236}">
+                <a16:creationId xmlns:a16="http://schemas.microsoft.com/office/drawing/2014/main" id="{FC918B98-39E3-44FF-8B6E-5663E98728B1}"/>
+              </a:ext>
+            </a:extLst>
+          </p:cNvPr>
+          <p:cNvSpPr>
+            <a:spLocks noGrp="1"/>
+          </p:cNvSpPr>
+          <p:nvPr>
+            <p:ph idx="1"/>
+          </p:nvPr>
+        </p:nvSpPr>
+        <p:spPr/>
+        <p:txBody>
+          <a:bodyPr>
+            <a:normAutofit/>
+          </a:bodyPr>
+          <a:lstStyle/>
+          <a:p>
+            <a:pPr marL="0" indent="0" algn="ctr">
+              <a:buNone/>
+            </a:pPr>
+            <a:r>
+              <a:rPr lang="en-US" dirty="0"/>
+              <a:t>“Natural-language processing (NLP) is an area of computer science and artificial intelligence concerned with the interactions between computers and human (natural) languages, in particular how to program computers to fruitfully process large amounts of natural language data.</a:t>
+            </a:r>
+          </a:p>
+          <a:p>
+            <a:pPr marL="0" indent="0" algn="ctr">
+              <a:buNone/>
+            </a:pPr>
+            <a:r>
+              <a:rPr lang="en-US" dirty="0"/>
+              <a:t>Challenges in natural-language processing frequently involve </a:t>
+            </a:r>
+            <a:r>
+              <a:rPr lang="en-US" b="1" dirty="0"/>
+              <a:t>speech recognition</a:t>
+            </a:r>
+            <a:r>
+              <a:rPr lang="en-US" dirty="0"/>
+              <a:t>, </a:t>
+            </a:r>
+            <a:r>
+              <a:rPr lang="en-US" b="1" dirty="0"/>
+              <a:t>natural-language understanding</a:t>
+            </a:r>
+            <a:r>
+              <a:rPr lang="en-US" dirty="0"/>
+              <a:t>, and </a:t>
+            </a:r>
+            <a:r>
+              <a:rPr lang="en-US" b="1" dirty="0"/>
+              <a:t>natural-language generation</a:t>
+            </a:r>
+            <a:r>
+              <a:rPr lang="en-US" dirty="0"/>
+              <a:t>.”</a:t>
+            </a:r>
+          </a:p>
+          <a:p>
+            <a:pPr marL="0" indent="0" algn="ctr">
+              <a:buNone/>
+            </a:pPr>
+            <a:r>
+              <a:rPr lang="en-US" dirty="0"/>
+              <a:t>- Wikipedia</a:t>
+            </a:r>
+          </a:p>
+        </p:txBody>
+      </p:sp>
+      <p:sp>
+        <p:nvSpPr>
+          <p:cNvPr id="4" name="TextBox 3">
+            <a:extLst>
+              <a:ext uri="{FF2B5EF4-FFF2-40B4-BE49-F238E27FC236}">
+                <a16:creationId xmlns:a16="http://schemas.microsoft.com/office/drawing/2014/main" id="{EDBEA624-372B-4B4D-BCE8-AD05CD33FCE8}"/>
+              </a:ext>
+            </a:extLst>
+          </p:cNvPr>
+          <p:cNvSpPr txBox="1"/>
+          <p:nvPr/>
+        </p:nvSpPr>
+        <p:spPr>
+          <a:xfrm>
+            <a:off x="382385" y="6450676"/>
+            <a:ext cx="5743688" cy="369332"/>
+          </a:xfrm>
+          <a:prstGeom prst="rect">
+            <a:avLst/>
+          </a:prstGeom>
+          <a:noFill/>
+        </p:spPr>
+        <p:txBody>
+          <a:bodyPr wrap="none" rtlCol="0">
+            <a:spAutoFit/>
+          </a:bodyPr>
+          <a:lstStyle/>
+          <a:p>
+            <a:r>
+              <a:rPr lang="en-US" dirty="0"/>
+              <a:t>https://en.wikipedia.org/wiki/Natural-language_processing</a:t>
+            </a:r>
+          </a:p>
+        </p:txBody>
+      </p:sp>
+    </p:spTree>
+    <p:extLst>
+      <p:ext uri="{BB962C8B-B14F-4D97-AF65-F5344CB8AC3E}">
+        <p14:creationId xmlns:p14="http://schemas.microsoft.com/office/powerpoint/2010/main" val="3415299603"/>
+      </p:ext>
+    </p:extLst>
+  </p:cSld>
+  <p:clrMapOvr>
+    <a:masterClrMapping/>
+  </p:clrMapOvr>
+</p:sld>
+</file>
+
+<file path=ppt/slides/slide9.xml><?xml version="1.0" encoding="utf-8"?>
+<p:sld xmlns:a="http://schemas.openxmlformats.org/drawingml/2006/main" xmlns:r="http://schemas.openxmlformats.org/officeDocument/2006/relationships" xmlns:p="http://schemas.openxmlformats.org/presentationml/2006/main">
+  <p:cSld>
+    <p:spTree>
+      <p:nvGrpSpPr>
+        <p:cNvPr id="1" name=""/>
+        <p:cNvGrpSpPr/>
+        <p:nvPr/>
+      </p:nvGrpSpPr>
+      <p:grpSpPr>
+        <a:xfrm>
+          <a:off x="0" y="0"/>
+          <a:ext cx="0" cy="0"/>
+          <a:chOff x="0" y="0"/>
+          <a:chExt cx="0" cy="0"/>
+        </a:xfrm>
+      </p:grpSpPr>
+      <p:sp>
+        <p:nvSpPr>
+          <p:cNvPr id="2" name="Title 1">
+            <a:extLst>
+              <a:ext uri="{FF2B5EF4-FFF2-40B4-BE49-F238E27FC236}">
+                <a16:creationId xmlns:a16="http://schemas.microsoft.com/office/drawing/2014/main" id="{B61DD442-8CFC-4E38-A6AA-B82F0B634200}"/>
+              </a:ext>
+            </a:extLst>
+          </p:cNvPr>
+          <p:cNvSpPr>
+            <a:spLocks noGrp="1"/>
+          </p:cNvSpPr>
+          <p:nvPr>
+            <p:ph type="title"/>
+          </p:nvPr>
+        </p:nvSpPr>
+        <p:spPr/>
+        <p:txBody>
+          <a:bodyPr/>
+          <a:lstStyle/>
+          <a:p>
+            <a:r>
+              <a:rPr lang="en-US" dirty="0"/>
+              <a:t>Why do we care?</a:t>
+            </a:r>
+          </a:p>
+        </p:txBody>
+      </p:sp>
+      <p:sp>
+        <p:nvSpPr>
+          <p:cNvPr id="3" name="Content Placeholder 2">
+            <a:extLst>
+              <a:ext uri="{FF2B5EF4-FFF2-40B4-BE49-F238E27FC236}">
+                <a16:creationId xmlns:a16="http://schemas.microsoft.com/office/drawing/2014/main" id="{C9C658B2-AECC-43C6-A4A5-32B3CBFD32A3}"/>
+              </a:ext>
+            </a:extLst>
+          </p:cNvPr>
+          <p:cNvSpPr>
+            <a:spLocks noGrp="1"/>
+          </p:cNvSpPr>
+          <p:nvPr>
+            <p:ph idx="1"/>
+          </p:nvPr>
+        </p:nvSpPr>
+        <p:spPr/>
+        <p:txBody>
+          <a:bodyPr/>
+          <a:lstStyle/>
+          <a:p>
+            <a:endParaRPr lang="en-US"/>
+          </a:p>
+        </p:txBody>
+      </p:sp>
+    </p:spTree>
+    <p:extLst>
+      <p:ext uri="{BB962C8B-B14F-4D97-AF65-F5344CB8AC3E}">
+        <p14:creationId xmlns:p14="http://schemas.microsoft.com/office/powerpoint/2010/main" val="3812397720"/>
       </p:ext>
     </p:extLst>
   </p:cSld>
@@ -4143,4 +7286,299 @@
     </a:ext>
   </a:extLst>
 </a:theme>
+</file>
+
+<file path=ppt/theme/theme2.xml><?xml version="1.0" encoding="utf-8"?>
+<a:theme xmlns:a="http://schemas.openxmlformats.org/drawingml/2006/main" name="Office Theme">
+  <a:themeElements>
+    <a:clrScheme name="Office">
+      <a:dk1>
+        <a:sysClr val="windowText" lastClr="000000"/>
+      </a:dk1>
+      <a:lt1>
+        <a:sysClr val="window" lastClr="FFFFFF"/>
+      </a:lt1>
+      <a:dk2>
+        <a:srgbClr val="44546A"/>
+      </a:dk2>
+      <a:lt2>
+        <a:srgbClr val="E7E6E6"/>
+      </a:lt2>
+      <a:accent1>
+        <a:srgbClr val="4472C4"/>
+      </a:accent1>
+      <a:accent2>
+        <a:srgbClr val="ED7D31"/>
+      </a:accent2>
+      <a:accent3>
+        <a:srgbClr val="A5A5A5"/>
+      </a:accent3>
+      <a:accent4>
+        <a:srgbClr val="FFC000"/>
+      </a:accent4>
+      <a:accent5>
+        <a:srgbClr val="5B9BD5"/>
+      </a:accent5>
+      <a:accent6>
+        <a:srgbClr val="70AD47"/>
+      </a:accent6>
+      <a:hlink>
+        <a:srgbClr val="0563C1"/>
+      </a:hlink>
+      <a:folHlink>
+        <a:srgbClr val="954F72"/>
+      </a:folHlink>
+    </a:clrScheme>
+    <a:fontScheme name="Office">
+      <a:majorFont>
+        <a:latin typeface="Calibri Light" panose="020F0302020204030204"/>
+        <a:ea typeface=""/>
+        <a:cs typeface=""/>
+        <a:font script="Jpan" typeface="游ゴシック Light"/>
+        <a:font script="Hang" typeface="맑은 고딕"/>
+        <a:font script="Hans" typeface="等线 Light"/>
+        <a:font script="Hant" typeface="新細明體"/>
+        <a:font script="Arab" typeface="Times New Roman"/>
+        <a:font script="Hebr" typeface="Times New Roman"/>
+        <a:font script="Thai" typeface="Angsana New"/>
+        <a:font script="Ethi" typeface="Nyala"/>
+        <a:font script="Beng" typeface="Vrinda"/>
+        <a:font script="Gujr" typeface="Shruti"/>
+        <a:font script="Khmr" typeface="MoolBoran"/>
+        <a:font script="Knda" typeface="Tunga"/>
+        <a:font script="Guru" typeface="Raavi"/>
+        <a:font script="Cans" typeface="Euphemia"/>
+        <a:font script="Cher" typeface="Plantagenet Cherokee"/>
+        <a:font script="Yiii" typeface="Microsoft Yi Baiti"/>
+        <a:font script="Tibt" typeface="Microsoft Himalaya"/>
+        <a:font script="Thaa" typeface="MV Boli"/>
+        <a:font script="Deva" typeface="Mangal"/>
+        <a:font script="Telu" typeface="Gautami"/>
+        <a:font script="Taml" typeface="Latha"/>
+        <a:font script="Syrc" typeface="Estrangelo Edessa"/>
+        <a:font script="Orya" typeface="Kalinga"/>
+        <a:font script="Mlym" typeface="Kartika"/>
+        <a:font script="Laoo" typeface="DokChampa"/>
+        <a:font script="Sinh" typeface="Iskoola Pota"/>
+        <a:font script="Mong" typeface="Mongolian Baiti"/>
+        <a:font script="Viet" typeface="Times New Roman"/>
+        <a:font script="Uigh" typeface="Microsoft Uighur"/>
+        <a:font script="Geor" typeface="Sylfaen"/>
+        <a:font script="Armn" typeface="Arial"/>
+        <a:font script="Bugi" typeface="Leelawadee UI"/>
+        <a:font script="Bopo" typeface="Microsoft JhengHei"/>
+        <a:font script="Java" typeface="Javanese Text"/>
+        <a:font script="Lisu" typeface="Segoe UI"/>
+        <a:font script="Mymr" typeface="Myanmar Text"/>
+        <a:font script="Nkoo" typeface="Ebrima"/>
+        <a:font script="Olck" typeface="Nirmala UI"/>
+        <a:font script="Osma" typeface="Ebrima"/>
+        <a:font script="Phag" typeface="Phagspa"/>
+        <a:font script="Syrn" typeface="Estrangelo Edessa"/>
+        <a:font script="Syrj" typeface="Estrangelo Edessa"/>
+        <a:font script="Syre" typeface="Estrangelo Edessa"/>
+        <a:font script="Sora" typeface="Nirmala UI"/>
+        <a:font script="Tale" typeface="Microsoft Tai Le"/>
+        <a:font script="Talu" typeface="Microsoft New Tai Lue"/>
+        <a:font script="Tfng" typeface="Ebrima"/>
+      </a:majorFont>
+      <a:minorFont>
+        <a:latin typeface="Calibri" panose="020F0502020204030204"/>
+        <a:ea typeface=""/>
+        <a:cs typeface=""/>
+        <a:font script="Jpan" typeface="游ゴシック"/>
+        <a:font script="Hang" typeface="맑은 고딕"/>
+        <a:font script="Hans" typeface="等线"/>
+        <a:font script="Hant" typeface="新細明體"/>
+        <a:font script="Arab" typeface="Arial"/>
+        <a:font script="Hebr" typeface="Arial"/>
+        <a:font script="Thai" typeface="Cordia New"/>
+        <a:font script="Ethi" typeface="Nyala"/>
+        <a:font script="Beng" typeface="Vrinda"/>
+        <a:font script="Gujr" typeface="Shruti"/>
+        <a:font script="Khmr" typeface="DaunPenh"/>
+        <a:font script="Knda" typeface="Tunga"/>
+        <a:font script="Guru" typeface="Raavi"/>
+        <a:font script="Cans" typeface="Euphemia"/>
+        <a:font script="Cher" typeface="Plantagenet Cherokee"/>
+        <a:font script="Yiii" typeface="Microsoft Yi Baiti"/>
+        <a:font script="Tibt" typeface="Microsoft Himalaya"/>
+        <a:font script="Thaa" typeface="MV Boli"/>
+        <a:font script="Deva" typeface="Mangal"/>
+        <a:font script="Telu" typeface="Gautami"/>
+        <a:font script="Taml" typeface="Latha"/>
+        <a:font script="Syrc" typeface="Estrangelo Edessa"/>
+        <a:font script="Orya" typeface="Kalinga"/>
+        <a:font script="Mlym" typeface="Kartika"/>
+        <a:font script="Laoo" typeface="DokChampa"/>
+        <a:font script="Sinh" typeface="Iskoola Pota"/>
+        <a:font script="Mong" typeface="Mongolian Baiti"/>
+        <a:font script="Viet" typeface="Arial"/>
+        <a:font script="Uigh" typeface="Microsoft Uighur"/>
+        <a:font script="Geor" typeface="Sylfaen"/>
+        <a:font script="Armn" typeface="Arial"/>
+        <a:font script="Bugi" typeface="Leelawadee UI"/>
+        <a:font script="Bopo" typeface="Microsoft JhengHei"/>
+        <a:font script="Java" typeface="Javanese Text"/>
+        <a:font script="Lisu" typeface="Segoe UI"/>
+        <a:font script="Mymr" typeface="Myanmar Text"/>
+        <a:font script="Nkoo" typeface="Ebrima"/>
+        <a:font script="Olck" typeface="Nirmala UI"/>
+        <a:font script="Osma" typeface="Ebrima"/>
+        <a:font script="Phag" typeface="Phagspa"/>
+        <a:font script="Syrn" typeface="Estrangelo Edessa"/>
+        <a:font script="Syrj" typeface="Estrangelo Edessa"/>
+        <a:font script="Syre" typeface="Estrangelo Edessa"/>
+        <a:font script="Sora" typeface="Nirmala UI"/>
+        <a:font script="Tale" typeface="Microsoft Tai Le"/>
+        <a:font script="Talu" typeface="Microsoft New Tai Lue"/>
+        <a:font script="Tfng" typeface="Ebrima"/>
+      </a:minorFont>
+    </a:fontScheme>
+    <a:fmtScheme name="Office">
+      <a:fillStyleLst>
+        <a:solidFill>
+          <a:schemeClr val="phClr"/>
+        </a:solidFill>
+        <a:gradFill rotWithShape="1">
+          <a:gsLst>
+            <a:gs pos="0">
+              <a:schemeClr val="phClr">
+                <a:lumMod val="110000"/>
+                <a:satMod val="105000"/>
+                <a:tint val="67000"/>
+              </a:schemeClr>
+            </a:gs>
+            <a:gs pos="50000">
+              <a:schemeClr val="phClr">
+                <a:lumMod val="105000"/>
+                <a:satMod val="103000"/>
+                <a:tint val="73000"/>
+              </a:schemeClr>
+            </a:gs>
+            <a:gs pos="100000">
+              <a:schemeClr val="phClr">
+                <a:lumMod val="105000"/>
+                <a:satMod val="109000"/>
+                <a:tint val="81000"/>
+              </a:schemeClr>
+            </a:gs>
+          </a:gsLst>
+          <a:lin ang="5400000" scaled="0"/>
+        </a:gradFill>
+        <a:gradFill rotWithShape="1">
+          <a:gsLst>
+            <a:gs pos="0">
+              <a:schemeClr val="phClr">
+                <a:satMod val="103000"/>
+                <a:lumMod val="102000"/>
+                <a:tint val="94000"/>
+              </a:schemeClr>
+            </a:gs>
+            <a:gs pos="50000">
+              <a:schemeClr val="phClr">
+                <a:satMod val="110000"/>
+                <a:lumMod val="100000"/>
+                <a:shade val="100000"/>
+              </a:schemeClr>
+            </a:gs>
+            <a:gs pos="100000">
+              <a:schemeClr val="phClr">
+                <a:lumMod val="99000"/>
+                <a:satMod val="120000"/>
+                <a:shade val="78000"/>
+              </a:schemeClr>
+            </a:gs>
+          </a:gsLst>
+          <a:lin ang="5400000" scaled="0"/>
+        </a:gradFill>
+      </a:fillStyleLst>
+      <a:lnStyleLst>
+        <a:ln w="6350" cap="flat" cmpd="sng" algn="ctr">
+          <a:solidFill>
+            <a:schemeClr val="phClr"/>
+          </a:solidFill>
+          <a:prstDash val="solid"/>
+          <a:miter lim="800000"/>
+        </a:ln>
+        <a:ln w="12700" cap="flat" cmpd="sng" algn="ctr">
+          <a:solidFill>
+            <a:schemeClr val="phClr"/>
+          </a:solidFill>
+          <a:prstDash val="solid"/>
+          <a:miter lim="800000"/>
+        </a:ln>
+        <a:ln w="19050" cap="flat" cmpd="sng" algn="ctr">
+          <a:solidFill>
+            <a:schemeClr val="phClr"/>
+          </a:solidFill>
+          <a:prstDash val="solid"/>
+          <a:miter lim="800000"/>
+        </a:ln>
+      </a:lnStyleLst>
+      <a:effectStyleLst>
+        <a:effectStyle>
+          <a:effectLst/>
+        </a:effectStyle>
+        <a:effectStyle>
+          <a:effectLst/>
+        </a:effectStyle>
+        <a:effectStyle>
+          <a:effectLst>
+            <a:outerShdw blurRad="57150" dist="19050" dir="5400000" algn="ctr" rotWithShape="0">
+              <a:srgbClr val="000000">
+                <a:alpha val="63000"/>
+              </a:srgbClr>
+            </a:outerShdw>
+          </a:effectLst>
+        </a:effectStyle>
+      </a:effectStyleLst>
+      <a:bgFillStyleLst>
+        <a:solidFill>
+          <a:schemeClr val="phClr"/>
+        </a:solidFill>
+        <a:solidFill>
+          <a:schemeClr val="phClr">
+            <a:tint val="95000"/>
+            <a:satMod val="170000"/>
+          </a:schemeClr>
+        </a:solidFill>
+        <a:gradFill rotWithShape="1">
+          <a:gsLst>
+            <a:gs pos="0">
+              <a:schemeClr val="phClr">
+                <a:tint val="93000"/>
+                <a:satMod val="150000"/>
+                <a:shade val="98000"/>
+                <a:lumMod val="102000"/>
+              </a:schemeClr>
+            </a:gs>
+            <a:gs pos="50000">
+              <a:schemeClr val="phClr">
+                <a:tint val="98000"/>
+                <a:satMod val="130000"/>
+                <a:shade val="90000"/>
+                <a:lumMod val="103000"/>
+              </a:schemeClr>
+            </a:gs>
+            <a:gs pos="100000">
+              <a:schemeClr val="phClr">
+                <a:shade val="63000"/>
+                <a:satMod val="120000"/>
+              </a:schemeClr>
+            </a:gs>
+          </a:gsLst>
+          <a:lin ang="5400000" scaled="0"/>
+        </a:gradFill>
+      </a:bgFillStyleLst>
+    </a:fmtScheme>
+  </a:themeElements>
+  <a:objectDefaults/>
+  <a:extraClrSchemeLst/>
+  <a:extLst>
+    <a:ext uri="{05A4C25C-085E-4340-85A3-A5531E510DB2}">
+      <thm15:themeFamily xmlns:thm15="http://schemas.microsoft.com/office/thememl/2012/main" name="Office Theme" id="{62F939B6-93AF-4DB8-9C6B-D6C7DFDC589F}" vid="{4A3C46E8-61CC-4603-A589-7422A47A8E4A}"/>
+    </a:ext>
+  </a:extLst>
+</a:theme>
 </file>
</xml_diff>

<commit_message>
Add future and finish intro.
</commit_message>
<xml_diff>
--- a/splash_slides.pptx
+++ b/splash_slides.pptx
@@ -5,7 +5,7 @@
     <p:sldMasterId id="2147483714" r:id="rId1"/>
   </p:sldMasterIdLst>
   <p:notesMasterIdLst>
-    <p:notesMasterId r:id="rId31"/>
+    <p:notesMasterId r:id="rId35"/>
   </p:notesMasterIdLst>
   <p:sldIdLst>
     <p:sldId id="256" r:id="rId2"/>
@@ -31,12 +31,16 @@
     <p:sldId id="283" r:id="rId22"/>
     <p:sldId id="274" r:id="rId23"/>
     <p:sldId id="286" r:id="rId24"/>
-    <p:sldId id="287" r:id="rId25"/>
-    <p:sldId id="258" r:id="rId26"/>
-    <p:sldId id="259" r:id="rId27"/>
-    <p:sldId id="260" r:id="rId28"/>
-    <p:sldId id="266" r:id="rId29"/>
-    <p:sldId id="261" r:id="rId30"/>
+    <p:sldId id="288" r:id="rId25"/>
+    <p:sldId id="289" r:id="rId26"/>
+    <p:sldId id="258" r:id="rId27"/>
+    <p:sldId id="259" r:id="rId28"/>
+    <p:sldId id="260" r:id="rId29"/>
+    <p:sldId id="290" r:id="rId30"/>
+    <p:sldId id="291" r:id="rId31"/>
+    <p:sldId id="292" r:id="rId32"/>
+    <p:sldId id="266" r:id="rId33"/>
+    <p:sldId id="261" r:id="rId34"/>
   </p:sldIdLst>
   <p:sldSz cx="12192000" cy="6858000"/>
   <p:notesSz cx="6858000" cy="9144000"/>
@@ -748,6 +752,200 @@
     <p:extLst>
       <p:ext uri="{BB962C8B-B14F-4D97-AF65-F5344CB8AC3E}">
         <p14:creationId xmlns:p14="http://schemas.microsoft.com/office/powerpoint/2010/main" val="717307250"/>
+      </p:ext>
+    </p:extLst>
+  </p:cSld>
+  <p:clrMapOvr>
+    <a:masterClrMapping/>
+  </p:clrMapOvr>
+</p:notes>
+</file>
+
+<file path=ppt/notesSlides/notesSlide4.xml><?xml version="1.0" encoding="utf-8"?>
+<p:notes xmlns:a="http://schemas.openxmlformats.org/drawingml/2006/main" xmlns:r="http://schemas.openxmlformats.org/officeDocument/2006/relationships" xmlns:p="http://schemas.openxmlformats.org/presentationml/2006/main">
+  <p:cSld>
+    <p:spTree>
+      <p:nvGrpSpPr>
+        <p:cNvPr id="1" name=""/>
+        <p:cNvGrpSpPr/>
+        <p:nvPr/>
+      </p:nvGrpSpPr>
+      <p:grpSpPr>
+        <a:xfrm>
+          <a:off x="0" y="0"/>
+          <a:ext cx="0" cy="0"/>
+          <a:chOff x="0" y="0"/>
+          <a:chExt cx="0" cy="0"/>
+        </a:xfrm>
+      </p:grpSpPr>
+      <p:sp>
+        <p:nvSpPr>
+          <p:cNvPr id="2" name="Slide Image Placeholder 1"/>
+          <p:cNvSpPr>
+            <a:spLocks noGrp="1" noRot="1" noChangeAspect="1"/>
+          </p:cNvSpPr>
+          <p:nvPr>
+            <p:ph type="sldImg"/>
+          </p:nvPr>
+        </p:nvSpPr>
+        <p:spPr/>
+      </p:sp>
+      <p:sp>
+        <p:nvSpPr>
+          <p:cNvPr id="3" name="Notes Placeholder 2"/>
+          <p:cNvSpPr>
+            <a:spLocks noGrp="1"/>
+          </p:cNvSpPr>
+          <p:nvPr>
+            <p:ph type="body" idx="1"/>
+          </p:nvPr>
+        </p:nvSpPr>
+        <p:spPr/>
+        <p:txBody>
+          <a:bodyPr/>
+          <a:lstStyle/>
+          <a:p>
+            <a:pPr marL="0" marR="0" lvl="0" indent="0" algn="l" defTabSz="914400" rtl="0" eaLnBrk="1" fontAlgn="auto" latinLnBrk="0" hangingPunct="1">
+              <a:lnSpc>
+                <a:spcPct val="100000"/>
+              </a:lnSpc>
+              <a:spcBef>
+                <a:spcPts val="0"/>
+              </a:spcBef>
+              <a:spcAft>
+                <a:spcPts val="0"/>
+              </a:spcAft>
+              <a:buClrTx/>
+              <a:buSzTx/>
+              <a:buFontTx/>
+              <a:buNone/>
+              <a:tabLst/>
+              <a:defRPr/>
+            </a:pPr>
+            <a:r>
+              <a:rPr lang="en-US" dirty="0"/>
+              <a:t>Ambiguous sentences: https://www.teatime-mag.com/magazines/wp-content/themes/tt/print/teatime61/print.pdf</a:t>
+            </a:r>
+          </a:p>
+          <a:p>
+            <a:endParaRPr lang="en-US" dirty="0"/>
+          </a:p>
+        </p:txBody>
+      </p:sp>
+      <p:sp>
+        <p:nvSpPr>
+          <p:cNvPr id="4" name="Slide Number Placeholder 3"/>
+          <p:cNvSpPr>
+            <a:spLocks noGrp="1"/>
+          </p:cNvSpPr>
+          <p:nvPr>
+            <p:ph type="sldNum" sz="quarter" idx="10"/>
+          </p:nvPr>
+        </p:nvSpPr>
+        <p:spPr/>
+        <p:txBody>
+          <a:bodyPr/>
+          <a:lstStyle/>
+          <a:p>
+            <a:fld id="{A07ECB9E-536C-4551-96DA-621CC202222E}" type="slidenum">
+              <a:rPr lang="en-US" smtClean="0"/>
+              <a:t>25</a:t>
+            </a:fld>
+            <a:endParaRPr lang="en-US"/>
+          </a:p>
+        </p:txBody>
+      </p:sp>
+    </p:spTree>
+    <p:extLst>
+      <p:ext uri="{BB962C8B-B14F-4D97-AF65-F5344CB8AC3E}">
+        <p14:creationId xmlns:p14="http://schemas.microsoft.com/office/powerpoint/2010/main" val="467127683"/>
+      </p:ext>
+    </p:extLst>
+  </p:cSld>
+  <p:clrMapOvr>
+    <a:masterClrMapping/>
+  </p:clrMapOvr>
+</p:notes>
+</file>
+
+<file path=ppt/notesSlides/notesSlide5.xml><?xml version="1.0" encoding="utf-8"?>
+<p:notes xmlns:a="http://schemas.openxmlformats.org/drawingml/2006/main" xmlns:r="http://schemas.openxmlformats.org/officeDocument/2006/relationships" xmlns:p="http://schemas.openxmlformats.org/presentationml/2006/main">
+  <p:cSld>
+    <p:spTree>
+      <p:nvGrpSpPr>
+        <p:cNvPr id="1" name=""/>
+        <p:cNvGrpSpPr/>
+        <p:nvPr/>
+      </p:nvGrpSpPr>
+      <p:grpSpPr>
+        <a:xfrm>
+          <a:off x="0" y="0"/>
+          <a:ext cx="0" cy="0"/>
+          <a:chOff x="0" y="0"/>
+          <a:chExt cx="0" cy="0"/>
+        </a:xfrm>
+      </p:grpSpPr>
+      <p:sp>
+        <p:nvSpPr>
+          <p:cNvPr id="2" name="Slide Image Placeholder 1"/>
+          <p:cNvSpPr>
+            <a:spLocks noGrp="1" noRot="1" noChangeAspect="1"/>
+          </p:cNvSpPr>
+          <p:nvPr>
+            <p:ph type="sldImg"/>
+          </p:nvPr>
+        </p:nvSpPr>
+        <p:spPr/>
+      </p:sp>
+      <p:sp>
+        <p:nvSpPr>
+          <p:cNvPr id="3" name="Notes Placeholder 2"/>
+          <p:cNvSpPr>
+            <a:spLocks noGrp="1"/>
+          </p:cNvSpPr>
+          <p:nvPr>
+            <p:ph type="body" idx="1"/>
+          </p:nvPr>
+        </p:nvSpPr>
+        <p:spPr/>
+        <p:txBody>
+          <a:bodyPr/>
+          <a:lstStyle/>
+          <a:p>
+            <a:r>
+              <a:rPr lang="en-US" dirty="0"/>
+              <a:t>Bias, HCI, benefits/risks</a:t>
+            </a:r>
+          </a:p>
+        </p:txBody>
+      </p:sp>
+      <p:sp>
+        <p:nvSpPr>
+          <p:cNvPr id="4" name="Slide Number Placeholder 3"/>
+          <p:cNvSpPr>
+            <a:spLocks noGrp="1"/>
+          </p:cNvSpPr>
+          <p:nvPr>
+            <p:ph type="sldNum" sz="quarter" idx="10"/>
+          </p:nvPr>
+        </p:nvSpPr>
+        <p:spPr/>
+        <p:txBody>
+          <a:bodyPr/>
+          <a:lstStyle/>
+          <a:p>
+            <a:fld id="{A07ECB9E-536C-4551-96DA-621CC202222E}" type="slidenum">
+              <a:rPr lang="en-US" smtClean="0"/>
+              <a:t>32</a:t>
+            </a:fld>
+            <a:endParaRPr lang="en-US"/>
+          </a:p>
+        </p:txBody>
+      </p:sp>
+    </p:spTree>
+    <p:extLst>
+      <p:ext uri="{BB962C8B-B14F-4D97-AF65-F5344CB8AC3E}">
+        <p14:creationId xmlns:p14="http://schemas.microsoft.com/office/powerpoint/2010/main" val="454863192"/>
       </p:ext>
     </p:extLst>
   </p:cSld>
@@ -4899,40 +5097,21 @@
             <p:ph type="title"/>
           </p:nvPr>
         </p:nvSpPr>
-        <p:spPr/>
-        <p:txBody>
-          <a:bodyPr/>
-          <a:lstStyle/>
-          <a:p>
+        <p:spPr>
+          <a:xfrm>
+            <a:off x="838200" y="2766218"/>
+            <a:ext cx="10515600" cy="1325563"/>
+          </a:xfrm>
+        </p:spPr>
+        <p:txBody>
+          <a:bodyPr/>
+          <a:lstStyle/>
+          <a:p>
+            <a:pPr algn="ctr"/>
             <a:r>
               <a:rPr lang="en-US" dirty="0"/>
               <a:t>What makes it difficult?</a:t>
             </a:r>
-          </a:p>
-        </p:txBody>
-      </p:sp>
-      <p:sp>
-        <p:nvSpPr>
-          <p:cNvPr id="3" name="Content Placeholder 2">
-            <a:extLst>
-              <a:ext uri="{FF2B5EF4-FFF2-40B4-BE49-F238E27FC236}">
-                <a16:creationId xmlns:a16="http://schemas.microsoft.com/office/drawing/2014/main" id="{B303CBB5-711E-4E04-996B-148A5EA62206}"/>
-              </a:ext>
-            </a:extLst>
-          </p:cNvPr>
-          <p:cNvSpPr>
-            <a:spLocks noGrp="1"/>
-          </p:cNvSpPr>
-          <p:nvPr>
-            <p:ph idx="1"/>
-          </p:nvPr>
-        </p:nvSpPr>
-        <p:spPr/>
-        <p:txBody>
-          <a:bodyPr/>
-          <a:lstStyle/>
-          <a:p>
-            <a:endParaRPr lang="en-US"/>
           </a:p>
         </p:txBody>
       </p:sp>
@@ -5241,12 +5420,47 @@
           <a:chExt cx="0" cy="0"/>
         </a:xfrm>
       </p:grpSpPr>
+      <p:sp>
+        <p:nvSpPr>
+          <p:cNvPr id="6" name="TextBox 5">
+            <a:extLst>
+              <a:ext uri="{FF2B5EF4-FFF2-40B4-BE49-F238E27FC236}">
+                <a16:creationId xmlns:a16="http://schemas.microsoft.com/office/drawing/2014/main" id="{B5B06D9A-3C66-477E-9B87-3F4F0FC6354B}"/>
+              </a:ext>
+            </a:extLst>
+          </p:cNvPr>
+          <p:cNvSpPr txBox="1"/>
+          <p:nvPr/>
+        </p:nvSpPr>
+        <p:spPr>
+          <a:xfrm>
+            <a:off x="395654" y="6145823"/>
+            <a:ext cx="5892832" cy="369332"/>
+          </a:xfrm>
+          <a:prstGeom prst="rect">
+            <a:avLst/>
+          </a:prstGeom>
+          <a:noFill/>
+        </p:spPr>
+        <p:txBody>
+          <a:bodyPr wrap="none" rtlCol="0">
+            <a:spAutoFit/>
+          </a:bodyPr>
+          <a:lstStyle/>
+          <a:p>
+            <a:r>
+              <a:rPr lang="en-US" dirty="0"/>
+              <a:t>https://www.creators.com/read/speed-bump/02/16/165650</a:t>
+            </a:r>
+          </a:p>
+        </p:txBody>
+      </p:sp>
       <p:pic>
         <p:nvPicPr>
-          <p:cNvPr id="5" name="Picture 4">
-            <a:extLst>
-              <a:ext uri="{FF2B5EF4-FFF2-40B4-BE49-F238E27FC236}">
-                <a16:creationId xmlns:a16="http://schemas.microsoft.com/office/drawing/2014/main" id="{DB75139E-59B5-4025-9056-F784BFDB105B}"/>
+          <p:cNvPr id="7" name="Picture 6">
+            <a:extLst>
+              <a:ext uri="{FF2B5EF4-FFF2-40B4-BE49-F238E27FC236}">
+                <a16:creationId xmlns:a16="http://schemas.microsoft.com/office/drawing/2014/main" id="{54F1A9B8-7156-4469-8B53-2DC482FEEAC9}"/>
               </a:ext>
             </a:extLst>
           </p:cNvPr>
@@ -5263,49 +5477,14 @@
         </p:blipFill>
         <p:spPr>
           <a:xfrm>
-            <a:off x="2076450" y="1771650"/>
-            <a:ext cx="8039100" cy="3314700"/>
+            <a:off x="3914775" y="1233487"/>
+            <a:ext cx="4362450" cy="4391025"/>
           </a:xfrm>
           <a:prstGeom prst="rect">
             <a:avLst/>
           </a:prstGeom>
         </p:spPr>
       </p:pic>
-      <p:sp>
-        <p:nvSpPr>
-          <p:cNvPr id="6" name="TextBox 5">
-            <a:extLst>
-              <a:ext uri="{FF2B5EF4-FFF2-40B4-BE49-F238E27FC236}">
-                <a16:creationId xmlns:a16="http://schemas.microsoft.com/office/drawing/2014/main" id="{B5B06D9A-3C66-477E-9B87-3F4F0FC6354B}"/>
-              </a:ext>
-            </a:extLst>
-          </p:cNvPr>
-          <p:cNvSpPr txBox="1"/>
-          <p:nvPr/>
-        </p:nvSpPr>
-        <p:spPr>
-          <a:xfrm>
-            <a:off x="395654" y="6145823"/>
-            <a:ext cx="9515746" cy="369332"/>
-          </a:xfrm>
-          <a:prstGeom prst="rect">
-            <a:avLst/>
-          </a:prstGeom>
-          <a:noFill/>
-        </p:spPr>
-        <p:txBody>
-          <a:bodyPr wrap="none" rtlCol="0">
-            <a:spAutoFit/>
-          </a:bodyPr>
-          <a:lstStyle/>
-          <a:p>
-            <a:r>
-              <a:rPr lang="en-US" dirty="0"/>
-              <a:t>https://www.ecenglish.com/learnenglish/lessons/homonyms-words-have-more-one-meaning-spirit</a:t>
-            </a:r>
-          </a:p>
-        </p:txBody>
-      </p:sp>
     </p:spTree>
     <p:extLst>
       <p:ext uri="{BB962C8B-B14F-4D97-AF65-F5344CB8AC3E}">
@@ -5526,58 +5705,67 @@
           <a:chExt cx="0" cy="0"/>
         </a:xfrm>
       </p:grpSpPr>
-      <p:sp>
-        <p:nvSpPr>
-          <p:cNvPr id="2" name="Title 1">
-            <a:extLst>
-              <a:ext uri="{FF2B5EF4-FFF2-40B4-BE49-F238E27FC236}">
-                <a16:creationId xmlns:a16="http://schemas.microsoft.com/office/drawing/2014/main" id="{427EAC03-12FC-4596-8253-3F44D0C617D1}"/>
-              </a:ext>
-            </a:extLst>
-          </p:cNvPr>
-          <p:cNvSpPr>
-            <a:spLocks noGrp="1"/>
-          </p:cNvSpPr>
-          <p:nvPr>
-            <p:ph type="title"/>
-          </p:nvPr>
-        </p:nvSpPr>
-        <p:spPr/>
-        <p:txBody>
-          <a:bodyPr/>
+      <p:pic>
+        <p:nvPicPr>
+          <p:cNvPr id="5" name="Picture 4">
+            <a:extLst>
+              <a:ext uri="{FF2B5EF4-FFF2-40B4-BE49-F238E27FC236}">
+                <a16:creationId xmlns:a16="http://schemas.microsoft.com/office/drawing/2014/main" id="{66408A3E-9798-43BD-8B1A-BA7876AEE2D1}"/>
+              </a:ext>
+            </a:extLst>
+          </p:cNvPr>
+          <p:cNvPicPr>
+            <a:picLocks noChangeAspect="1"/>
+          </p:cNvPicPr>
+          <p:nvPr/>
+        </p:nvPicPr>
+        <p:blipFill>
+          <a:blip r:embed="rId2"/>
+          <a:stretch>
+            <a:fillRect/>
+          </a:stretch>
+        </p:blipFill>
+        <p:spPr>
+          <a:xfrm>
+            <a:off x="2957512" y="881062"/>
+            <a:ext cx="6276975" cy="5095875"/>
+          </a:xfrm>
+          <a:prstGeom prst="rect">
+            <a:avLst/>
+          </a:prstGeom>
+        </p:spPr>
+      </p:pic>
+      <p:sp>
+        <p:nvSpPr>
+          <p:cNvPr id="6" name="TextBox 5">
+            <a:extLst>
+              <a:ext uri="{FF2B5EF4-FFF2-40B4-BE49-F238E27FC236}">
+                <a16:creationId xmlns:a16="http://schemas.microsoft.com/office/drawing/2014/main" id="{64FF75DC-A0FB-4F5B-95E2-C0C190ABF7B6}"/>
+              </a:ext>
+            </a:extLst>
+          </p:cNvPr>
+          <p:cNvSpPr txBox="1"/>
+          <p:nvPr/>
+        </p:nvSpPr>
+        <p:spPr>
+          <a:xfrm>
+            <a:off x="553915" y="6497515"/>
+            <a:ext cx="3253327" cy="369332"/>
+          </a:xfrm>
+          <a:prstGeom prst="rect">
+            <a:avLst/>
+          </a:prstGeom>
+          <a:noFill/>
+        </p:spPr>
+        <p:txBody>
+          <a:bodyPr wrap="none" rtlCol="0">
+            <a:spAutoFit/>
+          </a:bodyPr>
           <a:lstStyle/>
           <a:p>
             <a:r>
               <a:rPr lang="en-US" dirty="0"/>
-              <a:t>TODO</a:t>
-            </a:r>
-          </a:p>
-        </p:txBody>
-      </p:sp>
-      <p:sp>
-        <p:nvSpPr>
-          <p:cNvPr id="3" name="Content Placeholder 2">
-            <a:extLst>
-              <a:ext uri="{FF2B5EF4-FFF2-40B4-BE49-F238E27FC236}">
-                <a16:creationId xmlns:a16="http://schemas.microsoft.com/office/drawing/2014/main" id="{FD82E601-B22D-4EEC-9A0F-9F94626A17F3}"/>
-              </a:ext>
-            </a:extLst>
-          </p:cNvPr>
-          <p:cNvSpPr>
-            <a:spLocks noGrp="1"/>
-          </p:cNvSpPr>
-          <p:nvPr>
-            <p:ph idx="1"/>
-          </p:nvPr>
-        </p:nvSpPr>
-        <p:spPr/>
-        <p:txBody>
-          <a:bodyPr/>
-          <a:lstStyle/>
-          <a:p>
-            <a:r>
-              <a:rPr lang="en-US" dirty="0"/>
-              <a:t>Ambiguous sentences: https://www.teatime-mag.com/magazines/wp-content/themes/tt/print/teatime61/print.pdf</a:t>
+              <a:t>http://explosm.net/comics/1206</a:t>
             </a:r>
           </a:p>
         </p:txBody>
@@ -5585,7 +5773,7 @@
     </p:spTree>
     <p:extLst>
       <p:ext uri="{BB962C8B-B14F-4D97-AF65-F5344CB8AC3E}">
-        <p14:creationId xmlns:p14="http://schemas.microsoft.com/office/powerpoint/2010/main" val="3284493440"/>
+        <p14:creationId xmlns:p14="http://schemas.microsoft.com/office/powerpoint/2010/main" val="2338183793"/>
       </p:ext>
     </p:extLst>
   </p:cSld>
@@ -5612,58 +5800,67 @@
           <a:chExt cx="0" cy="0"/>
         </a:xfrm>
       </p:grpSpPr>
-      <p:sp>
-        <p:nvSpPr>
-          <p:cNvPr id="2" name="Title 1">
-            <a:extLst>
-              <a:ext uri="{FF2B5EF4-FFF2-40B4-BE49-F238E27FC236}">
-                <a16:creationId xmlns:a16="http://schemas.microsoft.com/office/drawing/2014/main" id="{18A90EB0-8369-4399-91E0-FA372BB7FCCD}"/>
-              </a:ext>
-            </a:extLst>
-          </p:cNvPr>
-          <p:cNvSpPr>
-            <a:spLocks noGrp="1"/>
-          </p:cNvSpPr>
-          <p:nvPr>
-            <p:ph type="title"/>
-          </p:nvPr>
-        </p:nvSpPr>
-        <p:spPr/>
-        <p:txBody>
-          <a:bodyPr/>
+      <p:pic>
+        <p:nvPicPr>
+          <p:cNvPr id="4" name="Picture 3">
+            <a:extLst>
+              <a:ext uri="{FF2B5EF4-FFF2-40B4-BE49-F238E27FC236}">
+                <a16:creationId xmlns:a16="http://schemas.microsoft.com/office/drawing/2014/main" id="{51CFC2AF-9F3B-415D-84FC-7D0FF446C805}"/>
+              </a:ext>
+            </a:extLst>
+          </p:cNvPr>
+          <p:cNvPicPr>
+            <a:picLocks noChangeAspect="1"/>
+          </p:cNvPicPr>
+          <p:nvPr/>
+        </p:nvPicPr>
+        <p:blipFill>
+          <a:blip r:embed="rId3"/>
+          <a:stretch>
+            <a:fillRect/>
+          </a:stretch>
+        </p:blipFill>
+        <p:spPr>
+          <a:xfrm>
+            <a:off x="3933297" y="567104"/>
+            <a:ext cx="4325405" cy="5723792"/>
+          </a:xfrm>
+          <a:prstGeom prst="rect">
+            <a:avLst/>
+          </a:prstGeom>
+        </p:spPr>
+      </p:pic>
+      <p:sp>
+        <p:nvSpPr>
+          <p:cNvPr id="5" name="TextBox 4">
+            <a:extLst>
+              <a:ext uri="{FF2B5EF4-FFF2-40B4-BE49-F238E27FC236}">
+                <a16:creationId xmlns:a16="http://schemas.microsoft.com/office/drawing/2014/main" id="{0F073715-D9B2-44B5-9070-86D8F3D4B61E}"/>
+              </a:ext>
+            </a:extLst>
+          </p:cNvPr>
+          <p:cNvSpPr txBox="1"/>
+          <p:nvPr/>
+        </p:nvSpPr>
+        <p:spPr>
+          <a:xfrm>
+            <a:off x="228600" y="6488668"/>
+            <a:ext cx="4271554" cy="369332"/>
+          </a:xfrm>
+          <a:prstGeom prst="rect">
+            <a:avLst/>
+          </a:prstGeom>
+          <a:noFill/>
+        </p:spPr>
+        <p:txBody>
+          <a:bodyPr wrap="none" rtlCol="0">
+            <a:spAutoFit/>
+          </a:bodyPr>
           <a:lstStyle/>
           <a:p>
             <a:r>
               <a:rPr lang="en-US" dirty="0"/>
-              <a:t>How does it work?</a:t>
-            </a:r>
-          </a:p>
-        </p:txBody>
-      </p:sp>
-      <p:sp>
-        <p:nvSpPr>
-          <p:cNvPr id="3" name="Text Placeholder 2">
-            <a:extLst>
-              <a:ext uri="{FF2B5EF4-FFF2-40B4-BE49-F238E27FC236}">
-                <a16:creationId xmlns:a16="http://schemas.microsoft.com/office/drawing/2014/main" id="{65C440A8-BD6B-4E31-9859-636FAB8718D2}"/>
-              </a:ext>
-            </a:extLst>
-          </p:cNvPr>
-          <p:cNvSpPr>
-            <a:spLocks noGrp="1"/>
-          </p:cNvSpPr>
-          <p:nvPr>
-            <p:ph type="body" idx="1"/>
-          </p:nvPr>
-        </p:nvSpPr>
-        <p:spPr/>
-        <p:txBody>
-          <a:bodyPr/>
-          <a:lstStyle/>
-          <a:p>
-            <a:r>
-              <a:rPr lang="en-US" dirty="0"/>
-              <a:t>…and how can we make it work?</a:t>
+              <a:t>https://imgur.com/r/thesimpsons/1ZKxV5O</a:t>
             </a:r>
           </a:p>
         </p:txBody>
@@ -5671,7 +5868,7 @@
     </p:spTree>
     <p:extLst>
       <p:ext uri="{BB962C8B-B14F-4D97-AF65-F5344CB8AC3E}">
-        <p14:creationId xmlns:p14="http://schemas.microsoft.com/office/powerpoint/2010/main" val="1449710088"/>
+        <p14:creationId xmlns:p14="http://schemas.microsoft.com/office/powerpoint/2010/main" val="861989681"/>
       </p:ext>
     </p:extLst>
   </p:cSld>
@@ -5703,7 +5900,7 @@
           <p:cNvPr id="2" name="Title 1">
             <a:extLst>
               <a:ext uri="{FF2B5EF4-FFF2-40B4-BE49-F238E27FC236}">
-                <a16:creationId xmlns:a16="http://schemas.microsoft.com/office/drawing/2014/main" id="{26A9EA07-C815-4C12-8064-A8C916741E39}"/>
+                <a16:creationId xmlns:a16="http://schemas.microsoft.com/office/drawing/2014/main" id="{18A90EB0-8369-4399-91E0-FA372BB7FCCD}"/>
               </a:ext>
             </a:extLst>
           </p:cNvPr>
@@ -5721,7 +5918,7 @@
           <a:p>
             <a:r>
               <a:rPr lang="en-US" dirty="0"/>
-              <a:t>Where do we use it?</a:t>
+              <a:t>How does it work?</a:t>
             </a:r>
           </a:p>
         </p:txBody>
@@ -5731,7 +5928,7 @@
           <p:cNvPr id="3" name="Text Placeholder 2">
             <a:extLst>
               <a:ext uri="{FF2B5EF4-FFF2-40B4-BE49-F238E27FC236}">
-                <a16:creationId xmlns:a16="http://schemas.microsoft.com/office/drawing/2014/main" id="{BB0FC9DE-A777-429C-A27C-BFD49F843988}"/>
+                <a16:creationId xmlns:a16="http://schemas.microsoft.com/office/drawing/2014/main" id="{65C440A8-BD6B-4E31-9859-636FAB8718D2}"/>
               </a:ext>
             </a:extLst>
           </p:cNvPr>
@@ -5749,7 +5946,7 @@
           <a:p>
             <a:r>
               <a:rPr lang="en-US" dirty="0"/>
-              <a:t>…and how do we use it?</a:t>
+              <a:t>…and how can we make it work?</a:t>
             </a:r>
           </a:p>
         </p:txBody>
@@ -5757,7 +5954,7 @@
     </p:spTree>
     <p:extLst>
       <p:ext uri="{BB962C8B-B14F-4D97-AF65-F5344CB8AC3E}">
-        <p14:creationId xmlns:p14="http://schemas.microsoft.com/office/powerpoint/2010/main" val="3299538302"/>
+        <p14:creationId xmlns:p14="http://schemas.microsoft.com/office/powerpoint/2010/main" val="1449710088"/>
       </p:ext>
     </p:extLst>
   </p:cSld>
@@ -5789,7 +5986,7 @@
           <p:cNvPr id="2" name="Title 1">
             <a:extLst>
               <a:ext uri="{FF2B5EF4-FFF2-40B4-BE49-F238E27FC236}">
-                <a16:creationId xmlns:a16="http://schemas.microsoft.com/office/drawing/2014/main" id="{7B77F8BE-4F19-449F-8AC6-2F4872E1A50C}"/>
+                <a16:creationId xmlns:a16="http://schemas.microsoft.com/office/drawing/2014/main" id="{26A9EA07-C815-4C12-8064-A8C916741E39}"/>
               </a:ext>
             </a:extLst>
           </p:cNvPr>
@@ -5807,7 +6004,7 @@
           <a:p>
             <a:r>
               <a:rPr lang="en-US" dirty="0"/>
-              <a:t>What else could we do?</a:t>
+              <a:t>Where do we use it?</a:t>
             </a:r>
           </a:p>
         </p:txBody>
@@ -5817,7 +6014,7 @@
           <p:cNvPr id="3" name="Text Placeholder 2">
             <a:extLst>
               <a:ext uri="{FF2B5EF4-FFF2-40B4-BE49-F238E27FC236}">
-                <a16:creationId xmlns:a16="http://schemas.microsoft.com/office/drawing/2014/main" id="{C6F65EE0-41D5-4689-8723-6A265983E289}"/>
+                <a16:creationId xmlns:a16="http://schemas.microsoft.com/office/drawing/2014/main" id="{BB0FC9DE-A777-429C-A27C-BFD49F843988}"/>
               </a:ext>
             </a:extLst>
           </p:cNvPr>
@@ -5835,7 +6032,7 @@
           <a:p>
             <a:r>
               <a:rPr lang="en-US" dirty="0"/>
-              <a:t>…and what should we do?</a:t>
+              <a:t>…and how do we use it?</a:t>
             </a:r>
           </a:p>
         </p:txBody>
@@ -5843,7 +6040,7 @@
     </p:spTree>
     <p:extLst>
       <p:ext uri="{BB962C8B-B14F-4D97-AF65-F5344CB8AC3E}">
-        <p14:creationId xmlns:p14="http://schemas.microsoft.com/office/powerpoint/2010/main" val="92633407"/>
+        <p14:creationId xmlns:p14="http://schemas.microsoft.com/office/powerpoint/2010/main" val="3299538302"/>
       </p:ext>
     </p:extLst>
   </p:cSld>
@@ -5872,10 +6069,10 @@
       </p:grpSpPr>
       <p:sp>
         <p:nvSpPr>
-          <p:cNvPr id="4" name="Title 3">
-            <a:extLst>
-              <a:ext uri="{FF2B5EF4-FFF2-40B4-BE49-F238E27FC236}">
-                <a16:creationId xmlns:a16="http://schemas.microsoft.com/office/drawing/2014/main" id="{C9383C8A-7946-4173-B480-76CD3C463DD9}"/>
+          <p:cNvPr id="2" name="Title 1">
+            <a:extLst>
+              <a:ext uri="{FF2B5EF4-FFF2-40B4-BE49-F238E27FC236}">
+                <a16:creationId xmlns:a16="http://schemas.microsoft.com/office/drawing/2014/main" id="{7B77F8BE-4F19-449F-8AC6-2F4872E1A50C}"/>
               </a:ext>
             </a:extLst>
           </p:cNvPr>
@@ -5893,25 +6090,25 @@
           <a:p>
             <a:r>
               <a:rPr lang="en-US" dirty="0"/>
-              <a:t>What can we do in the future?</a:t>
-            </a:r>
-          </a:p>
-        </p:txBody>
-      </p:sp>
-      <p:sp>
-        <p:nvSpPr>
-          <p:cNvPr id="5" name="Content Placeholder 4">
-            <a:extLst>
-              <a:ext uri="{FF2B5EF4-FFF2-40B4-BE49-F238E27FC236}">
-                <a16:creationId xmlns:a16="http://schemas.microsoft.com/office/drawing/2014/main" id="{349AA691-FE59-4D5A-9933-492C45FC0055}"/>
-              </a:ext>
-            </a:extLst>
-          </p:cNvPr>
-          <p:cNvSpPr>
-            <a:spLocks noGrp="1"/>
-          </p:cNvSpPr>
-          <p:nvPr>
-            <p:ph idx="1"/>
+              <a:t>What else could we do?</a:t>
+            </a:r>
+          </a:p>
+        </p:txBody>
+      </p:sp>
+      <p:sp>
+        <p:nvSpPr>
+          <p:cNvPr id="3" name="Text Placeholder 2">
+            <a:extLst>
+              <a:ext uri="{FF2B5EF4-FFF2-40B4-BE49-F238E27FC236}">
+                <a16:creationId xmlns:a16="http://schemas.microsoft.com/office/drawing/2014/main" id="{C6F65EE0-41D5-4689-8723-6A265983E289}"/>
+              </a:ext>
+            </a:extLst>
+          </p:cNvPr>
+          <p:cNvSpPr>
+            <a:spLocks noGrp="1"/>
+          </p:cNvSpPr>
+          <p:nvPr>
+            <p:ph type="body" idx="1"/>
           </p:nvPr>
         </p:nvSpPr>
         <p:spPr/>
@@ -5921,11 +6118,7 @@
           <a:p>
             <a:r>
               <a:rPr lang="en-US" dirty="0"/>
-              <a:t>TODO: Bias, HCI, benefits</a:t>
-            </a:r>
-            <a:r>
-              <a:rPr lang="en-US"/>
-              <a:t>/risks.</a:t>
+              <a:t>…and what should we do?</a:t>
             </a:r>
           </a:p>
         </p:txBody>
@@ -5933,7 +6126,7 @@
     </p:spTree>
     <p:extLst>
       <p:ext uri="{BB962C8B-B14F-4D97-AF65-F5344CB8AC3E}">
-        <p14:creationId xmlns:p14="http://schemas.microsoft.com/office/powerpoint/2010/main" val="2596750859"/>
+        <p14:creationId xmlns:p14="http://schemas.microsoft.com/office/powerpoint/2010/main" val="92633407"/>
       </p:ext>
     </p:extLst>
   </p:cSld>
@@ -5960,58 +6153,67 @@
           <a:chExt cx="0" cy="0"/>
         </a:xfrm>
       </p:grpSpPr>
-      <p:sp>
-        <p:nvSpPr>
-          <p:cNvPr id="2" name="Title 1">
-            <a:extLst>
-              <a:ext uri="{FF2B5EF4-FFF2-40B4-BE49-F238E27FC236}">
-                <a16:creationId xmlns:a16="http://schemas.microsoft.com/office/drawing/2014/main" id="{C3C16B62-FBEF-4E0A-A06F-9E0460E62817}"/>
-              </a:ext>
-            </a:extLst>
-          </p:cNvPr>
-          <p:cNvSpPr>
-            <a:spLocks noGrp="1"/>
-          </p:cNvSpPr>
-          <p:nvPr>
-            <p:ph type="title"/>
-          </p:nvPr>
-        </p:nvSpPr>
-        <p:spPr/>
-        <p:txBody>
-          <a:bodyPr/>
+      <p:pic>
+        <p:nvPicPr>
+          <p:cNvPr id="4" name="Picture 3">
+            <a:extLst>
+              <a:ext uri="{FF2B5EF4-FFF2-40B4-BE49-F238E27FC236}">
+                <a16:creationId xmlns:a16="http://schemas.microsoft.com/office/drawing/2014/main" id="{BC074295-000C-4FAF-BBAE-AC54BA84CC35}"/>
+              </a:ext>
+            </a:extLst>
+          </p:cNvPr>
+          <p:cNvPicPr>
+            <a:picLocks noChangeAspect="1"/>
+          </p:cNvPicPr>
+          <p:nvPr/>
+        </p:nvPicPr>
+        <p:blipFill>
+          <a:blip r:embed="rId2"/>
+          <a:stretch>
+            <a:fillRect/>
+          </a:stretch>
+        </p:blipFill>
+        <p:spPr>
+          <a:xfrm>
+            <a:off x="3719512" y="1428750"/>
+            <a:ext cx="4752975" cy="4000500"/>
+          </a:xfrm>
+          <a:prstGeom prst="rect">
+            <a:avLst/>
+          </a:prstGeom>
+        </p:spPr>
+      </p:pic>
+      <p:sp>
+        <p:nvSpPr>
+          <p:cNvPr id="5" name="TextBox 4">
+            <a:extLst>
+              <a:ext uri="{FF2B5EF4-FFF2-40B4-BE49-F238E27FC236}">
+                <a16:creationId xmlns:a16="http://schemas.microsoft.com/office/drawing/2014/main" id="{6108D87E-8D12-4E55-A8C4-9859FAB1A171}"/>
+              </a:ext>
+            </a:extLst>
+          </p:cNvPr>
+          <p:cNvSpPr txBox="1"/>
+          <p:nvPr/>
+        </p:nvSpPr>
+        <p:spPr>
+          <a:xfrm>
+            <a:off x="395654" y="6488668"/>
+            <a:ext cx="7494231" cy="369332"/>
+          </a:xfrm>
+          <a:prstGeom prst="rect">
+            <a:avLst/>
+          </a:prstGeom>
+          <a:noFill/>
+        </p:spPr>
+        <p:txBody>
+          <a:bodyPr wrap="none" rtlCol="0">
+            <a:spAutoFit/>
+          </a:bodyPr>
           <a:lstStyle/>
           <a:p>
             <a:r>
               <a:rPr lang="en-US" dirty="0"/>
-              <a:t>Questions?</a:t>
-            </a:r>
-          </a:p>
-        </p:txBody>
-      </p:sp>
-      <p:sp>
-        <p:nvSpPr>
-          <p:cNvPr id="3" name="Text Placeholder 2">
-            <a:extLst>
-              <a:ext uri="{FF2B5EF4-FFF2-40B4-BE49-F238E27FC236}">
-                <a16:creationId xmlns:a16="http://schemas.microsoft.com/office/drawing/2014/main" id="{F50A9E9D-A598-47F5-9526-6B1B5668DAEE}"/>
-              </a:ext>
-            </a:extLst>
-          </p:cNvPr>
-          <p:cNvSpPr>
-            <a:spLocks noGrp="1"/>
-          </p:cNvSpPr>
-          <p:nvPr>
-            <p:ph type="body" idx="1"/>
-          </p:nvPr>
-        </p:nvSpPr>
-        <p:spPr/>
-        <p:txBody>
-          <a:bodyPr/>
-          <a:lstStyle/>
-          <a:p>
-            <a:r>
-              <a:rPr lang="en-US" dirty="0"/>
-              <a:t>…and answers?</a:t>
+              <a:t>https://github.com/uclanlp/corefBias/blob/master/NAACL2018_CorefBias.pdf</a:t>
             </a:r>
           </a:p>
         </p:txBody>
@@ -6019,7 +6221,7 @@
     </p:spTree>
     <p:extLst>
       <p:ext uri="{BB962C8B-B14F-4D97-AF65-F5344CB8AC3E}">
-        <p14:creationId xmlns:p14="http://schemas.microsoft.com/office/powerpoint/2010/main" val="1613707132"/>
+        <p14:creationId xmlns:p14="http://schemas.microsoft.com/office/powerpoint/2010/main" val="4055301317"/>
       </p:ext>
     </p:extLst>
   </p:cSld>
@@ -6169,6 +6371,376 @@
     <p:extLst>
       <p:ext uri="{BB962C8B-B14F-4D97-AF65-F5344CB8AC3E}">
         <p14:creationId xmlns:p14="http://schemas.microsoft.com/office/powerpoint/2010/main" val="931729066"/>
+      </p:ext>
+    </p:extLst>
+  </p:cSld>
+  <p:clrMapOvr>
+    <a:masterClrMapping/>
+  </p:clrMapOvr>
+</p:sld>
+</file>
+
+<file path=ppt/slides/slide30.xml><?xml version="1.0" encoding="utf-8"?>
+<p:sld xmlns:a="http://schemas.openxmlformats.org/drawingml/2006/main" xmlns:r="http://schemas.openxmlformats.org/officeDocument/2006/relationships" xmlns:p="http://schemas.openxmlformats.org/presentationml/2006/main">
+  <p:cSld>
+    <p:spTree>
+      <p:nvGrpSpPr>
+        <p:cNvPr id="1" name=""/>
+        <p:cNvGrpSpPr/>
+        <p:nvPr/>
+      </p:nvGrpSpPr>
+      <p:grpSpPr>
+        <a:xfrm>
+          <a:off x="0" y="0"/>
+          <a:ext cx="0" cy="0"/>
+          <a:chOff x="0" y="0"/>
+          <a:chExt cx="0" cy="0"/>
+        </a:xfrm>
+      </p:grpSpPr>
+      <p:pic>
+        <p:nvPicPr>
+          <p:cNvPr id="4" name="Picture 3">
+            <a:extLst>
+              <a:ext uri="{FF2B5EF4-FFF2-40B4-BE49-F238E27FC236}">
+                <a16:creationId xmlns:a16="http://schemas.microsoft.com/office/drawing/2014/main" id="{6441639D-130F-48AB-836B-9F0CCAB508EA}"/>
+              </a:ext>
+            </a:extLst>
+          </p:cNvPr>
+          <p:cNvPicPr>
+            <a:picLocks noChangeAspect="1"/>
+          </p:cNvPicPr>
+          <p:nvPr/>
+        </p:nvPicPr>
+        <p:blipFill>
+          <a:blip r:embed="rId2"/>
+          <a:stretch>
+            <a:fillRect/>
+          </a:stretch>
+        </p:blipFill>
+        <p:spPr>
+          <a:xfrm>
+            <a:off x="152400" y="1681162"/>
+            <a:ext cx="5029200" cy="3495675"/>
+          </a:xfrm>
+          <a:prstGeom prst="rect">
+            <a:avLst/>
+          </a:prstGeom>
+        </p:spPr>
+      </p:pic>
+      <p:pic>
+        <p:nvPicPr>
+          <p:cNvPr id="5" name="Picture 4">
+            <a:extLst>
+              <a:ext uri="{FF2B5EF4-FFF2-40B4-BE49-F238E27FC236}">
+                <a16:creationId xmlns:a16="http://schemas.microsoft.com/office/drawing/2014/main" id="{6C356447-70ED-4FDD-B9F7-6086A6BF983D}"/>
+              </a:ext>
+            </a:extLst>
+          </p:cNvPr>
+          <p:cNvPicPr>
+            <a:picLocks noChangeAspect="1"/>
+          </p:cNvPicPr>
+          <p:nvPr/>
+        </p:nvPicPr>
+        <p:blipFill>
+          <a:blip r:embed="rId3"/>
+          <a:stretch>
+            <a:fillRect/>
+          </a:stretch>
+        </p:blipFill>
+        <p:spPr>
+          <a:xfrm>
+            <a:off x="6096000" y="1754981"/>
+            <a:ext cx="5241679" cy="3348037"/>
+          </a:xfrm>
+          <a:prstGeom prst="rect">
+            <a:avLst/>
+          </a:prstGeom>
+        </p:spPr>
+      </p:pic>
+      <p:sp>
+        <p:nvSpPr>
+          <p:cNvPr id="6" name="TextBox 5">
+            <a:extLst>
+              <a:ext uri="{FF2B5EF4-FFF2-40B4-BE49-F238E27FC236}">
+                <a16:creationId xmlns:a16="http://schemas.microsoft.com/office/drawing/2014/main" id="{0D6CF4EB-CAB5-460A-A8FE-DBB66C9B471D}"/>
+              </a:ext>
+            </a:extLst>
+          </p:cNvPr>
+          <p:cNvSpPr txBox="1"/>
+          <p:nvPr/>
+        </p:nvSpPr>
+        <p:spPr>
+          <a:xfrm>
+            <a:off x="439615" y="6216162"/>
+            <a:ext cx="8733481" cy="246221"/>
+          </a:xfrm>
+          <a:prstGeom prst="rect">
+            <a:avLst/>
+          </a:prstGeom>
+          <a:noFill/>
+        </p:spPr>
+        <p:txBody>
+          <a:bodyPr wrap="none" rtlCol="0">
+            <a:spAutoFit/>
+          </a:bodyPr>
+          <a:lstStyle/>
+          <a:p>
+            <a:r>
+              <a:rPr lang="en-US" sz="1000" dirty="0"/>
+              <a:t>https://www.semanticscholar.org/paper/Word-Embeddings-Quantify-100-Years-of-Gender-and-Garg-Schiebinger/56e8985fa61037662650803d48177d752e9ce557</a:t>
+            </a:r>
+          </a:p>
+        </p:txBody>
+      </p:sp>
+    </p:spTree>
+    <p:extLst>
+      <p:ext uri="{BB962C8B-B14F-4D97-AF65-F5344CB8AC3E}">
+        <p14:creationId xmlns:p14="http://schemas.microsoft.com/office/powerpoint/2010/main" val="3294050383"/>
+      </p:ext>
+    </p:extLst>
+  </p:cSld>
+  <p:clrMapOvr>
+    <a:masterClrMapping/>
+  </p:clrMapOvr>
+</p:sld>
+</file>
+
+<file path=ppt/slides/slide31.xml><?xml version="1.0" encoding="utf-8"?>
+<p:sld xmlns:a="http://schemas.openxmlformats.org/drawingml/2006/main" xmlns:r="http://schemas.openxmlformats.org/officeDocument/2006/relationships" xmlns:p="http://schemas.openxmlformats.org/presentationml/2006/main">
+  <p:cSld>
+    <p:spTree>
+      <p:nvGrpSpPr>
+        <p:cNvPr id="1" name=""/>
+        <p:cNvGrpSpPr/>
+        <p:nvPr/>
+      </p:nvGrpSpPr>
+      <p:grpSpPr>
+        <a:xfrm>
+          <a:off x="0" y="0"/>
+          <a:ext cx="0" cy="0"/>
+          <a:chOff x="0" y="0"/>
+          <a:chExt cx="0" cy="0"/>
+        </a:xfrm>
+      </p:grpSpPr>
+      <p:pic>
+        <p:nvPicPr>
+          <p:cNvPr id="4" name="Picture 3">
+            <a:extLst>
+              <a:ext uri="{FF2B5EF4-FFF2-40B4-BE49-F238E27FC236}">
+                <a16:creationId xmlns:a16="http://schemas.microsoft.com/office/drawing/2014/main" id="{7EBAB47E-D892-4A90-81CE-79326A780CD7}"/>
+              </a:ext>
+            </a:extLst>
+          </p:cNvPr>
+          <p:cNvPicPr>
+            <a:picLocks noChangeAspect="1"/>
+          </p:cNvPicPr>
+          <p:nvPr/>
+        </p:nvPicPr>
+        <p:blipFill>
+          <a:blip r:embed="rId2"/>
+          <a:stretch>
+            <a:fillRect/>
+          </a:stretch>
+        </p:blipFill>
+        <p:spPr>
+          <a:xfrm>
+            <a:off x="90487" y="1119187"/>
+            <a:ext cx="12011025" cy="4619625"/>
+          </a:xfrm>
+          <a:prstGeom prst="rect">
+            <a:avLst/>
+          </a:prstGeom>
+        </p:spPr>
+      </p:pic>
+      <p:sp>
+        <p:nvSpPr>
+          <p:cNvPr id="5" name="TextBox 4">
+            <a:extLst>
+              <a:ext uri="{FF2B5EF4-FFF2-40B4-BE49-F238E27FC236}">
+                <a16:creationId xmlns:a16="http://schemas.microsoft.com/office/drawing/2014/main" id="{17777FA6-516C-459D-8594-24760D1D0AEA}"/>
+              </a:ext>
+            </a:extLst>
+          </p:cNvPr>
+          <p:cNvSpPr txBox="1"/>
+          <p:nvPr/>
+        </p:nvSpPr>
+        <p:spPr>
+          <a:xfrm>
+            <a:off x="90487" y="6418384"/>
+            <a:ext cx="10428176" cy="323165"/>
+          </a:xfrm>
+          <a:prstGeom prst="rect">
+            <a:avLst/>
+          </a:prstGeom>
+          <a:noFill/>
+        </p:spPr>
+        <p:txBody>
+          <a:bodyPr wrap="none" rtlCol="0">
+            <a:spAutoFit/>
+          </a:bodyPr>
+          <a:lstStyle/>
+          <a:p>
+            <a:r>
+              <a:rPr lang="en-US" sz="1500" dirty="0"/>
+              <a:t>https://papers.nips.cc/paper/6228-man-is-to-computer-programmer-as-woman-is-to-homemaker-debiasing-word-embeddings.pdf</a:t>
+            </a:r>
+          </a:p>
+        </p:txBody>
+      </p:sp>
+    </p:spTree>
+    <p:extLst>
+      <p:ext uri="{BB962C8B-B14F-4D97-AF65-F5344CB8AC3E}">
+        <p14:creationId xmlns:p14="http://schemas.microsoft.com/office/powerpoint/2010/main" val="205345932"/>
+      </p:ext>
+    </p:extLst>
+  </p:cSld>
+  <p:clrMapOvr>
+    <a:masterClrMapping/>
+  </p:clrMapOvr>
+</p:sld>
+</file>
+
+<file path=ppt/slides/slide32.xml><?xml version="1.0" encoding="utf-8"?>
+<p:sld xmlns:a="http://schemas.openxmlformats.org/drawingml/2006/main" xmlns:r="http://schemas.openxmlformats.org/officeDocument/2006/relationships" xmlns:p="http://schemas.openxmlformats.org/presentationml/2006/main">
+  <p:cSld>
+    <p:spTree>
+      <p:nvGrpSpPr>
+        <p:cNvPr id="1" name=""/>
+        <p:cNvGrpSpPr/>
+        <p:nvPr/>
+      </p:nvGrpSpPr>
+      <p:grpSpPr>
+        <a:xfrm>
+          <a:off x="0" y="0"/>
+          <a:ext cx="0" cy="0"/>
+          <a:chOff x="0" y="0"/>
+          <a:chExt cx="0" cy="0"/>
+        </a:xfrm>
+      </p:grpSpPr>
+      <p:sp>
+        <p:nvSpPr>
+          <p:cNvPr id="4" name="Title 3">
+            <a:extLst>
+              <a:ext uri="{FF2B5EF4-FFF2-40B4-BE49-F238E27FC236}">
+                <a16:creationId xmlns:a16="http://schemas.microsoft.com/office/drawing/2014/main" id="{C9383C8A-7946-4173-B480-76CD3C463DD9}"/>
+              </a:ext>
+            </a:extLst>
+          </p:cNvPr>
+          <p:cNvSpPr>
+            <a:spLocks noGrp="1"/>
+          </p:cNvSpPr>
+          <p:nvPr>
+            <p:ph type="title"/>
+          </p:nvPr>
+        </p:nvSpPr>
+        <p:spPr>
+          <a:xfrm>
+            <a:off x="838200" y="2766218"/>
+            <a:ext cx="10515600" cy="1325563"/>
+          </a:xfrm>
+        </p:spPr>
+        <p:txBody>
+          <a:bodyPr/>
+          <a:lstStyle/>
+          <a:p>
+            <a:pPr algn="ctr"/>
+            <a:r>
+              <a:rPr lang="en-US" dirty="0"/>
+              <a:t>What can we do in the future?</a:t>
+            </a:r>
+          </a:p>
+        </p:txBody>
+      </p:sp>
+    </p:spTree>
+    <p:extLst>
+      <p:ext uri="{BB962C8B-B14F-4D97-AF65-F5344CB8AC3E}">
+        <p14:creationId xmlns:p14="http://schemas.microsoft.com/office/powerpoint/2010/main" val="2596750859"/>
+      </p:ext>
+    </p:extLst>
+  </p:cSld>
+  <p:clrMapOvr>
+    <a:masterClrMapping/>
+  </p:clrMapOvr>
+</p:sld>
+</file>
+
+<file path=ppt/slides/slide33.xml><?xml version="1.0" encoding="utf-8"?>
+<p:sld xmlns:a="http://schemas.openxmlformats.org/drawingml/2006/main" xmlns:r="http://schemas.openxmlformats.org/officeDocument/2006/relationships" xmlns:p="http://schemas.openxmlformats.org/presentationml/2006/main">
+  <p:cSld>
+    <p:spTree>
+      <p:nvGrpSpPr>
+        <p:cNvPr id="1" name=""/>
+        <p:cNvGrpSpPr/>
+        <p:nvPr/>
+      </p:nvGrpSpPr>
+      <p:grpSpPr>
+        <a:xfrm>
+          <a:off x="0" y="0"/>
+          <a:ext cx="0" cy="0"/>
+          <a:chOff x="0" y="0"/>
+          <a:chExt cx="0" cy="0"/>
+        </a:xfrm>
+      </p:grpSpPr>
+      <p:sp>
+        <p:nvSpPr>
+          <p:cNvPr id="2" name="Title 1">
+            <a:extLst>
+              <a:ext uri="{FF2B5EF4-FFF2-40B4-BE49-F238E27FC236}">
+                <a16:creationId xmlns:a16="http://schemas.microsoft.com/office/drawing/2014/main" id="{C3C16B62-FBEF-4E0A-A06F-9E0460E62817}"/>
+              </a:ext>
+            </a:extLst>
+          </p:cNvPr>
+          <p:cNvSpPr>
+            <a:spLocks noGrp="1"/>
+          </p:cNvSpPr>
+          <p:nvPr>
+            <p:ph type="title"/>
+          </p:nvPr>
+        </p:nvSpPr>
+        <p:spPr/>
+        <p:txBody>
+          <a:bodyPr/>
+          <a:lstStyle/>
+          <a:p>
+            <a:r>
+              <a:rPr lang="en-US" dirty="0"/>
+              <a:t>Questions?</a:t>
+            </a:r>
+          </a:p>
+        </p:txBody>
+      </p:sp>
+      <p:sp>
+        <p:nvSpPr>
+          <p:cNvPr id="3" name="Text Placeholder 2">
+            <a:extLst>
+              <a:ext uri="{FF2B5EF4-FFF2-40B4-BE49-F238E27FC236}">
+                <a16:creationId xmlns:a16="http://schemas.microsoft.com/office/drawing/2014/main" id="{F50A9E9D-A598-47F5-9526-6B1B5668DAEE}"/>
+              </a:ext>
+            </a:extLst>
+          </p:cNvPr>
+          <p:cNvSpPr>
+            <a:spLocks noGrp="1"/>
+          </p:cNvSpPr>
+          <p:nvPr>
+            <p:ph type="body" idx="1"/>
+          </p:nvPr>
+        </p:nvSpPr>
+        <p:spPr/>
+        <p:txBody>
+          <a:bodyPr/>
+          <a:lstStyle/>
+          <a:p>
+            <a:r>
+              <a:rPr lang="en-US" dirty="0"/>
+              <a:t>…and answers?</a:t>
+            </a:r>
+          </a:p>
+        </p:txBody>
+      </p:sp>
+    </p:spTree>
+    <p:extLst>
+      <p:ext uri="{BB962C8B-B14F-4D97-AF65-F5344CB8AC3E}">
+        <p14:creationId xmlns:p14="http://schemas.microsoft.com/office/powerpoint/2010/main" val="1613707132"/>
       </p:ext>
     </p:extLst>
   </p:cSld>
@@ -6943,40 +7515,21 @@
             <p:ph type="title"/>
           </p:nvPr>
         </p:nvSpPr>
-        <p:spPr/>
-        <p:txBody>
-          <a:bodyPr/>
-          <a:lstStyle/>
-          <a:p>
+        <p:spPr>
+          <a:xfrm>
+            <a:off x="838200" y="2766218"/>
+            <a:ext cx="10515600" cy="1325563"/>
+          </a:xfrm>
+        </p:spPr>
+        <p:txBody>
+          <a:bodyPr/>
+          <a:lstStyle/>
+          <a:p>
+            <a:pPr algn="ctr"/>
             <a:r>
               <a:rPr lang="en-US" dirty="0"/>
               <a:t>Why do we care?</a:t>
             </a:r>
-          </a:p>
-        </p:txBody>
-      </p:sp>
-      <p:sp>
-        <p:nvSpPr>
-          <p:cNvPr id="3" name="Content Placeholder 2">
-            <a:extLst>
-              <a:ext uri="{FF2B5EF4-FFF2-40B4-BE49-F238E27FC236}">
-                <a16:creationId xmlns:a16="http://schemas.microsoft.com/office/drawing/2014/main" id="{C9C658B2-AECC-43C6-A4A5-32B3CBFD32A3}"/>
-              </a:ext>
-            </a:extLst>
-          </p:cNvPr>
-          <p:cNvSpPr>
-            <a:spLocks noGrp="1"/>
-          </p:cNvSpPr>
-          <p:nvPr>
-            <p:ph idx="1"/>
-          </p:nvPr>
-        </p:nvSpPr>
-        <p:spPr/>
-        <p:txBody>
-          <a:bodyPr/>
-          <a:lstStyle/>
-          <a:p>
-            <a:endParaRPr lang="en-US"/>
           </a:p>
         </p:txBody>
       </p:sp>

</xml_diff>

<commit_message>
Add data scale info and change app screenshot language.
</commit_message>
<xml_diff>
--- a/splash_slides.pptx
+++ b/splash_slides.pptx
@@ -5,7 +5,7 @@
     <p:sldMasterId id="2147483714" r:id="rId1"/>
   </p:sldMasterIdLst>
   <p:notesMasterIdLst>
-    <p:notesMasterId r:id="rId35"/>
+    <p:notesMasterId r:id="rId38"/>
   </p:notesMasterIdLst>
   <p:sldIdLst>
     <p:sldId id="256" r:id="rId2"/>
@@ -17,30 +17,33 @@
     <p:sldId id="270" r:id="rId8"/>
     <p:sldId id="272" r:id="rId9"/>
     <p:sldId id="281" r:id="rId10"/>
-    <p:sldId id="273" r:id="rId11"/>
-    <p:sldId id="282" r:id="rId12"/>
-    <p:sldId id="275" r:id="rId13"/>
-    <p:sldId id="278" r:id="rId14"/>
-    <p:sldId id="277" r:id="rId15"/>
-    <p:sldId id="276" r:id="rId16"/>
-    <p:sldId id="279" r:id="rId17"/>
-    <p:sldId id="280" r:id="rId18"/>
-    <p:sldId id="265" r:id="rId19"/>
-    <p:sldId id="284" r:id="rId20"/>
-    <p:sldId id="285" r:id="rId21"/>
-    <p:sldId id="283" r:id="rId22"/>
-    <p:sldId id="274" r:id="rId23"/>
-    <p:sldId id="286" r:id="rId24"/>
-    <p:sldId id="288" r:id="rId25"/>
-    <p:sldId id="289" r:id="rId26"/>
-    <p:sldId id="258" r:id="rId27"/>
-    <p:sldId id="259" r:id="rId28"/>
-    <p:sldId id="260" r:id="rId29"/>
-    <p:sldId id="290" r:id="rId30"/>
-    <p:sldId id="291" r:id="rId31"/>
-    <p:sldId id="292" r:id="rId32"/>
-    <p:sldId id="266" r:id="rId33"/>
-    <p:sldId id="261" r:id="rId34"/>
+    <p:sldId id="293" r:id="rId11"/>
+    <p:sldId id="294" r:id="rId12"/>
+    <p:sldId id="295" r:id="rId13"/>
+    <p:sldId id="273" r:id="rId14"/>
+    <p:sldId id="282" r:id="rId15"/>
+    <p:sldId id="275" r:id="rId16"/>
+    <p:sldId id="278" r:id="rId17"/>
+    <p:sldId id="277" r:id="rId18"/>
+    <p:sldId id="276" r:id="rId19"/>
+    <p:sldId id="279" r:id="rId20"/>
+    <p:sldId id="280" r:id="rId21"/>
+    <p:sldId id="265" r:id="rId22"/>
+    <p:sldId id="284" r:id="rId23"/>
+    <p:sldId id="285" r:id="rId24"/>
+    <p:sldId id="283" r:id="rId25"/>
+    <p:sldId id="274" r:id="rId26"/>
+    <p:sldId id="286" r:id="rId27"/>
+    <p:sldId id="288" r:id="rId28"/>
+    <p:sldId id="289" r:id="rId29"/>
+    <p:sldId id="258" r:id="rId30"/>
+    <p:sldId id="259" r:id="rId31"/>
+    <p:sldId id="260" r:id="rId32"/>
+    <p:sldId id="290" r:id="rId33"/>
+    <p:sldId id="291" r:id="rId34"/>
+    <p:sldId id="292" r:id="rId35"/>
+    <p:sldId id="266" r:id="rId36"/>
+    <p:sldId id="261" r:id="rId37"/>
   </p:sldIdLst>
   <p:sldSz cx="12192000" cy="6858000"/>
   <p:notesSz cx="6858000" cy="9144000"/>
@@ -139,6 +142,11 @@
       </a:defRPr>
     </a:lvl9pPr>
   </p:defaultTextStyle>
+  <p:extLst>
+    <p:ext uri="{EFAFB233-063F-42B5-8137-9DF3F51BA10A}">
+      <p15:sldGuideLst xmlns:p15="http://schemas.microsoft.com/office/powerpoint/2012/main"/>
+    </p:ext>
+  </p:extLst>
 </p:presentation>
 </file>
 
@@ -236,7 +244,7 @@
           <a:p>
             <a:fld id="{DFFE31B5-0961-454C-A3DD-42740E317C07}" type="datetimeFigureOut">
               <a:rPr lang="en-US" smtClean="0"/>
-              <a:t>4/19/2018</a:t>
+              <a:t>4/20/2018</a:t>
             </a:fld>
             <a:endParaRPr lang="en-US"/>
           </a:p>
@@ -571,7 +579,7 @@
           <a:p>
             <a:fld id="{A07ECB9E-536C-4551-96DA-621CC202222E}" type="slidenum">
               <a:rPr lang="en-US" smtClean="0"/>
-              <a:t>10</a:t>
+              <a:t>13</a:t>
             </a:fld>
             <a:endParaRPr lang="en-US"/>
           </a:p>
@@ -655,7 +663,7 @@
           <a:p>
             <a:fld id="{A07ECB9E-536C-4551-96DA-621CC202222E}" type="slidenum">
               <a:rPr lang="en-US" smtClean="0"/>
-              <a:t>14</a:t>
+              <a:t>17</a:t>
             </a:fld>
             <a:endParaRPr lang="en-US"/>
           </a:p>
@@ -742,7 +750,7 @@
           <a:p>
             <a:fld id="{A07ECB9E-536C-4551-96DA-621CC202222E}" type="slidenum">
               <a:rPr lang="en-US" smtClean="0"/>
-              <a:t>22</a:t>
+              <a:t>25</a:t>
             </a:fld>
             <a:endParaRPr lang="en-US"/>
           </a:p>
@@ -849,7 +857,7 @@
           <a:p>
             <a:fld id="{A07ECB9E-536C-4551-96DA-621CC202222E}" type="slidenum">
               <a:rPr lang="en-US" smtClean="0"/>
-              <a:t>25</a:t>
+              <a:t>28</a:t>
             </a:fld>
             <a:endParaRPr lang="en-US"/>
           </a:p>
@@ -936,7 +944,7 @@
           <a:p>
             <a:fld id="{A07ECB9E-536C-4551-96DA-621CC202222E}" type="slidenum">
               <a:rPr lang="en-US" smtClean="0"/>
-              <a:t>32</a:t>
+              <a:t>35</a:t>
             </a:fld>
             <a:endParaRPr lang="en-US"/>
           </a:p>
@@ -1103,7 +1111,7 @@
             <a:fld id="{08B9EBBA-996F-894A-B54A-D6246ED52CEA}" type="datetimeFigureOut">
               <a:rPr lang="en-US" smtClean="0"/>
               <a:pPr/>
-              <a:t>4/19/2018</a:t>
+              <a:t>4/20/2018</a:t>
             </a:fld>
             <a:endParaRPr lang="en-US" dirty="0"/>
           </a:p>
@@ -1303,7 +1311,7 @@
             <a:fld id="{C6C52C72-DE31-F449-A4ED-4C594FD91407}" type="datetimeFigureOut">
               <a:rPr lang="en-US" smtClean="0"/>
               <a:pPr/>
-              <a:t>4/19/2018</a:t>
+              <a:t>4/20/2018</a:t>
             </a:fld>
             <a:endParaRPr lang="en-US" dirty="0"/>
           </a:p>
@@ -1513,7 +1521,7 @@
             <a:fld id="{ED62726E-379B-B349-9EED-81ED093FA806}" type="datetimeFigureOut">
               <a:rPr lang="en-US" smtClean="0"/>
               <a:pPr/>
-              <a:t>4/19/2018</a:t>
+              <a:t>4/20/2018</a:t>
             </a:fld>
             <a:endParaRPr lang="en-US" dirty="0"/>
           </a:p>
@@ -1713,7 +1721,7 @@
             <a:fld id="{9B3A1323-8D79-1946-B0D7-40001CF92E9D}" type="datetimeFigureOut">
               <a:rPr lang="en-US" smtClean="0"/>
               <a:pPr/>
-              <a:t>4/19/2018</a:t>
+              <a:t>4/20/2018</a:t>
             </a:fld>
             <a:endParaRPr lang="en-US" dirty="0"/>
           </a:p>
@@ -1990,7 +1998,7 @@
             <a:fld id="{8DFA1846-DA80-1C48-A609-854EA85C59AD}" type="datetimeFigureOut">
               <a:rPr lang="en-US" smtClean="0"/>
               <a:pPr/>
-              <a:t>4/19/2018</a:t>
+              <a:t>4/20/2018</a:t>
             </a:fld>
             <a:endParaRPr lang="en-US" dirty="0"/>
           </a:p>
@@ -2257,7 +2265,7 @@
             <a:fld id="{57302355-E14B-8545-A8F8-0FE83CC9D524}" type="datetimeFigureOut">
               <a:rPr lang="en-US" smtClean="0"/>
               <a:pPr/>
-              <a:t>4/19/2018</a:t>
+              <a:t>4/20/2018</a:t>
             </a:fld>
             <a:endParaRPr lang="en-US" dirty="0"/>
           </a:p>
@@ -2671,7 +2679,7 @@
             <a:fld id="{02640F58-564D-2B4F-AE67-E407BA4FCF45}" type="datetimeFigureOut">
               <a:rPr lang="en-US" smtClean="0"/>
               <a:pPr/>
-              <a:t>4/19/2018</a:t>
+              <a:t>4/20/2018</a:t>
             </a:fld>
             <a:endParaRPr lang="en-US" dirty="0"/>
           </a:p>
@@ -2814,7 +2822,7 @@
             <a:fld id="{F13A34C8-038E-2045-AF43-DF7DBB8E0E9E}" type="datetimeFigureOut">
               <a:rPr lang="en-US" smtClean="0"/>
               <a:pPr/>
-              <a:t>4/19/2018</a:t>
+              <a:t>4/20/2018</a:t>
             </a:fld>
             <a:endParaRPr lang="en-US" dirty="0"/>
           </a:p>
@@ -2929,7 +2937,7 @@
             <a:fld id="{8818C68F-D26B-8F47-958C-23B49CF8A634}" type="datetimeFigureOut">
               <a:rPr lang="en-US" smtClean="0"/>
               <a:pPr/>
-              <a:t>4/19/2018</a:t>
+              <a:t>4/20/2018</a:t>
             </a:fld>
             <a:endParaRPr lang="en-US" dirty="0"/>
           </a:p>
@@ -3242,7 +3250,7 @@
             <a:fld id="{D0DF5E60-9974-AC48-9591-99C2BB44B7CF}" type="datetimeFigureOut">
               <a:rPr lang="en-US" smtClean="0"/>
               <a:pPr/>
-              <a:t>4/19/2018</a:t>
+              <a:t>4/20/2018</a:t>
             </a:fld>
             <a:endParaRPr lang="en-US" dirty="0"/>
           </a:p>
@@ -3532,7 +3540,7 @@
             <a:fld id="{18C79C5D-2A6F-F04D-97DA-BEF2467B64E4}" type="datetimeFigureOut">
               <a:rPr lang="en-US" smtClean="0"/>
               <a:pPr/>
-              <a:t>4/19/2018</a:t>
+              <a:t>4/20/2018</a:t>
             </a:fld>
             <a:endParaRPr lang="en-US" dirty="0"/>
           </a:p>
@@ -3775,7 +3783,7 @@
             <a:fld id="{09B482E8-6E0E-1B4F-B1FD-C69DB9E858D9}" type="datetimeFigureOut">
               <a:rPr lang="en-US" smtClean="0"/>
               <a:pPr/>
-              <a:t>4/19/2018</a:t>
+              <a:t>4/20/2018</a:t>
             </a:fld>
             <a:endParaRPr lang="en-US" dirty="0"/>
           </a:p>
@@ -4280,52 +4288,71 @@
           <a:chExt cx="0" cy="0"/>
         </a:xfrm>
       </p:grpSpPr>
-      <p:pic>
-        <p:nvPicPr>
-          <p:cNvPr id="4" name="Picture 3">
-            <a:extLst>
-              <a:ext uri="{FF2B5EF4-FFF2-40B4-BE49-F238E27FC236}">
-                <a16:creationId xmlns:a16="http://schemas.microsoft.com/office/drawing/2014/main" id="{91EB5EDD-C3B7-4EBB-8095-8549BDEF68E0}"/>
-              </a:ext>
-            </a:extLst>
-          </p:cNvPr>
-          <p:cNvPicPr>
-            <a:picLocks noChangeAspect="1"/>
-          </p:cNvPicPr>
+      <p:sp>
+        <p:nvSpPr>
+          <p:cNvPr id="3" name="Content Placeholder 2">
+            <a:extLst>
+              <a:ext uri="{FF2B5EF4-FFF2-40B4-BE49-F238E27FC236}">
+                <a16:creationId xmlns:a16="http://schemas.microsoft.com/office/drawing/2014/main" id="{5684DB56-893C-4FD4-9199-71F3A890E54E}"/>
+              </a:ext>
+            </a:extLst>
+          </p:cNvPr>
+          <p:cNvSpPr>
+            <a:spLocks noGrp="1"/>
+          </p:cNvSpPr>
+          <p:nvPr>
+            <p:ph idx="1"/>
+          </p:nvPr>
+        </p:nvSpPr>
+        <p:spPr/>
+        <p:txBody>
+          <a:bodyPr>
+            <a:normAutofit/>
+          </a:bodyPr>
+          <a:lstStyle/>
+          <a:p>
+            <a:pPr marL="0" indent="0" algn="ctr">
+              <a:buNone/>
+            </a:pPr>
+            <a:r>
+              <a:rPr lang="en-US" sz="5000" dirty="0"/>
+              <a:t>“Analysts at Gartner (gated) estimate that </a:t>
+            </a:r>
+            <a:r>
+              <a:rPr lang="en-US" sz="5000" b="1" dirty="0"/>
+              <a:t>upward of 80% </a:t>
+            </a:r>
+            <a:r>
+              <a:rPr lang="en-US" sz="5000" dirty="0"/>
+              <a:t>of enterprise data today is </a:t>
+            </a:r>
+            <a:r>
+              <a:rPr lang="en-US" sz="5000" b="1" dirty="0"/>
+              <a:t>unstructured</a:t>
+            </a:r>
+            <a:r>
+              <a:rPr lang="en-US" sz="5000" dirty="0"/>
+              <a:t>.”</a:t>
+            </a:r>
+          </a:p>
+        </p:txBody>
+      </p:sp>
+      <p:sp>
+        <p:nvSpPr>
+          <p:cNvPr id="4" name="TextBox 3">
+            <a:extLst>
+              <a:ext uri="{FF2B5EF4-FFF2-40B4-BE49-F238E27FC236}">
+                <a16:creationId xmlns:a16="http://schemas.microsoft.com/office/drawing/2014/main" id="{14486A67-C22C-422E-95C8-2DBA398EEE1D}"/>
+              </a:ext>
+            </a:extLst>
+          </p:cNvPr>
+          <p:cNvSpPr txBox="1"/>
           <p:nvPr/>
-        </p:nvPicPr>
-        <p:blipFill>
-          <a:blip r:embed="rId3"/>
-          <a:stretch>
-            <a:fillRect/>
-          </a:stretch>
-        </p:blipFill>
+        </p:nvSpPr>
         <p:spPr>
           <a:xfrm>
-            <a:off x="2542632" y="0"/>
-            <a:ext cx="7106736" cy="6858000"/>
-          </a:xfrm>
-          <a:prstGeom prst="rect">
-            <a:avLst/>
-          </a:prstGeom>
-        </p:spPr>
-      </p:pic>
-      <p:sp>
-        <p:nvSpPr>
-          <p:cNvPr id="5" name="TextBox 4">
-            <a:extLst>
-              <a:ext uri="{FF2B5EF4-FFF2-40B4-BE49-F238E27FC236}">
-                <a16:creationId xmlns:a16="http://schemas.microsoft.com/office/drawing/2014/main" id="{CD0D8E49-6AA3-4BDF-8AE4-9278E6AE3ABA}"/>
-              </a:ext>
-            </a:extLst>
-          </p:cNvPr>
-          <p:cNvSpPr txBox="1"/>
-          <p:nvPr/>
-        </p:nvSpPr>
-        <p:spPr>
-          <a:xfrm>
-            <a:off x="325315" y="6418385"/>
-            <a:ext cx="5416868" cy="369332"/>
+            <a:off x="651753" y="6400800"/>
+            <a:ext cx="10949151" cy="369332"/>
           </a:xfrm>
           <a:prstGeom prst="rect">
             <a:avLst/>
@@ -4340,7 +4367,7 @@
           <a:p>
             <a:r>
               <a:rPr lang="en-US" dirty="0"/>
-              <a:t>https://commons.wikimedia.org/wiki/File:ParseTree.svg</a:t>
+              <a:t>https://www.forbes.com/sites/forbestechcouncil/2017/06/05/the-big-unstructured-data-problem/#13919ec4493a</a:t>
             </a:r>
           </a:p>
         </p:txBody>
@@ -4348,7 +4375,7 @@
     </p:spTree>
     <p:extLst>
       <p:ext uri="{BB962C8B-B14F-4D97-AF65-F5344CB8AC3E}">
-        <p14:creationId xmlns:p14="http://schemas.microsoft.com/office/powerpoint/2010/main" val="2968770015"/>
+        <p14:creationId xmlns:p14="http://schemas.microsoft.com/office/powerpoint/2010/main" val="3613655282"/>
       </p:ext>
     </p:extLst>
   </p:cSld>
@@ -4380,7 +4407,7 @@
           <p:cNvPr id="4" name="Picture 3">
             <a:extLst>
               <a:ext uri="{FF2B5EF4-FFF2-40B4-BE49-F238E27FC236}">
-                <a16:creationId xmlns:a16="http://schemas.microsoft.com/office/drawing/2014/main" id="{14692214-DC6C-4BD1-8371-491A0A70F9FF}"/>
+                <a16:creationId xmlns:a16="http://schemas.microsoft.com/office/drawing/2014/main" id="{E333F5D1-5E0A-4AF9-B74D-86BC109C78DA}"/>
               </a:ext>
             </a:extLst>
           </p:cNvPr>
@@ -4397,8 +4424,8 @@
         </p:blipFill>
         <p:spPr>
           <a:xfrm>
-            <a:off x="1767254" y="1643062"/>
-            <a:ext cx="7620000" cy="3571875"/>
+            <a:off x="2692455" y="393970"/>
+            <a:ext cx="6807089" cy="6070060"/>
           </a:xfrm>
           <a:prstGeom prst="rect">
             <a:avLst/>
@@ -4410,7 +4437,7 @@
           <p:cNvPr id="5" name="TextBox 4">
             <a:extLst>
               <a:ext uri="{FF2B5EF4-FFF2-40B4-BE49-F238E27FC236}">
-                <a16:creationId xmlns:a16="http://schemas.microsoft.com/office/drawing/2014/main" id="{F78128D0-08C0-4B93-8D1D-196C6CCB14E3}"/>
+                <a16:creationId xmlns:a16="http://schemas.microsoft.com/office/drawing/2014/main" id="{CD062E39-16B4-47E8-9914-130EF2DE7E98}"/>
               </a:ext>
             </a:extLst>
           </p:cNvPr>
@@ -4419,8 +4446,8 @@
         </p:nvSpPr>
         <p:spPr>
           <a:xfrm>
-            <a:off x="342900" y="6392008"/>
-            <a:ext cx="6680931" cy="369332"/>
+            <a:off x="193431" y="6488668"/>
+            <a:ext cx="3423758" cy="369332"/>
           </a:xfrm>
           <a:prstGeom prst="rect">
             <a:avLst/>
@@ -4435,7 +4462,7 @@
           <a:p>
             <a:r>
               <a:rPr lang="en-US" dirty="0"/>
-              <a:t>http://iconictranslation.com/2014/10/language-challenge-7-chinese/</a:t>
+              <a:t>http://www.internetlivestats.com/</a:t>
             </a:r>
           </a:p>
         </p:txBody>
@@ -4443,7 +4470,7 @@
     </p:spTree>
     <p:extLst>
       <p:ext uri="{BB962C8B-B14F-4D97-AF65-F5344CB8AC3E}">
-        <p14:creationId xmlns:p14="http://schemas.microsoft.com/office/powerpoint/2010/main" val="3678710148"/>
+        <p14:creationId xmlns:p14="http://schemas.microsoft.com/office/powerpoint/2010/main" val="315176025"/>
       </p:ext>
     </p:extLst>
   </p:cSld>
@@ -4470,75 +4497,49 @@
           <a:chExt cx="0" cy="0"/>
         </a:xfrm>
       </p:grpSpPr>
-      <p:pic>
-        <p:nvPicPr>
-          <p:cNvPr id="4" name="Picture 3">
-            <a:extLst>
-              <a:ext uri="{FF2B5EF4-FFF2-40B4-BE49-F238E27FC236}">
-                <a16:creationId xmlns:a16="http://schemas.microsoft.com/office/drawing/2014/main" id="{C37F4417-CCC4-4D12-B4E9-71E2DD533785}"/>
-              </a:ext>
-            </a:extLst>
-          </p:cNvPr>
-          <p:cNvPicPr>
-            <a:picLocks noChangeAspect="1"/>
-          </p:cNvPicPr>
-          <p:nvPr/>
-        </p:nvPicPr>
-        <p:blipFill>
-          <a:blip r:embed="rId2"/>
-          <a:stretch>
-            <a:fillRect/>
-          </a:stretch>
-        </p:blipFill>
+      <p:sp>
+        <p:nvSpPr>
+          <p:cNvPr id="2" name="Title 1">
+            <a:extLst>
+              <a:ext uri="{FF2B5EF4-FFF2-40B4-BE49-F238E27FC236}">
+                <a16:creationId xmlns:a16="http://schemas.microsoft.com/office/drawing/2014/main" id="{B61DD442-8CFC-4E38-A6AA-B82F0B634200}"/>
+              </a:ext>
+            </a:extLst>
+          </p:cNvPr>
+          <p:cNvSpPr>
+            <a:spLocks noGrp="1"/>
+          </p:cNvSpPr>
+          <p:nvPr>
+            <p:ph type="title"/>
+          </p:nvPr>
+        </p:nvSpPr>
         <p:spPr>
           <a:xfrm>
-            <a:off x="0" y="2381477"/>
-            <a:ext cx="12192000" cy="2095045"/>
+            <a:off x="838200" y="2766218"/>
+            <a:ext cx="10515600" cy="1325563"/>
           </a:xfrm>
-          <a:prstGeom prst="rect">
-            <a:avLst/>
-          </a:prstGeom>
         </p:spPr>
-      </p:pic>
-      <p:sp>
-        <p:nvSpPr>
-          <p:cNvPr id="5" name="TextBox 4">
-            <a:extLst>
-              <a:ext uri="{FF2B5EF4-FFF2-40B4-BE49-F238E27FC236}">
-                <a16:creationId xmlns:a16="http://schemas.microsoft.com/office/drawing/2014/main" id="{D70D464F-69C5-4292-8E01-3AD14452528A}"/>
-              </a:ext>
-            </a:extLst>
-          </p:cNvPr>
-          <p:cNvSpPr txBox="1"/>
-          <p:nvPr/>
-        </p:nvSpPr>
-        <p:spPr>
-          <a:xfrm>
-            <a:off x="527538" y="6488723"/>
-            <a:ext cx="2158796" cy="369332"/>
-          </a:xfrm>
-          <a:prstGeom prst="rect">
-            <a:avLst/>
-          </a:prstGeom>
-          <a:noFill/>
-        </p:spPr>
-        <p:txBody>
-          <a:bodyPr wrap="none" rtlCol="0">
-            <a:spAutoFit/>
-          </a:bodyPr>
-          <a:lstStyle/>
-          <a:p>
+        <p:txBody>
+          <a:bodyPr/>
+          <a:lstStyle/>
+          <a:p>
+            <a:pPr algn="ctr"/>
             <a:r>
               <a:rPr lang="en-US" dirty="0"/>
-              <a:t>translate.google.com</a:t>
-            </a:r>
+              <a:t>What can </a:t>
+            </a:r>
+            <a:r>
+              <a:rPr lang="en-US"/>
+              <a:t>we work on?</a:t>
+            </a:r>
+            <a:endParaRPr lang="en-US" dirty="0"/>
           </a:p>
         </p:txBody>
       </p:sp>
     </p:spTree>
     <p:extLst>
       <p:ext uri="{BB962C8B-B14F-4D97-AF65-F5344CB8AC3E}">
-        <p14:creationId xmlns:p14="http://schemas.microsoft.com/office/powerpoint/2010/main" val="160907320"/>
+        <p14:creationId xmlns:p14="http://schemas.microsoft.com/office/powerpoint/2010/main" val="600803733"/>
       </p:ext>
     </p:extLst>
   </p:cSld>
@@ -4570,7 +4571,7 @@
           <p:cNvPr id="4" name="Picture 3">
             <a:extLst>
               <a:ext uri="{FF2B5EF4-FFF2-40B4-BE49-F238E27FC236}">
-                <a16:creationId xmlns:a16="http://schemas.microsoft.com/office/drawing/2014/main" id="{F86C695D-D332-45B0-B287-BE1450B55E36}"/>
+                <a16:creationId xmlns:a16="http://schemas.microsoft.com/office/drawing/2014/main" id="{91EB5EDD-C3B7-4EBB-8095-8549BDEF68E0}"/>
               </a:ext>
             </a:extLst>
           </p:cNvPr>
@@ -4580,15 +4581,15 @@
           <p:nvPr/>
         </p:nvPicPr>
         <p:blipFill>
-          <a:blip r:embed="rId2"/>
+          <a:blip r:embed="rId3"/>
           <a:stretch>
             <a:fillRect/>
           </a:stretch>
         </p:blipFill>
         <p:spPr>
           <a:xfrm>
-            <a:off x="3471862" y="1238250"/>
-            <a:ext cx="5248275" cy="4381500"/>
+            <a:off x="2542632" y="0"/>
+            <a:ext cx="7106736" cy="6858000"/>
           </a:xfrm>
           <a:prstGeom prst="rect">
             <a:avLst/>
@@ -4600,7 +4601,7 @@
           <p:cNvPr id="5" name="TextBox 4">
             <a:extLst>
               <a:ext uri="{FF2B5EF4-FFF2-40B4-BE49-F238E27FC236}">
-                <a16:creationId xmlns:a16="http://schemas.microsoft.com/office/drawing/2014/main" id="{44974D4B-9D22-419E-A1AE-A63812B37B6C}"/>
+                <a16:creationId xmlns:a16="http://schemas.microsoft.com/office/drawing/2014/main" id="{CD0D8E49-6AA3-4BDF-8AE4-9278E6AE3ABA}"/>
               </a:ext>
             </a:extLst>
           </p:cNvPr>
@@ -4609,8 +4610,8 @@
         </p:nvSpPr>
         <p:spPr>
           <a:xfrm>
-            <a:off x="430823" y="6330462"/>
-            <a:ext cx="6948056" cy="369332"/>
+            <a:off x="325315" y="6418385"/>
+            <a:ext cx="5416868" cy="369332"/>
           </a:xfrm>
           <a:prstGeom prst="rect">
             <a:avLst/>
@@ -4625,7 +4626,7 @@
           <a:p>
             <a:r>
               <a:rPr lang="en-US" dirty="0"/>
-              <a:t>https://apkpure.com/sumit-text-summarization/com.karimo.sumit_final</a:t>
+              <a:t>https://commons.wikimedia.org/wiki/File:ParseTree.svg</a:t>
             </a:r>
           </a:p>
         </p:txBody>
@@ -4633,7 +4634,7 @@
     </p:spTree>
     <p:extLst>
       <p:ext uri="{BB962C8B-B14F-4D97-AF65-F5344CB8AC3E}">
-        <p14:creationId xmlns:p14="http://schemas.microsoft.com/office/powerpoint/2010/main" val="214781822"/>
+        <p14:creationId xmlns:p14="http://schemas.microsoft.com/office/powerpoint/2010/main" val="2968770015"/>
       </p:ext>
     </p:extLst>
   </p:cSld>
@@ -4665,7 +4666,7 @@
           <p:cNvPr id="4" name="Picture 3">
             <a:extLst>
               <a:ext uri="{FF2B5EF4-FFF2-40B4-BE49-F238E27FC236}">
-                <a16:creationId xmlns:a16="http://schemas.microsoft.com/office/drawing/2014/main" id="{AE49E760-B8B3-444D-84EC-423FE750C378}"/>
+                <a16:creationId xmlns:a16="http://schemas.microsoft.com/office/drawing/2014/main" id="{14692214-DC6C-4BD1-8371-491A0A70F9FF}"/>
               </a:ext>
             </a:extLst>
           </p:cNvPr>
@@ -4675,15 +4676,15 @@
           <p:nvPr/>
         </p:nvPicPr>
         <p:blipFill>
-          <a:blip r:embed="rId3"/>
+          <a:blip r:embed="rId2"/>
           <a:stretch>
             <a:fillRect/>
           </a:stretch>
         </p:blipFill>
         <p:spPr>
           <a:xfrm>
-            <a:off x="851388" y="273333"/>
-            <a:ext cx="10489223" cy="5444999"/>
+            <a:off x="1767254" y="1643062"/>
+            <a:ext cx="7620000" cy="3571875"/>
           </a:xfrm>
           <a:prstGeom prst="rect">
             <a:avLst/>
@@ -4695,7 +4696,7 @@
           <p:cNvPr id="5" name="TextBox 4">
             <a:extLst>
               <a:ext uri="{FF2B5EF4-FFF2-40B4-BE49-F238E27FC236}">
-                <a16:creationId xmlns:a16="http://schemas.microsoft.com/office/drawing/2014/main" id="{2A45A654-1ECE-4B52-A6D4-1750C1551B04}"/>
+                <a16:creationId xmlns:a16="http://schemas.microsoft.com/office/drawing/2014/main" id="{F78128D0-08C0-4B93-8D1D-196C6CCB14E3}"/>
               </a:ext>
             </a:extLst>
           </p:cNvPr>
@@ -4704,8 +4705,8 @@
         </p:nvSpPr>
         <p:spPr>
           <a:xfrm>
-            <a:off x="316523" y="6427177"/>
-            <a:ext cx="4372736" cy="369332"/>
+            <a:off x="342900" y="6392008"/>
+            <a:ext cx="6680931" cy="369332"/>
           </a:xfrm>
           <a:prstGeom prst="rect">
             <a:avLst/>
@@ -4720,7 +4721,7 @@
           <a:p>
             <a:r>
               <a:rPr lang="en-US" dirty="0"/>
-              <a:t>https://www.bitext.com/sentiment-analysis/</a:t>
+              <a:t>http://iconictranslation.com/2014/10/language-challenge-7-chinese/</a:t>
             </a:r>
           </a:p>
         </p:txBody>
@@ -4728,7 +4729,7 @@
     </p:spTree>
     <p:extLst>
       <p:ext uri="{BB962C8B-B14F-4D97-AF65-F5344CB8AC3E}">
-        <p14:creationId xmlns:p14="http://schemas.microsoft.com/office/powerpoint/2010/main" val="2641024532"/>
+        <p14:creationId xmlns:p14="http://schemas.microsoft.com/office/powerpoint/2010/main" val="3678710148"/>
       </p:ext>
     </p:extLst>
   </p:cSld>
@@ -4760,7 +4761,7 @@
           <p:cNvPr id="4" name="Picture 3">
             <a:extLst>
               <a:ext uri="{FF2B5EF4-FFF2-40B4-BE49-F238E27FC236}">
-                <a16:creationId xmlns:a16="http://schemas.microsoft.com/office/drawing/2014/main" id="{933DE578-2D18-4A3D-84BE-D66DDCE355F1}"/>
+                <a16:creationId xmlns:a16="http://schemas.microsoft.com/office/drawing/2014/main" id="{C37F4417-CCC4-4D12-B4E9-71E2DD533785}"/>
               </a:ext>
             </a:extLst>
           </p:cNvPr>
@@ -4777,8 +4778,8 @@
         </p:blipFill>
         <p:spPr>
           <a:xfrm>
-            <a:off x="2364214" y="216511"/>
-            <a:ext cx="7463571" cy="5826288"/>
+            <a:off x="0" y="2381477"/>
+            <a:ext cx="12192000" cy="2095045"/>
           </a:xfrm>
           <a:prstGeom prst="rect">
             <a:avLst/>
@@ -4790,7 +4791,7 @@
           <p:cNvPr id="5" name="TextBox 4">
             <a:extLst>
               <a:ext uri="{FF2B5EF4-FFF2-40B4-BE49-F238E27FC236}">
-                <a16:creationId xmlns:a16="http://schemas.microsoft.com/office/drawing/2014/main" id="{2152830E-9789-4178-8B77-20EF91B01471}"/>
+                <a16:creationId xmlns:a16="http://schemas.microsoft.com/office/drawing/2014/main" id="{D70D464F-69C5-4292-8E01-3AD14452528A}"/>
               </a:ext>
             </a:extLst>
           </p:cNvPr>
@@ -4799,8 +4800,8 @@
         </p:nvSpPr>
         <p:spPr>
           <a:xfrm>
-            <a:off x="281354" y="6318323"/>
-            <a:ext cx="8528360" cy="646331"/>
+            <a:off x="527538" y="6488723"/>
+            <a:ext cx="2158796" cy="369332"/>
           </a:xfrm>
           <a:prstGeom prst="rect">
             <a:avLst/>
@@ -4814,57 +4815,16 @@
           <a:lstStyle/>
           <a:p>
             <a:r>
-              <a:rPr lang="en-US" dirty="0">
-                <a:effectLst/>
-              </a:rPr>
-              <a:t>A. Agrawal </a:t>
-            </a:r>
-            <a:r>
-              <a:rPr lang="en-US" i="1" dirty="0">
-                <a:effectLst/>
-              </a:rPr>
-              <a:t>et al.</a:t>
-            </a:r>
-            <a:r>
-              <a:rPr lang="en-US" dirty="0">
-                <a:effectLst/>
-              </a:rPr>
-              <a:t>, “VQA: Visual Question Answering,” </a:t>
-            </a:r>
-            <a:r>
-              <a:rPr lang="en-US" i="1" dirty="0">
-                <a:effectLst/>
-              </a:rPr>
-              <a:t>arXiv:1505.00468 [</a:t>
-            </a:r>
-            <a:r>
-              <a:rPr lang="en-US" i="1" dirty="0" err="1">
-                <a:effectLst/>
-              </a:rPr>
-              <a:t>cs</a:t>
-            </a:r>
-            <a:r>
-              <a:rPr lang="en-US" i="1" dirty="0">
-                <a:effectLst/>
-              </a:rPr>
-              <a:t>]</a:t>
-            </a:r>
-            <a:r>
-              <a:rPr lang="en-US" dirty="0">
-                <a:effectLst/>
-              </a:rPr>
-              <a:t>, May 2015.</a:t>
-            </a:r>
-          </a:p>
-          <a:p>
-            <a:endParaRPr lang="en-US" dirty="0"/>
+              <a:rPr lang="en-US" dirty="0"/>
+              <a:t>translate.google.com</a:t>
+            </a:r>
           </a:p>
         </p:txBody>
       </p:sp>
     </p:spTree>
     <p:extLst>
       <p:ext uri="{BB962C8B-B14F-4D97-AF65-F5344CB8AC3E}">
-        <p14:creationId xmlns:p14="http://schemas.microsoft.com/office/powerpoint/2010/main" val="2436736781"/>
+        <p14:creationId xmlns:p14="http://schemas.microsoft.com/office/powerpoint/2010/main" val="160907320"/>
       </p:ext>
     </p:extLst>
   </p:cSld>
@@ -4896,7 +4856,7 @@
           <p:cNvPr id="4" name="Picture 3">
             <a:extLst>
               <a:ext uri="{FF2B5EF4-FFF2-40B4-BE49-F238E27FC236}">
-                <a16:creationId xmlns:a16="http://schemas.microsoft.com/office/drawing/2014/main" id="{C17E29A5-B40E-47C7-96F0-C2897EAB0953}"/>
+                <a16:creationId xmlns:a16="http://schemas.microsoft.com/office/drawing/2014/main" id="{F86C695D-D332-45B0-B287-BE1450B55E36}"/>
               </a:ext>
             </a:extLst>
           </p:cNvPr>
@@ -4913,8 +4873,8 @@
         </p:blipFill>
         <p:spPr>
           <a:xfrm>
-            <a:off x="1266825" y="1571625"/>
-            <a:ext cx="9658350" cy="3714750"/>
+            <a:off x="3471862" y="1238250"/>
+            <a:ext cx="5248275" cy="4381500"/>
           </a:xfrm>
           <a:prstGeom prst="rect">
             <a:avLst/>
@@ -4926,7 +4886,7 @@
           <p:cNvPr id="5" name="TextBox 4">
             <a:extLst>
               <a:ext uri="{FF2B5EF4-FFF2-40B4-BE49-F238E27FC236}">
-                <a16:creationId xmlns:a16="http://schemas.microsoft.com/office/drawing/2014/main" id="{F4D39868-E037-4C08-A94D-735A792DFC11}"/>
+                <a16:creationId xmlns:a16="http://schemas.microsoft.com/office/drawing/2014/main" id="{44974D4B-9D22-419E-A1AE-A63812B37B6C}"/>
               </a:ext>
             </a:extLst>
           </p:cNvPr>
@@ -4935,8 +4895,8 @@
         </p:nvSpPr>
         <p:spPr>
           <a:xfrm>
-            <a:off x="430823" y="6154615"/>
-            <a:ext cx="6456832" cy="369332"/>
+            <a:off x="430823" y="6330462"/>
+            <a:ext cx="6948056" cy="369332"/>
           </a:xfrm>
           <a:prstGeom prst="rect">
             <a:avLst/>
@@ -4951,7 +4911,7 @@
           <a:p>
             <a:r>
               <a:rPr lang="en-US" dirty="0"/>
-              <a:t>https://matlab1.com/support-vector-machine-speech-recognition/</a:t>
+              <a:t>https://apkpure.com/sumit-text-summarization/com.karimo.sumit_final</a:t>
             </a:r>
           </a:p>
         </p:txBody>
@@ -4959,7 +4919,7 @@
     </p:spTree>
     <p:extLst>
       <p:ext uri="{BB962C8B-B14F-4D97-AF65-F5344CB8AC3E}">
-        <p14:creationId xmlns:p14="http://schemas.microsoft.com/office/powerpoint/2010/main" val="2544642664"/>
+        <p14:creationId xmlns:p14="http://schemas.microsoft.com/office/powerpoint/2010/main" val="214781822"/>
       </p:ext>
     </p:extLst>
   </p:cSld>
@@ -4991,7 +4951,7 @@
           <p:cNvPr id="4" name="Picture 3">
             <a:extLst>
               <a:ext uri="{FF2B5EF4-FFF2-40B4-BE49-F238E27FC236}">
-                <a16:creationId xmlns:a16="http://schemas.microsoft.com/office/drawing/2014/main" id="{451AEF2C-32A6-4B2E-8CC2-6C3D0C0EE35B}"/>
+                <a16:creationId xmlns:a16="http://schemas.microsoft.com/office/drawing/2014/main" id="{AE49E760-B8B3-444D-84EC-423FE750C378}"/>
               </a:ext>
             </a:extLst>
           </p:cNvPr>
@@ -5001,15 +4961,15 @@
           <p:nvPr/>
         </p:nvPicPr>
         <p:blipFill>
-          <a:blip r:embed="rId2"/>
+          <a:blip r:embed="rId3"/>
           <a:stretch>
             <a:fillRect/>
           </a:stretch>
         </p:blipFill>
         <p:spPr>
           <a:xfrm>
-            <a:off x="2419419" y="0"/>
-            <a:ext cx="6135496" cy="5722332"/>
+            <a:off x="851388" y="273333"/>
+            <a:ext cx="10489223" cy="5444999"/>
           </a:xfrm>
           <a:prstGeom prst="rect">
             <a:avLst/>
@@ -5021,7 +4981,7 @@
           <p:cNvPr id="5" name="TextBox 4">
             <a:extLst>
               <a:ext uri="{FF2B5EF4-FFF2-40B4-BE49-F238E27FC236}">
-                <a16:creationId xmlns:a16="http://schemas.microsoft.com/office/drawing/2014/main" id="{FC66C0DD-0284-475D-90F8-9B7873CBBDF4}"/>
+                <a16:creationId xmlns:a16="http://schemas.microsoft.com/office/drawing/2014/main" id="{2A45A654-1ECE-4B52-A6D4-1750C1551B04}"/>
               </a:ext>
             </a:extLst>
           </p:cNvPr>
@@ -5030,8 +4990,8 @@
         </p:nvSpPr>
         <p:spPr>
           <a:xfrm>
-            <a:off x="483577" y="6471138"/>
-            <a:ext cx="6257162" cy="369332"/>
+            <a:off x="316523" y="6427177"/>
+            <a:ext cx="4372736" cy="369332"/>
           </a:xfrm>
           <a:prstGeom prst="rect">
             <a:avLst/>
@@ -5046,7 +5006,7 @@
           <a:p>
             <a:r>
               <a:rPr lang="en-US" dirty="0"/>
-              <a:t>https://play.google.com/store/apps/details?id=com.textsprecher</a:t>
+              <a:t>https://www.bitext.com/sentiment-analysis/</a:t>
             </a:r>
           </a:p>
         </p:txBody>
@@ -5054,7 +5014,7 @@
     </p:spTree>
     <p:extLst>
       <p:ext uri="{BB962C8B-B14F-4D97-AF65-F5344CB8AC3E}">
-        <p14:creationId xmlns:p14="http://schemas.microsoft.com/office/powerpoint/2010/main" val="2552070382"/>
+        <p14:creationId xmlns:p14="http://schemas.microsoft.com/office/powerpoint/2010/main" val="2641024532"/>
       </p:ext>
     </p:extLst>
   </p:cSld>
@@ -5081,44 +5041,116 @@
           <a:chExt cx="0" cy="0"/>
         </a:xfrm>
       </p:grpSpPr>
-      <p:sp>
-        <p:nvSpPr>
-          <p:cNvPr id="2" name="Title 1">
-            <a:extLst>
-              <a:ext uri="{FF2B5EF4-FFF2-40B4-BE49-F238E27FC236}">
-                <a16:creationId xmlns:a16="http://schemas.microsoft.com/office/drawing/2014/main" id="{8BBBF60A-A59A-4A8F-802E-477EB955F406}"/>
-              </a:ext>
-            </a:extLst>
-          </p:cNvPr>
-          <p:cNvSpPr>
-            <a:spLocks noGrp="1"/>
-          </p:cNvSpPr>
-          <p:nvPr>
-            <p:ph type="title"/>
-          </p:nvPr>
-        </p:nvSpPr>
+      <p:pic>
+        <p:nvPicPr>
+          <p:cNvPr id="4" name="Picture 3">
+            <a:extLst>
+              <a:ext uri="{FF2B5EF4-FFF2-40B4-BE49-F238E27FC236}">
+                <a16:creationId xmlns:a16="http://schemas.microsoft.com/office/drawing/2014/main" id="{933DE578-2D18-4A3D-84BE-D66DDCE355F1}"/>
+              </a:ext>
+            </a:extLst>
+          </p:cNvPr>
+          <p:cNvPicPr>
+            <a:picLocks noChangeAspect="1"/>
+          </p:cNvPicPr>
+          <p:nvPr/>
+        </p:nvPicPr>
+        <p:blipFill>
+          <a:blip r:embed="rId2"/>
+          <a:stretch>
+            <a:fillRect/>
+          </a:stretch>
+        </p:blipFill>
         <p:spPr>
           <a:xfrm>
-            <a:off x="838200" y="2766218"/>
-            <a:ext cx="10515600" cy="1325563"/>
+            <a:off x="2364214" y="216511"/>
+            <a:ext cx="7463571" cy="5826288"/>
           </a:xfrm>
+          <a:prstGeom prst="rect">
+            <a:avLst/>
+          </a:prstGeom>
         </p:spPr>
-        <p:txBody>
-          <a:bodyPr/>
-          <a:lstStyle/>
-          <a:p>
-            <a:pPr algn="ctr"/>
-            <a:r>
-              <a:rPr lang="en-US" dirty="0"/>
-              <a:t>What makes it difficult?</a:t>
-            </a:r>
+      </p:pic>
+      <p:sp>
+        <p:nvSpPr>
+          <p:cNvPr id="5" name="TextBox 4">
+            <a:extLst>
+              <a:ext uri="{FF2B5EF4-FFF2-40B4-BE49-F238E27FC236}">
+                <a16:creationId xmlns:a16="http://schemas.microsoft.com/office/drawing/2014/main" id="{2152830E-9789-4178-8B77-20EF91B01471}"/>
+              </a:ext>
+            </a:extLst>
+          </p:cNvPr>
+          <p:cNvSpPr txBox="1"/>
+          <p:nvPr/>
+        </p:nvSpPr>
+        <p:spPr>
+          <a:xfrm>
+            <a:off x="281354" y="6318323"/>
+            <a:ext cx="8528360" cy="646331"/>
+          </a:xfrm>
+          <a:prstGeom prst="rect">
+            <a:avLst/>
+          </a:prstGeom>
+          <a:noFill/>
+        </p:spPr>
+        <p:txBody>
+          <a:bodyPr wrap="none" rtlCol="0">
+            <a:spAutoFit/>
+          </a:bodyPr>
+          <a:lstStyle/>
+          <a:p>
+            <a:r>
+              <a:rPr lang="en-US" dirty="0">
+                <a:effectLst/>
+              </a:rPr>
+              <a:t>A. Agrawal </a:t>
+            </a:r>
+            <a:r>
+              <a:rPr lang="en-US" i="1" dirty="0">
+                <a:effectLst/>
+              </a:rPr>
+              <a:t>et al.</a:t>
+            </a:r>
+            <a:r>
+              <a:rPr lang="en-US" dirty="0">
+                <a:effectLst/>
+              </a:rPr>
+              <a:t>, “VQA: Visual Question Answering,” </a:t>
+            </a:r>
+            <a:r>
+              <a:rPr lang="en-US" i="1" dirty="0">
+                <a:effectLst/>
+              </a:rPr>
+              <a:t>arXiv:1505.00468 [</a:t>
+            </a:r>
+            <a:r>
+              <a:rPr lang="en-US" i="1" dirty="0" err="1">
+                <a:effectLst/>
+              </a:rPr>
+              <a:t>cs</a:t>
+            </a:r>
+            <a:r>
+              <a:rPr lang="en-US" i="1" dirty="0">
+                <a:effectLst/>
+              </a:rPr>
+              <a:t>]</a:t>
+            </a:r>
+            <a:r>
+              <a:rPr lang="en-US" dirty="0">
+                <a:effectLst/>
+              </a:rPr>
+              <a:t>, May 2015.</a:t>
+            </a:r>
+          </a:p>
+          <a:p>
+            <a:endParaRPr lang="en-US" dirty="0"/>
           </a:p>
         </p:txBody>
       </p:sp>
     </p:spTree>
     <p:extLst>
       <p:ext uri="{BB962C8B-B14F-4D97-AF65-F5344CB8AC3E}">
-        <p14:creationId xmlns:p14="http://schemas.microsoft.com/office/powerpoint/2010/main" val="4101368341"/>
+        <p14:creationId xmlns:p14="http://schemas.microsoft.com/office/powerpoint/2010/main" val="2436736781"/>
       </p:ext>
     </p:extLst>
   </p:cSld>
@@ -5150,7 +5182,7 @@
           <p:cNvPr id="4" name="Picture 3">
             <a:extLst>
               <a:ext uri="{FF2B5EF4-FFF2-40B4-BE49-F238E27FC236}">
-                <a16:creationId xmlns:a16="http://schemas.microsoft.com/office/drawing/2014/main" id="{F9EDDD69-1AAA-4D13-8D3C-07F3F4E8E72A}"/>
+                <a16:creationId xmlns:a16="http://schemas.microsoft.com/office/drawing/2014/main" id="{C17E29A5-B40E-47C7-96F0-C2897EAB0953}"/>
               </a:ext>
             </a:extLst>
           </p:cNvPr>
@@ -5167,8 +5199,8 @@
         </p:blipFill>
         <p:spPr>
           <a:xfrm>
-            <a:off x="2028825" y="1800225"/>
-            <a:ext cx="8134350" cy="3257550"/>
+            <a:off x="1266825" y="1571625"/>
+            <a:ext cx="9658350" cy="3714750"/>
           </a:xfrm>
           <a:prstGeom prst="rect">
             <a:avLst/>
@@ -5180,7 +5212,7 @@
           <p:cNvPr id="5" name="TextBox 4">
             <a:extLst>
               <a:ext uri="{FF2B5EF4-FFF2-40B4-BE49-F238E27FC236}">
-                <a16:creationId xmlns:a16="http://schemas.microsoft.com/office/drawing/2014/main" id="{CF3D27C3-9D27-4EC5-A809-C40A0E54E486}"/>
+                <a16:creationId xmlns:a16="http://schemas.microsoft.com/office/drawing/2014/main" id="{F4D39868-E037-4C08-A94D-735A792DFC11}"/>
               </a:ext>
             </a:extLst>
           </p:cNvPr>
@@ -5189,8 +5221,8 @@
         </p:nvSpPr>
         <p:spPr>
           <a:xfrm>
-            <a:off x="448408" y="6330462"/>
-            <a:ext cx="9098453" cy="369332"/>
+            <a:off x="430823" y="6154615"/>
+            <a:ext cx="6456832" cy="369332"/>
           </a:xfrm>
           <a:prstGeom prst="rect">
             <a:avLst/>
@@ -5205,7 +5237,7 @@
           <a:p>
             <a:r>
               <a:rPr lang="en-US" dirty="0"/>
-              <a:t>https://www.ecenglish.com/en/social/blog/ec-central/2015/11/23/vocab-review-homophones</a:t>
+              <a:t>https://matlab1.com/support-vector-machine-speech-recognition/</a:t>
             </a:r>
           </a:p>
         </p:txBody>
@@ -5213,7 +5245,7 @@
     </p:spTree>
     <p:extLst>
       <p:ext uri="{BB962C8B-B14F-4D97-AF65-F5344CB8AC3E}">
-        <p14:creationId xmlns:p14="http://schemas.microsoft.com/office/powerpoint/2010/main" val="2355477888"/>
+        <p14:creationId xmlns:p14="http://schemas.microsoft.com/office/powerpoint/2010/main" val="2544642664"/>
       </p:ext>
     </p:extLst>
   </p:cSld>
@@ -5326,6 +5358,260 @@
           <a:chExt cx="0" cy="0"/>
         </a:xfrm>
       </p:grpSpPr>
+      <p:sp>
+        <p:nvSpPr>
+          <p:cNvPr id="5" name="TextBox 4">
+            <a:extLst>
+              <a:ext uri="{FF2B5EF4-FFF2-40B4-BE49-F238E27FC236}">
+                <a16:creationId xmlns:a16="http://schemas.microsoft.com/office/drawing/2014/main" id="{FC66C0DD-0284-475D-90F8-9B7873CBBDF4}"/>
+              </a:ext>
+            </a:extLst>
+          </p:cNvPr>
+          <p:cNvSpPr txBox="1"/>
+          <p:nvPr/>
+        </p:nvSpPr>
+        <p:spPr>
+          <a:xfrm>
+            <a:off x="483577" y="6471138"/>
+            <a:ext cx="7841506" cy="369332"/>
+          </a:xfrm>
+          <a:prstGeom prst="rect">
+            <a:avLst/>
+          </a:prstGeom>
+          <a:noFill/>
+        </p:spPr>
+        <p:txBody>
+          <a:bodyPr wrap="none" rtlCol="0">
+            <a:spAutoFit/>
+          </a:bodyPr>
+          <a:lstStyle/>
+          <a:p>
+            <a:r>
+              <a:rPr lang="en-US" dirty="0"/>
+              <a:t>https://play.google.com/store/apps/details?id=com.google.android.tts&amp;hl=en_US</a:t>
+            </a:r>
+          </a:p>
+        </p:txBody>
+      </p:sp>
+      <p:pic>
+        <p:nvPicPr>
+          <p:cNvPr id="2" name="Picture 1">
+            <a:extLst>
+              <a:ext uri="{FF2B5EF4-FFF2-40B4-BE49-F238E27FC236}">
+                <a16:creationId xmlns:a16="http://schemas.microsoft.com/office/drawing/2014/main" id="{F1D7B68C-EDBB-4485-9081-EE81AA5E4100}"/>
+              </a:ext>
+            </a:extLst>
+          </p:cNvPr>
+          <p:cNvPicPr>
+            <a:picLocks noChangeAspect="1"/>
+          </p:cNvPicPr>
+          <p:nvPr/>
+        </p:nvPicPr>
+        <p:blipFill>
+          <a:blip r:embed="rId2"/>
+          <a:stretch>
+            <a:fillRect/>
+          </a:stretch>
+        </p:blipFill>
+        <p:spPr>
+          <a:xfrm>
+            <a:off x="2548897" y="510702"/>
+            <a:ext cx="7094205" cy="5836596"/>
+          </a:xfrm>
+          <a:prstGeom prst="rect">
+            <a:avLst/>
+          </a:prstGeom>
+        </p:spPr>
+      </p:pic>
+    </p:spTree>
+    <p:extLst>
+      <p:ext uri="{BB962C8B-B14F-4D97-AF65-F5344CB8AC3E}">
+        <p14:creationId xmlns:p14="http://schemas.microsoft.com/office/powerpoint/2010/main" val="2552070382"/>
+      </p:ext>
+    </p:extLst>
+  </p:cSld>
+  <p:clrMapOvr>
+    <a:masterClrMapping/>
+  </p:clrMapOvr>
+</p:sld>
+</file>
+
+<file path=ppt/slides/slide21.xml><?xml version="1.0" encoding="utf-8"?>
+<p:sld xmlns:a="http://schemas.openxmlformats.org/drawingml/2006/main" xmlns:r="http://schemas.openxmlformats.org/officeDocument/2006/relationships" xmlns:p="http://schemas.openxmlformats.org/presentationml/2006/main">
+  <p:cSld>
+    <p:spTree>
+      <p:nvGrpSpPr>
+        <p:cNvPr id="1" name=""/>
+        <p:cNvGrpSpPr/>
+        <p:nvPr/>
+      </p:nvGrpSpPr>
+      <p:grpSpPr>
+        <a:xfrm>
+          <a:off x="0" y="0"/>
+          <a:ext cx="0" cy="0"/>
+          <a:chOff x="0" y="0"/>
+          <a:chExt cx="0" cy="0"/>
+        </a:xfrm>
+      </p:grpSpPr>
+      <p:sp>
+        <p:nvSpPr>
+          <p:cNvPr id="2" name="Title 1">
+            <a:extLst>
+              <a:ext uri="{FF2B5EF4-FFF2-40B4-BE49-F238E27FC236}">
+                <a16:creationId xmlns:a16="http://schemas.microsoft.com/office/drawing/2014/main" id="{8BBBF60A-A59A-4A8F-802E-477EB955F406}"/>
+              </a:ext>
+            </a:extLst>
+          </p:cNvPr>
+          <p:cNvSpPr>
+            <a:spLocks noGrp="1"/>
+          </p:cNvSpPr>
+          <p:nvPr>
+            <p:ph type="title"/>
+          </p:nvPr>
+        </p:nvSpPr>
+        <p:spPr>
+          <a:xfrm>
+            <a:off x="838200" y="2766218"/>
+            <a:ext cx="10515600" cy="1325563"/>
+          </a:xfrm>
+        </p:spPr>
+        <p:txBody>
+          <a:bodyPr/>
+          <a:lstStyle/>
+          <a:p>
+            <a:pPr algn="ctr"/>
+            <a:r>
+              <a:rPr lang="en-US" dirty="0"/>
+              <a:t>What makes it difficult?</a:t>
+            </a:r>
+          </a:p>
+        </p:txBody>
+      </p:sp>
+    </p:spTree>
+    <p:extLst>
+      <p:ext uri="{BB962C8B-B14F-4D97-AF65-F5344CB8AC3E}">
+        <p14:creationId xmlns:p14="http://schemas.microsoft.com/office/powerpoint/2010/main" val="4101368341"/>
+      </p:ext>
+    </p:extLst>
+  </p:cSld>
+  <p:clrMapOvr>
+    <a:masterClrMapping/>
+  </p:clrMapOvr>
+</p:sld>
+</file>
+
+<file path=ppt/slides/slide22.xml><?xml version="1.0" encoding="utf-8"?>
+<p:sld xmlns:a="http://schemas.openxmlformats.org/drawingml/2006/main" xmlns:r="http://schemas.openxmlformats.org/officeDocument/2006/relationships" xmlns:p="http://schemas.openxmlformats.org/presentationml/2006/main">
+  <p:cSld>
+    <p:spTree>
+      <p:nvGrpSpPr>
+        <p:cNvPr id="1" name=""/>
+        <p:cNvGrpSpPr/>
+        <p:nvPr/>
+      </p:nvGrpSpPr>
+      <p:grpSpPr>
+        <a:xfrm>
+          <a:off x="0" y="0"/>
+          <a:ext cx="0" cy="0"/>
+          <a:chOff x="0" y="0"/>
+          <a:chExt cx="0" cy="0"/>
+        </a:xfrm>
+      </p:grpSpPr>
+      <p:pic>
+        <p:nvPicPr>
+          <p:cNvPr id="4" name="Picture 3">
+            <a:extLst>
+              <a:ext uri="{FF2B5EF4-FFF2-40B4-BE49-F238E27FC236}">
+                <a16:creationId xmlns:a16="http://schemas.microsoft.com/office/drawing/2014/main" id="{F9EDDD69-1AAA-4D13-8D3C-07F3F4E8E72A}"/>
+              </a:ext>
+            </a:extLst>
+          </p:cNvPr>
+          <p:cNvPicPr>
+            <a:picLocks noChangeAspect="1"/>
+          </p:cNvPicPr>
+          <p:nvPr/>
+        </p:nvPicPr>
+        <p:blipFill>
+          <a:blip r:embed="rId2"/>
+          <a:stretch>
+            <a:fillRect/>
+          </a:stretch>
+        </p:blipFill>
+        <p:spPr>
+          <a:xfrm>
+            <a:off x="2028825" y="1800225"/>
+            <a:ext cx="8134350" cy="3257550"/>
+          </a:xfrm>
+          <a:prstGeom prst="rect">
+            <a:avLst/>
+          </a:prstGeom>
+        </p:spPr>
+      </p:pic>
+      <p:sp>
+        <p:nvSpPr>
+          <p:cNvPr id="5" name="TextBox 4">
+            <a:extLst>
+              <a:ext uri="{FF2B5EF4-FFF2-40B4-BE49-F238E27FC236}">
+                <a16:creationId xmlns:a16="http://schemas.microsoft.com/office/drawing/2014/main" id="{CF3D27C3-9D27-4EC5-A809-C40A0E54E486}"/>
+              </a:ext>
+            </a:extLst>
+          </p:cNvPr>
+          <p:cNvSpPr txBox="1"/>
+          <p:nvPr/>
+        </p:nvSpPr>
+        <p:spPr>
+          <a:xfrm>
+            <a:off x="448408" y="6330462"/>
+            <a:ext cx="9098453" cy="369332"/>
+          </a:xfrm>
+          <a:prstGeom prst="rect">
+            <a:avLst/>
+          </a:prstGeom>
+          <a:noFill/>
+        </p:spPr>
+        <p:txBody>
+          <a:bodyPr wrap="none" rtlCol="0">
+            <a:spAutoFit/>
+          </a:bodyPr>
+          <a:lstStyle/>
+          <a:p>
+            <a:r>
+              <a:rPr lang="en-US" dirty="0"/>
+              <a:t>https://www.ecenglish.com/en/social/blog/ec-central/2015/11/23/vocab-review-homophones</a:t>
+            </a:r>
+          </a:p>
+        </p:txBody>
+      </p:sp>
+    </p:spTree>
+    <p:extLst>
+      <p:ext uri="{BB962C8B-B14F-4D97-AF65-F5344CB8AC3E}">
+        <p14:creationId xmlns:p14="http://schemas.microsoft.com/office/powerpoint/2010/main" val="2355477888"/>
+      </p:ext>
+    </p:extLst>
+  </p:cSld>
+  <p:clrMapOvr>
+    <a:masterClrMapping/>
+  </p:clrMapOvr>
+</p:sld>
+</file>
+
+<file path=ppt/slides/slide23.xml><?xml version="1.0" encoding="utf-8"?>
+<p:sld xmlns:a="http://schemas.openxmlformats.org/drawingml/2006/main" xmlns:r="http://schemas.openxmlformats.org/officeDocument/2006/relationships" xmlns:p="http://schemas.openxmlformats.org/presentationml/2006/main">
+  <p:cSld>
+    <p:spTree>
+      <p:nvGrpSpPr>
+        <p:cNvPr id="1" name=""/>
+        <p:cNvGrpSpPr/>
+        <p:nvPr/>
+      </p:nvGrpSpPr>
+      <p:grpSpPr>
+        <a:xfrm>
+          <a:off x="0" y="0"/>
+          <a:ext cx="0" cy="0"/>
+          <a:chOff x="0" y="0"/>
+          <a:chExt cx="0" cy="0"/>
+        </a:xfrm>
+      </p:grpSpPr>
       <p:pic>
         <p:nvPicPr>
           <p:cNvPr id="4" name="Picture 3">
@@ -5403,7 +5689,7 @@
 </p:sld>
 </file>
 
-<file path=ppt/slides/slide21.xml><?xml version="1.0" encoding="utf-8"?>
+<file path=ppt/slides/slide24.xml><?xml version="1.0" encoding="utf-8"?>
 <p:sld xmlns:a="http://schemas.openxmlformats.org/drawingml/2006/main" xmlns:r="http://schemas.openxmlformats.org/officeDocument/2006/relationships" xmlns:p="http://schemas.openxmlformats.org/presentationml/2006/main">
   <p:cSld>
     <p:spTree>
@@ -5498,7 +5784,7 @@
 </p:sld>
 </file>
 
-<file path=ppt/slides/slide22.xml><?xml version="1.0" encoding="utf-8"?>
+<file path=ppt/slides/slide25.xml><?xml version="1.0" encoding="utf-8"?>
 <p:sld xmlns:a="http://schemas.openxmlformats.org/drawingml/2006/main" xmlns:r="http://schemas.openxmlformats.org/officeDocument/2006/relationships" xmlns:p="http://schemas.openxmlformats.org/presentationml/2006/main">
   <p:cSld>
     <p:spTree>
@@ -5584,291 +5870,6 @@
     <p:extLst>
       <p:ext uri="{BB962C8B-B14F-4D97-AF65-F5344CB8AC3E}">
         <p14:creationId xmlns:p14="http://schemas.microsoft.com/office/powerpoint/2010/main" val="542386749"/>
-      </p:ext>
-    </p:extLst>
-  </p:cSld>
-  <p:clrMapOvr>
-    <a:masterClrMapping/>
-  </p:clrMapOvr>
-</p:sld>
-</file>
-
-<file path=ppt/slides/slide23.xml><?xml version="1.0" encoding="utf-8"?>
-<p:sld xmlns:a="http://schemas.openxmlformats.org/drawingml/2006/main" xmlns:r="http://schemas.openxmlformats.org/officeDocument/2006/relationships" xmlns:p="http://schemas.openxmlformats.org/presentationml/2006/main">
-  <p:cSld>
-    <p:spTree>
-      <p:nvGrpSpPr>
-        <p:cNvPr id="1" name=""/>
-        <p:cNvGrpSpPr/>
-        <p:nvPr/>
-      </p:nvGrpSpPr>
-      <p:grpSpPr>
-        <a:xfrm>
-          <a:off x="0" y="0"/>
-          <a:ext cx="0" cy="0"/>
-          <a:chOff x="0" y="0"/>
-          <a:chExt cx="0" cy="0"/>
-        </a:xfrm>
-      </p:grpSpPr>
-      <p:pic>
-        <p:nvPicPr>
-          <p:cNvPr id="4" name="Picture 3">
-            <a:extLst>
-              <a:ext uri="{FF2B5EF4-FFF2-40B4-BE49-F238E27FC236}">
-                <a16:creationId xmlns:a16="http://schemas.microsoft.com/office/drawing/2014/main" id="{F3F60A23-0333-45C8-AE52-A13F1A814A13}"/>
-              </a:ext>
-            </a:extLst>
-          </p:cNvPr>
-          <p:cNvPicPr>
-            <a:picLocks noChangeAspect="1"/>
-          </p:cNvPicPr>
-          <p:nvPr/>
-        </p:nvPicPr>
-        <p:blipFill>
-          <a:blip r:embed="rId2"/>
-          <a:stretch>
-            <a:fillRect/>
-          </a:stretch>
-        </p:blipFill>
-        <p:spPr>
-          <a:xfrm>
-            <a:off x="3152775" y="1924050"/>
-            <a:ext cx="5886450" cy="3009900"/>
-          </a:xfrm>
-          <a:prstGeom prst="rect">
-            <a:avLst/>
-          </a:prstGeom>
-        </p:spPr>
-      </p:pic>
-      <p:sp>
-        <p:nvSpPr>
-          <p:cNvPr id="5" name="TextBox 4">
-            <a:extLst>
-              <a:ext uri="{FF2B5EF4-FFF2-40B4-BE49-F238E27FC236}">
-                <a16:creationId xmlns:a16="http://schemas.microsoft.com/office/drawing/2014/main" id="{52382646-EBE0-43C9-8D28-31CD730C0C1D}"/>
-              </a:ext>
-            </a:extLst>
-          </p:cNvPr>
-          <p:cNvSpPr txBox="1"/>
-          <p:nvPr/>
-        </p:nvSpPr>
-        <p:spPr>
-          <a:xfrm>
-            <a:off x="290146" y="6268915"/>
-            <a:ext cx="7716921" cy="369332"/>
-          </a:xfrm>
-          <a:prstGeom prst="rect">
-            <a:avLst/>
-          </a:prstGeom>
-          <a:noFill/>
-        </p:spPr>
-        <p:txBody>
-          <a:bodyPr wrap="none" rtlCol="0">
-            <a:spAutoFit/>
-          </a:bodyPr>
-          <a:lstStyle/>
-          <a:p>
-            <a:r>
-              <a:rPr lang="en-US" dirty="0"/>
-              <a:t>http://onthesannyside.blogspot.com/2015/08/fun-with-dangling-modifiers.html</a:t>
-            </a:r>
-          </a:p>
-        </p:txBody>
-      </p:sp>
-    </p:spTree>
-    <p:extLst>
-      <p:ext uri="{BB962C8B-B14F-4D97-AF65-F5344CB8AC3E}">
-        <p14:creationId xmlns:p14="http://schemas.microsoft.com/office/powerpoint/2010/main" val="1947087966"/>
-      </p:ext>
-    </p:extLst>
-  </p:cSld>
-  <p:clrMapOvr>
-    <a:masterClrMapping/>
-  </p:clrMapOvr>
-</p:sld>
-</file>
-
-<file path=ppt/slides/slide24.xml><?xml version="1.0" encoding="utf-8"?>
-<p:sld xmlns:a="http://schemas.openxmlformats.org/drawingml/2006/main" xmlns:r="http://schemas.openxmlformats.org/officeDocument/2006/relationships" xmlns:p="http://schemas.openxmlformats.org/presentationml/2006/main">
-  <p:cSld>
-    <p:spTree>
-      <p:nvGrpSpPr>
-        <p:cNvPr id="1" name=""/>
-        <p:cNvGrpSpPr/>
-        <p:nvPr/>
-      </p:nvGrpSpPr>
-      <p:grpSpPr>
-        <a:xfrm>
-          <a:off x="0" y="0"/>
-          <a:ext cx="0" cy="0"/>
-          <a:chOff x="0" y="0"/>
-          <a:chExt cx="0" cy="0"/>
-        </a:xfrm>
-      </p:grpSpPr>
-      <p:pic>
-        <p:nvPicPr>
-          <p:cNvPr id="5" name="Picture 4">
-            <a:extLst>
-              <a:ext uri="{FF2B5EF4-FFF2-40B4-BE49-F238E27FC236}">
-                <a16:creationId xmlns:a16="http://schemas.microsoft.com/office/drawing/2014/main" id="{66408A3E-9798-43BD-8B1A-BA7876AEE2D1}"/>
-              </a:ext>
-            </a:extLst>
-          </p:cNvPr>
-          <p:cNvPicPr>
-            <a:picLocks noChangeAspect="1"/>
-          </p:cNvPicPr>
-          <p:nvPr/>
-        </p:nvPicPr>
-        <p:blipFill>
-          <a:blip r:embed="rId2"/>
-          <a:stretch>
-            <a:fillRect/>
-          </a:stretch>
-        </p:blipFill>
-        <p:spPr>
-          <a:xfrm>
-            <a:off x="2957512" y="881062"/>
-            <a:ext cx="6276975" cy="5095875"/>
-          </a:xfrm>
-          <a:prstGeom prst="rect">
-            <a:avLst/>
-          </a:prstGeom>
-        </p:spPr>
-      </p:pic>
-      <p:sp>
-        <p:nvSpPr>
-          <p:cNvPr id="6" name="TextBox 5">
-            <a:extLst>
-              <a:ext uri="{FF2B5EF4-FFF2-40B4-BE49-F238E27FC236}">
-                <a16:creationId xmlns:a16="http://schemas.microsoft.com/office/drawing/2014/main" id="{64FF75DC-A0FB-4F5B-95E2-C0C190ABF7B6}"/>
-              </a:ext>
-            </a:extLst>
-          </p:cNvPr>
-          <p:cNvSpPr txBox="1"/>
-          <p:nvPr/>
-        </p:nvSpPr>
-        <p:spPr>
-          <a:xfrm>
-            <a:off x="553915" y="6497515"/>
-            <a:ext cx="3253327" cy="369332"/>
-          </a:xfrm>
-          <a:prstGeom prst="rect">
-            <a:avLst/>
-          </a:prstGeom>
-          <a:noFill/>
-        </p:spPr>
-        <p:txBody>
-          <a:bodyPr wrap="none" rtlCol="0">
-            <a:spAutoFit/>
-          </a:bodyPr>
-          <a:lstStyle/>
-          <a:p>
-            <a:r>
-              <a:rPr lang="en-US" dirty="0"/>
-              <a:t>http://explosm.net/comics/1206</a:t>
-            </a:r>
-          </a:p>
-        </p:txBody>
-      </p:sp>
-    </p:spTree>
-    <p:extLst>
-      <p:ext uri="{BB962C8B-B14F-4D97-AF65-F5344CB8AC3E}">
-        <p14:creationId xmlns:p14="http://schemas.microsoft.com/office/powerpoint/2010/main" val="2338183793"/>
-      </p:ext>
-    </p:extLst>
-  </p:cSld>
-  <p:clrMapOvr>
-    <a:masterClrMapping/>
-  </p:clrMapOvr>
-</p:sld>
-</file>
-
-<file path=ppt/slides/slide25.xml><?xml version="1.0" encoding="utf-8"?>
-<p:sld xmlns:a="http://schemas.openxmlformats.org/drawingml/2006/main" xmlns:r="http://schemas.openxmlformats.org/officeDocument/2006/relationships" xmlns:p="http://schemas.openxmlformats.org/presentationml/2006/main">
-  <p:cSld>
-    <p:spTree>
-      <p:nvGrpSpPr>
-        <p:cNvPr id="1" name=""/>
-        <p:cNvGrpSpPr/>
-        <p:nvPr/>
-      </p:nvGrpSpPr>
-      <p:grpSpPr>
-        <a:xfrm>
-          <a:off x="0" y="0"/>
-          <a:ext cx="0" cy="0"/>
-          <a:chOff x="0" y="0"/>
-          <a:chExt cx="0" cy="0"/>
-        </a:xfrm>
-      </p:grpSpPr>
-      <p:pic>
-        <p:nvPicPr>
-          <p:cNvPr id="4" name="Picture 3">
-            <a:extLst>
-              <a:ext uri="{FF2B5EF4-FFF2-40B4-BE49-F238E27FC236}">
-                <a16:creationId xmlns:a16="http://schemas.microsoft.com/office/drawing/2014/main" id="{51CFC2AF-9F3B-415D-84FC-7D0FF446C805}"/>
-              </a:ext>
-            </a:extLst>
-          </p:cNvPr>
-          <p:cNvPicPr>
-            <a:picLocks noChangeAspect="1"/>
-          </p:cNvPicPr>
-          <p:nvPr/>
-        </p:nvPicPr>
-        <p:blipFill>
-          <a:blip r:embed="rId3"/>
-          <a:stretch>
-            <a:fillRect/>
-          </a:stretch>
-        </p:blipFill>
-        <p:spPr>
-          <a:xfrm>
-            <a:off x="3933297" y="567104"/>
-            <a:ext cx="4325405" cy="5723792"/>
-          </a:xfrm>
-          <a:prstGeom prst="rect">
-            <a:avLst/>
-          </a:prstGeom>
-        </p:spPr>
-      </p:pic>
-      <p:sp>
-        <p:nvSpPr>
-          <p:cNvPr id="5" name="TextBox 4">
-            <a:extLst>
-              <a:ext uri="{FF2B5EF4-FFF2-40B4-BE49-F238E27FC236}">
-                <a16:creationId xmlns:a16="http://schemas.microsoft.com/office/drawing/2014/main" id="{0F073715-D9B2-44B5-9070-86D8F3D4B61E}"/>
-              </a:ext>
-            </a:extLst>
-          </p:cNvPr>
-          <p:cNvSpPr txBox="1"/>
-          <p:nvPr/>
-        </p:nvSpPr>
-        <p:spPr>
-          <a:xfrm>
-            <a:off x="228600" y="6488668"/>
-            <a:ext cx="4271554" cy="369332"/>
-          </a:xfrm>
-          <a:prstGeom prst="rect">
-            <a:avLst/>
-          </a:prstGeom>
-          <a:noFill/>
-        </p:spPr>
-        <p:txBody>
-          <a:bodyPr wrap="none" rtlCol="0">
-            <a:spAutoFit/>
-          </a:bodyPr>
-          <a:lstStyle/>
-          <a:p>
-            <a:r>
-              <a:rPr lang="en-US" dirty="0"/>
-              <a:t>https://imgur.com/r/thesimpsons/1ZKxV5O</a:t>
-            </a:r>
-          </a:p>
-        </p:txBody>
-      </p:sp>
-    </p:spTree>
-    <p:extLst>
-      <p:ext uri="{BB962C8B-B14F-4D97-AF65-F5344CB8AC3E}">
-        <p14:creationId xmlns:p14="http://schemas.microsoft.com/office/powerpoint/2010/main" val="861989681"/>
       </p:ext>
     </p:extLst>
   </p:cSld>
@@ -5895,58 +5896,67 @@
           <a:chExt cx="0" cy="0"/>
         </a:xfrm>
       </p:grpSpPr>
-      <p:sp>
-        <p:nvSpPr>
-          <p:cNvPr id="2" name="Title 1">
-            <a:extLst>
-              <a:ext uri="{FF2B5EF4-FFF2-40B4-BE49-F238E27FC236}">
-                <a16:creationId xmlns:a16="http://schemas.microsoft.com/office/drawing/2014/main" id="{18A90EB0-8369-4399-91E0-FA372BB7FCCD}"/>
-              </a:ext>
-            </a:extLst>
-          </p:cNvPr>
-          <p:cNvSpPr>
-            <a:spLocks noGrp="1"/>
-          </p:cNvSpPr>
-          <p:nvPr>
-            <p:ph type="title"/>
-          </p:nvPr>
-        </p:nvSpPr>
-        <p:spPr/>
-        <p:txBody>
-          <a:bodyPr/>
+      <p:pic>
+        <p:nvPicPr>
+          <p:cNvPr id="4" name="Picture 3">
+            <a:extLst>
+              <a:ext uri="{FF2B5EF4-FFF2-40B4-BE49-F238E27FC236}">
+                <a16:creationId xmlns:a16="http://schemas.microsoft.com/office/drawing/2014/main" id="{F3F60A23-0333-45C8-AE52-A13F1A814A13}"/>
+              </a:ext>
+            </a:extLst>
+          </p:cNvPr>
+          <p:cNvPicPr>
+            <a:picLocks noChangeAspect="1"/>
+          </p:cNvPicPr>
+          <p:nvPr/>
+        </p:nvPicPr>
+        <p:blipFill>
+          <a:blip r:embed="rId2"/>
+          <a:stretch>
+            <a:fillRect/>
+          </a:stretch>
+        </p:blipFill>
+        <p:spPr>
+          <a:xfrm>
+            <a:off x="3152775" y="1924050"/>
+            <a:ext cx="5886450" cy="3009900"/>
+          </a:xfrm>
+          <a:prstGeom prst="rect">
+            <a:avLst/>
+          </a:prstGeom>
+        </p:spPr>
+      </p:pic>
+      <p:sp>
+        <p:nvSpPr>
+          <p:cNvPr id="5" name="TextBox 4">
+            <a:extLst>
+              <a:ext uri="{FF2B5EF4-FFF2-40B4-BE49-F238E27FC236}">
+                <a16:creationId xmlns:a16="http://schemas.microsoft.com/office/drawing/2014/main" id="{52382646-EBE0-43C9-8D28-31CD730C0C1D}"/>
+              </a:ext>
+            </a:extLst>
+          </p:cNvPr>
+          <p:cNvSpPr txBox="1"/>
+          <p:nvPr/>
+        </p:nvSpPr>
+        <p:spPr>
+          <a:xfrm>
+            <a:off x="290146" y="6268915"/>
+            <a:ext cx="7716921" cy="369332"/>
+          </a:xfrm>
+          <a:prstGeom prst="rect">
+            <a:avLst/>
+          </a:prstGeom>
+          <a:noFill/>
+        </p:spPr>
+        <p:txBody>
+          <a:bodyPr wrap="none" rtlCol="0">
+            <a:spAutoFit/>
+          </a:bodyPr>
           <a:lstStyle/>
           <a:p>
             <a:r>
               <a:rPr lang="en-US" dirty="0"/>
-              <a:t>How does it work?</a:t>
-            </a:r>
-          </a:p>
-        </p:txBody>
-      </p:sp>
-      <p:sp>
-        <p:nvSpPr>
-          <p:cNvPr id="3" name="Text Placeholder 2">
-            <a:extLst>
-              <a:ext uri="{FF2B5EF4-FFF2-40B4-BE49-F238E27FC236}">
-                <a16:creationId xmlns:a16="http://schemas.microsoft.com/office/drawing/2014/main" id="{65C440A8-BD6B-4E31-9859-636FAB8718D2}"/>
-              </a:ext>
-            </a:extLst>
-          </p:cNvPr>
-          <p:cNvSpPr>
-            <a:spLocks noGrp="1"/>
-          </p:cNvSpPr>
-          <p:nvPr>
-            <p:ph type="body" idx="1"/>
-          </p:nvPr>
-        </p:nvSpPr>
-        <p:spPr/>
-        <p:txBody>
-          <a:bodyPr/>
-          <a:lstStyle/>
-          <a:p>
-            <a:r>
-              <a:rPr lang="en-US" dirty="0"/>
-              <a:t>…and how can we make it work?</a:t>
+              <a:t>http://onthesannyside.blogspot.com/2015/08/fun-with-dangling-modifiers.html</a:t>
             </a:r>
           </a:p>
         </p:txBody>
@@ -5954,7 +5964,7 @@
     </p:spTree>
     <p:extLst>
       <p:ext uri="{BB962C8B-B14F-4D97-AF65-F5344CB8AC3E}">
-        <p14:creationId xmlns:p14="http://schemas.microsoft.com/office/powerpoint/2010/main" val="1449710088"/>
+        <p14:creationId xmlns:p14="http://schemas.microsoft.com/office/powerpoint/2010/main" val="1947087966"/>
       </p:ext>
     </p:extLst>
   </p:cSld>
@@ -5981,58 +5991,67 @@
           <a:chExt cx="0" cy="0"/>
         </a:xfrm>
       </p:grpSpPr>
-      <p:sp>
-        <p:nvSpPr>
-          <p:cNvPr id="2" name="Title 1">
-            <a:extLst>
-              <a:ext uri="{FF2B5EF4-FFF2-40B4-BE49-F238E27FC236}">
-                <a16:creationId xmlns:a16="http://schemas.microsoft.com/office/drawing/2014/main" id="{26A9EA07-C815-4C12-8064-A8C916741E39}"/>
-              </a:ext>
-            </a:extLst>
-          </p:cNvPr>
-          <p:cNvSpPr>
-            <a:spLocks noGrp="1"/>
-          </p:cNvSpPr>
-          <p:nvPr>
-            <p:ph type="title"/>
-          </p:nvPr>
-        </p:nvSpPr>
-        <p:spPr/>
-        <p:txBody>
-          <a:bodyPr/>
+      <p:pic>
+        <p:nvPicPr>
+          <p:cNvPr id="5" name="Picture 4">
+            <a:extLst>
+              <a:ext uri="{FF2B5EF4-FFF2-40B4-BE49-F238E27FC236}">
+                <a16:creationId xmlns:a16="http://schemas.microsoft.com/office/drawing/2014/main" id="{66408A3E-9798-43BD-8B1A-BA7876AEE2D1}"/>
+              </a:ext>
+            </a:extLst>
+          </p:cNvPr>
+          <p:cNvPicPr>
+            <a:picLocks noChangeAspect="1"/>
+          </p:cNvPicPr>
+          <p:nvPr/>
+        </p:nvPicPr>
+        <p:blipFill>
+          <a:blip r:embed="rId2"/>
+          <a:stretch>
+            <a:fillRect/>
+          </a:stretch>
+        </p:blipFill>
+        <p:spPr>
+          <a:xfrm>
+            <a:off x="2957512" y="881062"/>
+            <a:ext cx="6276975" cy="5095875"/>
+          </a:xfrm>
+          <a:prstGeom prst="rect">
+            <a:avLst/>
+          </a:prstGeom>
+        </p:spPr>
+      </p:pic>
+      <p:sp>
+        <p:nvSpPr>
+          <p:cNvPr id="6" name="TextBox 5">
+            <a:extLst>
+              <a:ext uri="{FF2B5EF4-FFF2-40B4-BE49-F238E27FC236}">
+                <a16:creationId xmlns:a16="http://schemas.microsoft.com/office/drawing/2014/main" id="{64FF75DC-A0FB-4F5B-95E2-C0C190ABF7B6}"/>
+              </a:ext>
+            </a:extLst>
+          </p:cNvPr>
+          <p:cNvSpPr txBox="1"/>
+          <p:nvPr/>
+        </p:nvSpPr>
+        <p:spPr>
+          <a:xfrm>
+            <a:off x="553915" y="6497515"/>
+            <a:ext cx="3253327" cy="369332"/>
+          </a:xfrm>
+          <a:prstGeom prst="rect">
+            <a:avLst/>
+          </a:prstGeom>
+          <a:noFill/>
+        </p:spPr>
+        <p:txBody>
+          <a:bodyPr wrap="none" rtlCol="0">
+            <a:spAutoFit/>
+          </a:bodyPr>
           <a:lstStyle/>
           <a:p>
             <a:r>
               <a:rPr lang="en-US" dirty="0"/>
-              <a:t>Where do we use it?</a:t>
-            </a:r>
-          </a:p>
-        </p:txBody>
-      </p:sp>
-      <p:sp>
-        <p:nvSpPr>
-          <p:cNvPr id="3" name="Text Placeholder 2">
-            <a:extLst>
-              <a:ext uri="{FF2B5EF4-FFF2-40B4-BE49-F238E27FC236}">
-                <a16:creationId xmlns:a16="http://schemas.microsoft.com/office/drawing/2014/main" id="{BB0FC9DE-A777-429C-A27C-BFD49F843988}"/>
-              </a:ext>
-            </a:extLst>
-          </p:cNvPr>
-          <p:cNvSpPr>
-            <a:spLocks noGrp="1"/>
-          </p:cNvSpPr>
-          <p:nvPr>
-            <p:ph type="body" idx="1"/>
-          </p:nvPr>
-        </p:nvSpPr>
-        <p:spPr/>
-        <p:txBody>
-          <a:bodyPr/>
-          <a:lstStyle/>
-          <a:p>
-            <a:r>
-              <a:rPr lang="en-US" dirty="0"/>
-              <a:t>…and how do we use it?</a:t>
+              <a:t>http://explosm.net/comics/1206</a:t>
             </a:r>
           </a:p>
         </p:txBody>
@@ -6040,7 +6059,7 @@
     </p:spTree>
     <p:extLst>
       <p:ext uri="{BB962C8B-B14F-4D97-AF65-F5344CB8AC3E}">
-        <p14:creationId xmlns:p14="http://schemas.microsoft.com/office/powerpoint/2010/main" val="3299538302"/>
+        <p14:creationId xmlns:p14="http://schemas.microsoft.com/office/powerpoint/2010/main" val="2338183793"/>
       </p:ext>
     </p:extLst>
   </p:cSld>
@@ -6067,58 +6086,67 @@
           <a:chExt cx="0" cy="0"/>
         </a:xfrm>
       </p:grpSpPr>
-      <p:sp>
-        <p:nvSpPr>
-          <p:cNvPr id="2" name="Title 1">
-            <a:extLst>
-              <a:ext uri="{FF2B5EF4-FFF2-40B4-BE49-F238E27FC236}">
-                <a16:creationId xmlns:a16="http://schemas.microsoft.com/office/drawing/2014/main" id="{7B77F8BE-4F19-449F-8AC6-2F4872E1A50C}"/>
-              </a:ext>
-            </a:extLst>
-          </p:cNvPr>
-          <p:cNvSpPr>
-            <a:spLocks noGrp="1"/>
-          </p:cNvSpPr>
-          <p:nvPr>
-            <p:ph type="title"/>
-          </p:nvPr>
-        </p:nvSpPr>
-        <p:spPr/>
-        <p:txBody>
-          <a:bodyPr/>
+      <p:pic>
+        <p:nvPicPr>
+          <p:cNvPr id="4" name="Picture 3">
+            <a:extLst>
+              <a:ext uri="{FF2B5EF4-FFF2-40B4-BE49-F238E27FC236}">
+                <a16:creationId xmlns:a16="http://schemas.microsoft.com/office/drawing/2014/main" id="{51CFC2AF-9F3B-415D-84FC-7D0FF446C805}"/>
+              </a:ext>
+            </a:extLst>
+          </p:cNvPr>
+          <p:cNvPicPr>
+            <a:picLocks noChangeAspect="1"/>
+          </p:cNvPicPr>
+          <p:nvPr/>
+        </p:nvPicPr>
+        <p:blipFill>
+          <a:blip r:embed="rId3"/>
+          <a:stretch>
+            <a:fillRect/>
+          </a:stretch>
+        </p:blipFill>
+        <p:spPr>
+          <a:xfrm>
+            <a:off x="3933297" y="567104"/>
+            <a:ext cx="4325405" cy="5723792"/>
+          </a:xfrm>
+          <a:prstGeom prst="rect">
+            <a:avLst/>
+          </a:prstGeom>
+        </p:spPr>
+      </p:pic>
+      <p:sp>
+        <p:nvSpPr>
+          <p:cNvPr id="5" name="TextBox 4">
+            <a:extLst>
+              <a:ext uri="{FF2B5EF4-FFF2-40B4-BE49-F238E27FC236}">
+                <a16:creationId xmlns:a16="http://schemas.microsoft.com/office/drawing/2014/main" id="{0F073715-D9B2-44B5-9070-86D8F3D4B61E}"/>
+              </a:ext>
+            </a:extLst>
+          </p:cNvPr>
+          <p:cNvSpPr txBox="1"/>
+          <p:nvPr/>
+        </p:nvSpPr>
+        <p:spPr>
+          <a:xfrm>
+            <a:off x="228600" y="6488668"/>
+            <a:ext cx="4271554" cy="369332"/>
+          </a:xfrm>
+          <a:prstGeom prst="rect">
+            <a:avLst/>
+          </a:prstGeom>
+          <a:noFill/>
+        </p:spPr>
+        <p:txBody>
+          <a:bodyPr wrap="none" rtlCol="0">
+            <a:spAutoFit/>
+          </a:bodyPr>
           <a:lstStyle/>
           <a:p>
             <a:r>
               <a:rPr lang="en-US" dirty="0"/>
-              <a:t>What else could we do?</a:t>
-            </a:r>
-          </a:p>
-        </p:txBody>
-      </p:sp>
-      <p:sp>
-        <p:nvSpPr>
-          <p:cNvPr id="3" name="Text Placeholder 2">
-            <a:extLst>
-              <a:ext uri="{FF2B5EF4-FFF2-40B4-BE49-F238E27FC236}">
-                <a16:creationId xmlns:a16="http://schemas.microsoft.com/office/drawing/2014/main" id="{C6F65EE0-41D5-4689-8723-6A265983E289}"/>
-              </a:ext>
-            </a:extLst>
-          </p:cNvPr>
-          <p:cNvSpPr>
-            <a:spLocks noGrp="1"/>
-          </p:cNvSpPr>
-          <p:nvPr>
-            <p:ph type="body" idx="1"/>
-          </p:nvPr>
-        </p:nvSpPr>
-        <p:spPr/>
-        <p:txBody>
-          <a:bodyPr/>
-          <a:lstStyle/>
-          <a:p>
-            <a:r>
-              <a:rPr lang="en-US" dirty="0"/>
-              <a:t>…and what should we do?</a:t>
+              <a:t>https://imgur.com/r/thesimpsons/1ZKxV5O</a:t>
             </a:r>
           </a:p>
         </p:txBody>
@@ -6126,7 +6154,7 @@
     </p:spTree>
     <p:extLst>
       <p:ext uri="{BB962C8B-B14F-4D97-AF65-F5344CB8AC3E}">
-        <p14:creationId xmlns:p14="http://schemas.microsoft.com/office/powerpoint/2010/main" val="92633407"/>
+        <p14:creationId xmlns:p14="http://schemas.microsoft.com/office/powerpoint/2010/main" val="861989681"/>
       </p:ext>
     </p:extLst>
   </p:cSld>
@@ -6153,67 +6181,58 @@
           <a:chExt cx="0" cy="0"/>
         </a:xfrm>
       </p:grpSpPr>
-      <p:pic>
-        <p:nvPicPr>
-          <p:cNvPr id="4" name="Picture 3">
-            <a:extLst>
-              <a:ext uri="{FF2B5EF4-FFF2-40B4-BE49-F238E27FC236}">
-                <a16:creationId xmlns:a16="http://schemas.microsoft.com/office/drawing/2014/main" id="{BC074295-000C-4FAF-BBAE-AC54BA84CC35}"/>
-              </a:ext>
-            </a:extLst>
-          </p:cNvPr>
-          <p:cNvPicPr>
-            <a:picLocks noChangeAspect="1"/>
-          </p:cNvPicPr>
-          <p:nvPr/>
-        </p:nvPicPr>
-        <p:blipFill>
-          <a:blip r:embed="rId2"/>
-          <a:stretch>
-            <a:fillRect/>
-          </a:stretch>
-        </p:blipFill>
-        <p:spPr>
-          <a:xfrm>
-            <a:off x="3719512" y="1428750"/>
-            <a:ext cx="4752975" cy="4000500"/>
-          </a:xfrm>
-          <a:prstGeom prst="rect">
-            <a:avLst/>
-          </a:prstGeom>
-        </p:spPr>
-      </p:pic>
-      <p:sp>
-        <p:nvSpPr>
-          <p:cNvPr id="5" name="TextBox 4">
-            <a:extLst>
-              <a:ext uri="{FF2B5EF4-FFF2-40B4-BE49-F238E27FC236}">
-                <a16:creationId xmlns:a16="http://schemas.microsoft.com/office/drawing/2014/main" id="{6108D87E-8D12-4E55-A8C4-9859FAB1A171}"/>
-              </a:ext>
-            </a:extLst>
-          </p:cNvPr>
-          <p:cNvSpPr txBox="1"/>
-          <p:nvPr/>
-        </p:nvSpPr>
-        <p:spPr>
-          <a:xfrm>
-            <a:off x="395654" y="6488668"/>
-            <a:ext cx="7494231" cy="369332"/>
-          </a:xfrm>
-          <a:prstGeom prst="rect">
-            <a:avLst/>
-          </a:prstGeom>
-          <a:noFill/>
-        </p:spPr>
-        <p:txBody>
-          <a:bodyPr wrap="none" rtlCol="0">
-            <a:spAutoFit/>
-          </a:bodyPr>
+      <p:sp>
+        <p:nvSpPr>
+          <p:cNvPr id="2" name="Title 1">
+            <a:extLst>
+              <a:ext uri="{FF2B5EF4-FFF2-40B4-BE49-F238E27FC236}">
+                <a16:creationId xmlns:a16="http://schemas.microsoft.com/office/drawing/2014/main" id="{18A90EB0-8369-4399-91E0-FA372BB7FCCD}"/>
+              </a:ext>
+            </a:extLst>
+          </p:cNvPr>
+          <p:cNvSpPr>
+            <a:spLocks noGrp="1"/>
+          </p:cNvSpPr>
+          <p:nvPr>
+            <p:ph type="title"/>
+          </p:nvPr>
+        </p:nvSpPr>
+        <p:spPr/>
+        <p:txBody>
+          <a:bodyPr/>
           <a:lstStyle/>
           <a:p>
             <a:r>
               <a:rPr lang="en-US" dirty="0"/>
-              <a:t>https://github.com/uclanlp/corefBias/blob/master/NAACL2018_CorefBias.pdf</a:t>
+              <a:t>How does it work?</a:t>
+            </a:r>
+          </a:p>
+        </p:txBody>
+      </p:sp>
+      <p:sp>
+        <p:nvSpPr>
+          <p:cNvPr id="3" name="Text Placeholder 2">
+            <a:extLst>
+              <a:ext uri="{FF2B5EF4-FFF2-40B4-BE49-F238E27FC236}">
+                <a16:creationId xmlns:a16="http://schemas.microsoft.com/office/drawing/2014/main" id="{65C440A8-BD6B-4E31-9859-636FAB8718D2}"/>
+              </a:ext>
+            </a:extLst>
+          </p:cNvPr>
+          <p:cNvSpPr>
+            <a:spLocks noGrp="1"/>
+          </p:cNvSpPr>
+          <p:nvPr>
+            <p:ph type="body" idx="1"/>
+          </p:nvPr>
+        </p:nvSpPr>
+        <p:spPr/>
+        <p:txBody>
+          <a:bodyPr/>
+          <a:lstStyle/>
+          <a:p>
+            <a:r>
+              <a:rPr lang="en-US" dirty="0"/>
+              <a:t>…and how can we make it work?</a:t>
             </a:r>
           </a:p>
         </p:txBody>
@@ -6221,7 +6240,7 @@
     </p:spTree>
     <p:extLst>
       <p:ext uri="{BB962C8B-B14F-4D97-AF65-F5344CB8AC3E}">
-        <p14:creationId xmlns:p14="http://schemas.microsoft.com/office/powerpoint/2010/main" val="4055301317"/>
+        <p14:creationId xmlns:p14="http://schemas.microsoft.com/office/powerpoint/2010/main" val="1449710088"/>
       </p:ext>
     </p:extLst>
   </p:cSld>
@@ -6397,97 +6416,58 @@
           <a:chExt cx="0" cy="0"/>
         </a:xfrm>
       </p:grpSpPr>
-      <p:pic>
-        <p:nvPicPr>
-          <p:cNvPr id="4" name="Picture 3">
-            <a:extLst>
-              <a:ext uri="{FF2B5EF4-FFF2-40B4-BE49-F238E27FC236}">
-                <a16:creationId xmlns:a16="http://schemas.microsoft.com/office/drawing/2014/main" id="{6441639D-130F-48AB-836B-9F0CCAB508EA}"/>
-              </a:ext>
-            </a:extLst>
-          </p:cNvPr>
-          <p:cNvPicPr>
-            <a:picLocks noChangeAspect="1"/>
-          </p:cNvPicPr>
-          <p:nvPr/>
-        </p:nvPicPr>
-        <p:blipFill>
-          <a:blip r:embed="rId2"/>
-          <a:stretch>
-            <a:fillRect/>
-          </a:stretch>
-        </p:blipFill>
-        <p:spPr>
-          <a:xfrm>
-            <a:off x="152400" y="1681162"/>
-            <a:ext cx="5029200" cy="3495675"/>
-          </a:xfrm>
-          <a:prstGeom prst="rect">
-            <a:avLst/>
-          </a:prstGeom>
-        </p:spPr>
-      </p:pic>
-      <p:pic>
-        <p:nvPicPr>
-          <p:cNvPr id="5" name="Picture 4">
-            <a:extLst>
-              <a:ext uri="{FF2B5EF4-FFF2-40B4-BE49-F238E27FC236}">
-                <a16:creationId xmlns:a16="http://schemas.microsoft.com/office/drawing/2014/main" id="{6C356447-70ED-4FDD-B9F7-6086A6BF983D}"/>
-              </a:ext>
-            </a:extLst>
-          </p:cNvPr>
-          <p:cNvPicPr>
-            <a:picLocks noChangeAspect="1"/>
-          </p:cNvPicPr>
-          <p:nvPr/>
-        </p:nvPicPr>
-        <p:blipFill>
-          <a:blip r:embed="rId3"/>
-          <a:stretch>
-            <a:fillRect/>
-          </a:stretch>
-        </p:blipFill>
-        <p:spPr>
-          <a:xfrm>
-            <a:off x="6096000" y="1754981"/>
-            <a:ext cx="5241679" cy="3348037"/>
-          </a:xfrm>
-          <a:prstGeom prst="rect">
-            <a:avLst/>
-          </a:prstGeom>
-        </p:spPr>
-      </p:pic>
-      <p:sp>
-        <p:nvSpPr>
-          <p:cNvPr id="6" name="TextBox 5">
-            <a:extLst>
-              <a:ext uri="{FF2B5EF4-FFF2-40B4-BE49-F238E27FC236}">
-                <a16:creationId xmlns:a16="http://schemas.microsoft.com/office/drawing/2014/main" id="{0D6CF4EB-CAB5-460A-A8FE-DBB66C9B471D}"/>
-              </a:ext>
-            </a:extLst>
-          </p:cNvPr>
-          <p:cNvSpPr txBox="1"/>
-          <p:nvPr/>
-        </p:nvSpPr>
-        <p:spPr>
-          <a:xfrm>
-            <a:off x="439615" y="6216162"/>
-            <a:ext cx="8733481" cy="246221"/>
-          </a:xfrm>
-          <a:prstGeom prst="rect">
-            <a:avLst/>
-          </a:prstGeom>
-          <a:noFill/>
-        </p:spPr>
-        <p:txBody>
-          <a:bodyPr wrap="none" rtlCol="0">
-            <a:spAutoFit/>
-          </a:bodyPr>
-          <a:lstStyle/>
-          <a:p>
-            <a:r>
-              <a:rPr lang="en-US" sz="1000" dirty="0"/>
-              <a:t>https://www.semanticscholar.org/paper/Word-Embeddings-Quantify-100-Years-of-Gender-and-Garg-Schiebinger/56e8985fa61037662650803d48177d752e9ce557</a:t>
+      <p:sp>
+        <p:nvSpPr>
+          <p:cNvPr id="2" name="Title 1">
+            <a:extLst>
+              <a:ext uri="{FF2B5EF4-FFF2-40B4-BE49-F238E27FC236}">
+                <a16:creationId xmlns:a16="http://schemas.microsoft.com/office/drawing/2014/main" id="{26A9EA07-C815-4C12-8064-A8C916741E39}"/>
+              </a:ext>
+            </a:extLst>
+          </p:cNvPr>
+          <p:cNvSpPr>
+            <a:spLocks noGrp="1"/>
+          </p:cNvSpPr>
+          <p:nvPr>
+            <p:ph type="title"/>
+          </p:nvPr>
+        </p:nvSpPr>
+        <p:spPr/>
+        <p:txBody>
+          <a:bodyPr/>
+          <a:lstStyle/>
+          <a:p>
+            <a:r>
+              <a:rPr lang="en-US" dirty="0"/>
+              <a:t>Where do we use it?</a:t>
+            </a:r>
+          </a:p>
+        </p:txBody>
+      </p:sp>
+      <p:sp>
+        <p:nvSpPr>
+          <p:cNvPr id="3" name="Text Placeholder 2">
+            <a:extLst>
+              <a:ext uri="{FF2B5EF4-FFF2-40B4-BE49-F238E27FC236}">
+                <a16:creationId xmlns:a16="http://schemas.microsoft.com/office/drawing/2014/main" id="{BB0FC9DE-A777-429C-A27C-BFD49F843988}"/>
+              </a:ext>
+            </a:extLst>
+          </p:cNvPr>
+          <p:cNvSpPr>
+            <a:spLocks noGrp="1"/>
+          </p:cNvSpPr>
+          <p:nvPr>
+            <p:ph type="body" idx="1"/>
+          </p:nvPr>
+        </p:nvSpPr>
+        <p:spPr/>
+        <p:txBody>
+          <a:bodyPr/>
+          <a:lstStyle/>
+          <a:p>
+            <a:r>
+              <a:rPr lang="en-US" dirty="0"/>
+              <a:t>…and how do we use it?</a:t>
             </a:r>
           </a:p>
         </p:txBody>
@@ -6495,7 +6475,7 @@
     </p:spTree>
     <p:extLst>
       <p:ext uri="{BB962C8B-B14F-4D97-AF65-F5344CB8AC3E}">
-        <p14:creationId xmlns:p14="http://schemas.microsoft.com/office/powerpoint/2010/main" val="3294050383"/>
+        <p14:creationId xmlns:p14="http://schemas.microsoft.com/office/powerpoint/2010/main" val="3299538302"/>
       </p:ext>
     </p:extLst>
   </p:cSld>
@@ -6522,67 +6502,58 @@
           <a:chExt cx="0" cy="0"/>
         </a:xfrm>
       </p:grpSpPr>
-      <p:pic>
-        <p:nvPicPr>
-          <p:cNvPr id="4" name="Picture 3">
-            <a:extLst>
-              <a:ext uri="{FF2B5EF4-FFF2-40B4-BE49-F238E27FC236}">
-                <a16:creationId xmlns:a16="http://schemas.microsoft.com/office/drawing/2014/main" id="{7EBAB47E-D892-4A90-81CE-79326A780CD7}"/>
-              </a:ext>
-            </a:extLst>
-          </p:cNvPr>
-          <p:cNvPicPr>
-            <a:picLocks noChangeAspect="1"/>
-          </p:cNvPicPr>
-          <p:nvPr/>
-        </p:nvPicPr>
-        <p:blipFill>
-          <a:blip r:embed="rId2"/>
-          <a:stretch>
-            <a:fillRect/>
-          </a:stretch>
-        </p:blipFill>
-        <p:spPr>
-          <a:xfrm>
-            <a:off x="90487" y="1119187"/>
-            <a:ext cx="12011025" cy="4619625"/>
-          </a:xfrm>
-          <a:prstGeom prst="rect">
-            <a:avLst/>
-          </a:prstGeom>
-        </p:spPr>
-      </p:pic>
-      <p:sp>
-        <p:nvSpPr>
-          <p:cNvPr id="5" name="TextBox 4">
-            <a:extLst>
-              <a:ext uri="{FF2B5EF4-FFF2-40B4-BE49-F238E27FC236}">
-                <a16:creationId xmlns:a16="http://schemas.microsoft.com/office/drawing/2014/main" id="{17777FA6-516C-459D-8594-24760D1D0AEA}"/>
-              </a:ext>
-            </a:extLst>
-          </p:cNvPr>
-          <p:cNvSpPr txBox="1"/>
-          <p:nvPr/>
-        </p:nvSpPr>
-        <p:spPr>
-          <a:xfrm>
-            <a:off x="90487" y="6418384"/>
-            <a:ext cx="10428176" cy="323165"/>
-          </a:xfrm>
-          <a:prstGeom prst="rect">
-            <a:avLst/>
-          </a:prstGeom>
-          <a:noFill/>
-        </p:spPr>
-        <p:txBody>
-          <a:bodyPr wrap="none" rtlCol="0">
-            <a:spAutoFit/>
-          </a:bodyPr>
-          <a:lstStyle/>
-          <a:p>
-            <a:r>
-              <a:rPr lang="en-US" sz="1500" dirty="0"/>
-              <a:t>https://papers.nips.cc/paper/6228-man-is-to-computer-programmer-as-woman-is-to-homemaker-debiasing-word-embeddings.pdf</a:t>
+      <p:sp>
+        <p:nvSpPr>
+          <p:cNvPr id="2" name="Title 1">
+            <a:extLst>
+              <a:ext uri="{FF2B5EF4-FFF2-40B4-BE49-F238E27FC236}">
+                <a16:creationId xmlns:a16="http://schemas.microsoft.com/office/drawing/2014/main" id="{7B77F8BE-4F19-449F-8AC6-2F4872E1A50C}"/>
+              </a:ext>
+            </a:extLst>
+          </p:cNvPr>
+          <p:cNvSpPr>
+            <a:spLocks noGrp="1"/>
+          </p:cNvSpPr>
+          <p:nvPr>
+            <p:ph type="title"/>
+          </p:nvPr>
+        </p:nvSpPr>
+        <p:spPr/>
+        <p:txBody>
+          <a:bodyPr/>
+          <a:lstStyle/>
+          <a:p>
+            <a:r>
+              <a:rPr lang="en-US" dirty="0"/>
+              <a:t>What else could we do?</a:t>
+            </a:r>
+          </a:p>
+        </p:txBody>
+      </p:sp>
+      <p:sp>
+        <p:nvSpPr>
+          <p:cNvPr id="3" name="Text Placeholder 2">
+            <a:extLst>
+              <a:ext uri="{FF2B5EF4-FFF2-40B4-BE49-F238E27FC236}">
+                <a16:creationId xmlns:a16="http://schemas.microsoft.com/office/drawing/2014/main" id="{C6F65EE0-41D5-4689-8723-6A265983E289}"/>
+              </a:ext>
+            </a:extLst>
+          </p:cNvPr>
+          <p:cNvSpPr>
+            <a:spLocks noGrp="1"/>
+          </p:cNvSpPr>
+          <p:nvPr>
+            <p:ph type="body" idx="1"/>
+          </p:nvPr>
+        </p:nvSpPr>
+        <p:spPr/>
+        <p:txBody>
+          <a:bodyPr/>
+          <a:lstStyle/>
+          <a:p>
+            <a:r>
+              <a:rPr lang="en-US" dirty="0"/>
+              <a:t>…and what should we do?</a:t>
             </a:r>
           </a:p>
         </p:txBody>
@@ -6590,7 +6561,7 @@
     </p:spTree>
     <p:extLst>
       <p:ext uri="{BB962C8B-B14F-4D97-AF65-F5344CB8AC3E}">
-        <p14:creationId xmlns:p14="http://schemas.microsoft.com/office/powerpoint/2010/main" val="205345932"/>
+        <p14:creationId xmlns:p14="http://schemas.microsoft.com/office/powerpoint/2010/main" val="92633407"/>
       </p:ext>
     </p:extLst>
   </p:cSld>
@@ -6617,6 +6588,321 @@
           <a:chExt cx="0" cy="0"/>
         </a:xfrm>
       </p:grpSpPr>
+      <p:pic>
+        <p:nvPicPr>
+          <p:cNvPr id="4" name="Picture 3">
+            <a:extLst>
+              <a:ext uri="{FF2B5EF4-FFF2-40B4-BE49-F238E27FC236}">
+                <a16:creationId xmlns:a16="http://schemas.microsoft.com/office/drawing/2014/main" id="{BC074295-000C-4FAF-BBAE-AC54BA84CC35}"/>
+              </a:ext>
+            </a:extLst>
+          </p:cNvPr>
+          <p:cNvPicPr>
+            <a:picLocks noChangeAspect="1"/>
+          </p:cNvPicPr>
+          <p:nvPr/>
+        </p:nvPicPr>
+        <p:blipFill>
+          <a:blip r:embed="rId2"/>
+          <a:stretch>
+            <a:fillRect/>
+          </a:stretch>
+        </p:blipFill>
+        <p:spPr>
+          <a:xfrm>
+            <a:off x="3719512" y="1428750"/>
+            <a:ext cx="4752975" cy="4000500"/>
+          </a:xfrm>
+          <a:prstGeom prst="rect">
+            <a:avLst/>
+          </a:prstGeom>
+        </p:spPr>
+      </p:pic>
+      <p:sp>
+        <p:nvSpPr>
+          <p:cNvPr id="5" name="TextBox 4">
+            <a:extLst>
+              <a:ext uri="{FF2B5EF4-FFF2-40B4-BE49-F238E27FC236}">
+                <a16:creationId xmlns:a16="http://schemas.microsoft.com/office/drawing/2014/main" id="{6108D87E-8D12-4E55-A8C4-9859FAB1A171}"/>
+              </a:ext>
+            </a:extLst>
+          </p:cNvPr>
+          <p:cNvSpPr txBox="1"/>
+          <p:nvPr/>
+        </p:nvSpPr>
+        <p:spPr>
+          <a:xfrm>
+            <a:off x="395654" y="6488668"/>
+            <a:ext cx="7494231" cy="369332"/>
+          </a:xfrm>
+          <a:prstGeom prst="rect">
+            <a:avLst/>
+          </a:prstGeom>
+          <a:noFill/>
+        </p:spPr>
+        <p:txBody>
+          <a:bodyPr wrap="none" rtlCol="0">
+            <a:spAutoFit/>
+          </a:bodyPr>
+          <a:lstStyle/>
+          <a:p>
+            <a:r>
+              <a:rPr lang="en-US" dirty="0"/>
+              <a:t>https://github.com/uclanlp/corefBias/blob/master/NAACL2018_CorefBias.pdf</a:t>
+            </a:r>
+          </a:p>
+        </p:txBody>
+      </p:sp>
+    </p:spTree>
+    <p:extLst>
+      <p:ext uri="{BB962C8B-B14F-4D97-AF65-F5344CB8AC3E}">
+        <p14:creationId xmlns:p14="http://schemas.microsoft.com/office/powerpoint/2010/main" val="4055301317"/>
+      </p:ext>
+    </p:extLst>
+  </p:cSld>
+  <p:clrMapOvr>
+    <a:masterClrMapping/>
+  </p:clrMapOvr>
+</p:sld>
+</file>
+
+<file path=ppt/slides/slide33.xml><?xml version="1.0" encoding="utf-8"?>
+<p:sld xmlns:a="http://schemas.openxmlformats.org/drawingml/2006/main" xmlns:r="http://schemas.openxmlformats.org/officeDocument/2006/relationships" xmlns:p="http://schemas.openxmlformats.org/presentationml/2006/main">
+  <p:cSld>
+    <p:spTree>
+      <p:nvGrpSpPr>
+        <p:cNvPr id="1" name=""/>
+        <p:cNvGrpSpPr/>
+        <p:nvPr/>
+      </p:nvGrpSpPr>
+      <p:grpSpPr>
+        <a:xfrm>
+          <a:off x="0" y="0"/>
+          <a:ext cx="0" cy="0"/>
+          <a:chOff x="0" y="0"/>
+          <a:chExt cx="0" cy="0"/>
+        </a:xfrm>
+      </p:grpSpPr>
+      <p:pic>
+        <p:nvPicPr>
+          <p:cNvPr id="4" name="Picture 3">
+            <a:extLst>
+              <a:ext uri="{FF2B5EF4-FFF2-40B4-BE49-F238E27FC236}">
+                <a16:creationId xmlns:a16="http://schemas.microsoft.com/office/drawing/2014/main" id="{6441639D-130F-48AB-836B-9F0CCAB508EA}"/>
+              </a:ext>
+            </a:extLst>
+          </p:cNvPr>
+          <p:cNvPicPr>
+            <a:picLocks noChangeAspect="1"/>
+          </p:cNvPicPr>
+          <p:nvPr/>
+        </p:nvPicPr>
+        <p:blipFill>
+          <a:blip r:embed="rId2"/>
+          <a:stretch>
+            <a:fillRect/>
+          </a:stretch>
+        </p:blipFill>
+        <p:spPr>
+          <a:xfrm>
+            <a:off x="152400" y="1681162"/>
+            <a:ext cx="5029200" cy="3495675"/>
+          </a:xfrm>
+          <a:prstGeom prst="rect">
+            <a:avLst/>
+          </a:prstGeom>
+        </p:spPr>
+      </p:pic>
+      <p:pic>
+        <p:nvPicPr>
+          <p:cNvPr id="5" name="Picture 4">
+            <a:extLst>
+              <a:ext uri="{FF2B5EF4-FFF2-40B4-BE49-F238E27FC236}">
+                <a16:creationId xmlns:a16="http://schemas.microsoft.com/office/drawing/2014/main" id="{6C356447-70ED-4FDD-B9F7-6086A6BF983D}"/>
+              </a:ext>
+            </a:extLst>
+          </p:cNvPr>
+          <p:cNvPicPr>
+            <a:picLocks noChangeAspect="1"/>
+          </p:cNvPicPr>
+          <p:nvPr/>
+        </p:nvPicPr>
+        <p:blipFill>
+          <a:blip r:embed="rId3"/>
+          <a:stretch>
+            <a:fillRect/>
+          </a:stretch>
+        </p:blipFill>
+        <p:spPr>
+          <a:xfrm>
+            <a:off x="6096000" y="1754981"/>
+            <a:ext cx="5241679" cy="3348037"/>
+          </a:xfrm>
+          <a:prstGeom prst="rect">
+            <a:avLst/>
+          </a:prstGeom>
+        </p:spPr>
+      </p:pic>
+      <p:sp>
+        <p:nvSpPr>
+          <p:cNvPr id="6" name="TextBox 5">
+            <a:extLst>
+              <a:ext uri="{FF2B5EF4-FFF2-40B4-BE49-F238E27FC236}">
+                <a16:creationId xmlns:a16="http://schemas.microsoft.com/office/drawing/2014/main" id="{0D6CF4EB-CAB5-460A-A8FE-DBB66C9B471D}"/>
+              </a:ext>
+            </a:extLst>
+          </p:cNvPr>
+          <p:cNvSpPr txBox="1"/>
+          <p:nvPr/>
+        </p:nvSpPr>
+        <p:spPr>
+          <a:xfrm>
+            <a:off x="439615" y="6216162"/>
+            <a:ext cx="8733481" cy="246221"/>
+          </a:xfrm>
+          <a:prstGeom prst="rect">
+            <a:avLst/>
+          </a:prstGeom>
+          <a:noFill/>
+        </p:spPr>
+        <p:txBody>
+          <a:bodyPr wrap="none" rtlCol="0">
+            <a:spAutoFit/>
+          </a:bodyPr>
+          <a:lstStyle/>
+          <a:p>
+            <a:r>
+              <a:rPr lang="en-US" sz="1000" dirty="0"/>
+              <a:t>https://www.semanticscholar.org/paper/Word-Embeddings-Quantify-100-Years-of-Gender-and-Garg-Schiebinger/56e8985fa61037662650803d48177d752e9ce557</a:t>
+            </a:r>
+          </a:p>
+        </p:txBody>
+      </p:sp>
+    </p:spTree>
+    <p:extLst>
+      <p:ext uri="{BB962C8B-B14F-4D97-AF65-F5344CB8AC3E}">
+        <p14:creationId xmlns:p14="http://schemas.microsoft.com/office/powerpoint/2010/main" val="3294050383"/>
+      </p:ext>
+    </p:extLst>
+  </p:cSld>
+  <p:clrMapOvr>
+    <a:masterClrMapping/>
+  </p:clrMapOvr>
+</p:sld>
+</file>
+
+<file path=ppt/slides/slide34.xml><?xml version="1.0" encoding="utf-8"?>
+<p:sld xmlns:a="http://schemas.openxmlformats.org/drawingml/2006/main" xmlns:r="http://schemas.openxmlformats.org/officeDocument/2006/relationships" xmlns:p="http://schemas.openxmlformats.org/presentationml/2006/main">
+  <p:cSld>
+    <p:spTree>
+      <p:nvGrpSpPr>
+        <p:cNvPr id="1" name=""/>
+        <p:cNvGrpSpPr/>
+        <p:nvPr/>
+      </p:nvGrpSpPr>
+      <p:grpSpPr>
+        <a:xfrm>
+          <a:off x="0" y="0"/>
+          <a:ext cx="0" cy="0"/>
+          <a:chOff x="0" y="0"/>
+          <a:chExt cx="0" cy="0"/>
+        </a:xfrm>
+      </p:grpSpPr>
+      <p:pic>
+        <p:nvPicPr>
+          <p:cNvPr id="4" name="Picture 3">
+            <a:extLst>
+              <a:ext uri="{FF2B5EF4-FFF2-40B4-BE49-F238E27FC236}">
+                <a16:creationId xmlns:a16="http://schemas.microsoft.com/office/drawing/2014/main" id="{7EBAB47E-D892-4A90-81CE-79326A780CD7}"/>
+              </a:ext>
+            </a:extLst>
+          </p:cNvPr>
+          <p:cNvPicPr>
+            <a:picLocks noChangeAspect="1"/>
+          </p:cNvPicPr>
+          <p:nvPr/>
+        </p:nvPicPr>
+        <p:blipFill>
+          <a:blip r:embed="rId2"/>
+          <a:stretch>
+            <a:fillRect/>
+          </a:stretch>
+        </p:blipFill>
+        <p:spPr>
+          <a:xfrm>
+            <a:off x="90487" y="1119187"/>
+            <a:ext cx="12011025" cy="4619625"/>
+          </a:xfrm>
+          <a:prstGeom prst="rect">
+            <a:avLst/>
+          </a:prstGeom>
+        </p:spPr>
+      </p:pic>
+      <p:sp>
+        <p:nvSpPr>
+          <p:cNvPr id="5" name="TextBox 4">
+            <a:extLst>
+              <a:ext uri="{FF2B5EF4-FFF2-40B4-BE49-F238E27FC236}">
+                <a16:creationId xmlns:a16="http://schemas.microsoft.com/office/drawing/2014/main" id="{17777FA6-516C-459D-8594-24760D1D0AEA}"/>
+              </a:ext>
+            </a:extLst>
+          </p:cNvPr>
+          <p:cNvSpPr txBox="1"/>
+          <p:nvPr/>
+        </p:nvSpPr>
+        <p:spPr>
+          <a:xfrm>
+            <a:off x="90487" y="6418384"/>
+            <a:ext cx="10428176" cy="323165"/>
+          </a:xfrm>
+          <a:prstGeom prst="rect">
+            <a:avLst/>
+          </a:prstGeom>
+          <a:noFill/>
+        </p:spPr>
+        <p:txBody>
+          <a:bodyPr wrap="none" rtlCol="0">
+            <a:spAutoFit/>
+          </a:bodyPr>
+          <a:lstStyle/>
+          <a:p>
+            <a:r>
+              <a:rPr lang="en-US" sz="1500" dirty="0"/>
+              <a:t>https://papers.nips.cc/paper/6228-man-is-to-computer-programmer-as-woman-is-to-homemaker-debiasing-word-embeddings.pdf</a:t>
+            </a:r>
+          </a:p>
+        </p:txBody>
+      </p:sp>
+    </p:spTree>
+    <p:extLst>
+      <p:ext uri="{BB962C8B-B14F-4D97-AF65-F5344CB8AC3E}">
+        <p14:creationId xmlns:p14="http://schemas.microsoft.com/office/powerpoint/2010/main" val="205345932"/>
+      </p:ext>
+    </p:extLst>
+  </p:cSld>
+  <p:clrMapOvr>
+    <a:masterClrMapping/>
+  </p:clrMapOvr>
+</p:sld>
+</file>
+
+<file path=ppt/slides/slide35.xml><?xml version="1.0" encoding="utf-8"?>
+<p:sld xmlns:a="http://schemas.openxmlformats.org/drawingml/2006/main" xmlns:r="http://schemas.openxmlformats.org/officeDocument/2006/relationships" xmlns:p="http://schemas.openxmlformats.org/presentationml/2006/main">
+  <p:cSld>
+    <p:spTree>
+      <p:nvGrpSpPr>
+        <p:cNvPr id="1" name=""/>
+        <p:cNvGrpSpPr/>
+        <p:nvPr/>
+      </p:nvGrpSpPr>
+      <p:grpSpPr>
+        <a:xfrm>
+          <a:off x="0" y="0"/>
+          <a:ext cx="0" cy="0"/>
+          <a:chOff x="0" y="0"/>
+          <a:chExt cx="0" cy="0"/>
+        </a:xfrm>
+      </p:grpSpPr>
       <p:sp>
         <p:nvSpPr>
           <p:cNvPr id="4" name="Title 3">
@@ -6664,7 +6950,7 @@
 </p:sld>
 </file>
 
-<file path=ppt/slides/slide33.xml><?xml version="1.0" encoding="utf-8"?>
+<file path=ppt/slides/slide36.xml><?xml version="1.0" encoding="utf-8"?>
 <p:sld xmlns:a="http://schemas.openxmlformats.org/drawingml/2006/main" xmlns:r="http://schemas.openxmlformats.org/officeDocument/2006/relationships" xmlns:p="http://schemas.openxmlformats.org/presentationml/2006/main">
   <p:cSld>
     <p:spTree>

</xml_diff>